<commit_message>
updating chocolatey presentations for kcdc
</commit_message>
<xml_diff>
--- a/windows/chocolatey/chocolatey.pptx
+++ b/windows/chocolatey/chocolatey.pptx
@@ -5,33 +5,35 @@
     <p:sldMasterId id="2147483756" r:id="rId1"/>
   </p:sldMasterIdLst>
   <p:notesMasterIdLst>
-    <p:notesMasterId r:id="rId26"/>
+    <p:notesMasterId r:id="rId28"/>
   </p:notesMasterIdLst>
   <p:sldIdLst>
-    <p:sldId id="256" r:id="rId2"/>
-    <p:sldId id="298" r:id="rId3"/>
-    <p:sldId id="272" r:id="rId4"/>
-    <p:sldId id="273" r:id="rId5"/>
-    <p:sldId id="277" r:id="rId6"/>
-    <p:sldId id="311" r:id="rId7"/>
-    <p:sldId id="303" r:id="rId8"/>
-    <p:sldId id="307" r:id="rId9"/>
-    <p:sldId id="274" r:id="rId10"/>
-    <p:sldId id="309" r:id="rId11"/>
-    <p:sldId id="275" r:id="rId12"/>
-    <p:sldId id="312" r:id="rId13"/>
-    <p:sldId id="302" r:id="rId14"/>
-    <p:sldId id="301" r:id="rId15"/>
-    <p:sldId id="308" r:id="rId16"/>
-    <p:sldId id="269" r:id="rId17"/>
-    <p:sldId id="299" r:id="rId18"/>
-    <p:sldId id="306" r:id="rId19"/>
-    <p:sldId id="304" r:id="rId20"/>
-    <p:sldId id="305" r:id="rId21"/>
-    <p:sldId id="313" r:id="rId22"/>
-    <p:sldId id="300" r:id="rId23"/>
-    <p:sldId id="297" r:id="rId24"/>
-    <p:sldId id="310" r:id="rId25"/>
+    <p:sldId id="315" r:id="rId2"/>
+    <p:sldId id="256" r:id="rId3"/>
+    <p:sldId id="298" r:id="rId4"/>
+    <p:sldId id="316" r:id="rId5"/>
+    <p:sldId id="272" r:id="rId6"/>
+    <p:sldId id="273" r:id="rId7"/>
+    <p:sldId id="277" r:id="rId8"/>
+    <p:sldId id="311" r:id="rId9"/>
+    <p:sldId id="303" r:id="rId10"/>
+    <p:sldId id="307" r:id="rId11"/>
+    <p:sldId id="274" r:id="rId12"/>
+    <p:sldId id="309" r:id="rId13"/>
+    <p:sldId id="275" r:id="rId14"/>
+    <p:sldId id="312" r:id="rId15"/>
+    <p:sldId id="302" r:id="rId16"/>
+    <p:sldId id="301" r:id="rId17"/>
+    <p:sldId id="308" r:id="rId18"/>
+    <p:sldId id="269" r:id="rId19"/>
+    <p:sldId id="299" r:id="rId20"/>
+    <p:sldId id="306" r:id="rId21"/>
+    <p:sldId id="304" r:id="rId22"/>
+    <p:sldId id="305" r:id="rId23"/>
+    <p:sldId id="313" r:id="rId24"/>
+    <p:sldId id="300" r:id="rId25"/>
+    <p:sldId id="297" r:id="rId26"/>
+    <p:sldId id="310" r:id="rId27"/>
   </p:sldIdLst>
   <p:sldSz cx="9144000" cy="6858000" type="screen4x3"/>
   <p:notesSz cx="6858000" cy="9144000"/>
@@ -216,7 +218,7 @@
             <a:fld id="{F8705BBE-BC03-42F3-A30B-8ED0F940BFAD}" type="datetimeFigureOut">
               <a:rPr lang="en-US" smtClean="0"/>
               <a:pPr/>
-              <a:t>10/27/2012</a:t>
+              <a:t>5/4/13</a:t>
             </a:fld>
             <a:endParaRPr lang="en-US"/>
           </a:p>
@@ -555,7 +557,7 @@
             <a:fld id="{DE419B9E-5588-4E3D-A5D7-A2ED02B734CE}" type="slidenum">
               <a:rPr lang="en-US" smtClean="0"/>
               <a:pPr/>
-              <a:t>2</a:t>
+              <a:t>3</a:t>
             </a:fld>
             <a:endParaRPr lang="en-US"/>
           </a:p>
@@ -637,7 +639,7 @@
             <a:fld id="{DE419B9E-5588-4E3D-A5D7-A2ED02B734CE}" type="slidenum">
               <a:rPr lang="en-US" smtClean="0"/>
               <a:pPr/>
-              <a:t>3</a:t>
+              <a:t>5</a:t>
             </a:fld>
             <a:endParaRPr lang="en-US"/>
           </a:p>
@@ -727,7 +729,7 @@
             <a:fld id="{DE419B9E-5588-4E3D-A5D7-A2ED02B734CE}" type="slidenum">
               <a:rPr lang="en-US" smtClean="0"/>
               <a:pPr/>
-              <a:t>4</a:t>
+              <a:t>6</a:t>
             </a:fld>
             <a:endParaRPr lang="en-US"/>
           </a:p>
@@ -923,7 +925,7 @@
             <a:fld id="{C3CE9471-DEB6-4DE0-B19C-141FBC909CBF}" type="datetimeFigureOut">
               <a:rPr lang="en-US" smtClean="0"/>
               <a:pPr/>
-              <a:t>10/27/2012</a:t>
+              <a:t>5/4/13</a:t>
             </a:fld>
             <a:endParaRPr lang="en-US"/>
           </a:p>
@@ -1090,7 +1092,7 @@
             <a:fld id="{C3CE9471-DEB6-4DE0-B19C-141FBC909CBF}" type="datetimeFigureOut">
               <a:rPr lang="en-US" smtClean="0"/>
               <a:pPr/>
-              <a:t>10/27/2012</a:t>
+              <a:t>5/4/13</a:t>
             </a:fld>
             <a:endParaRPr lang="en-US"/>
           </a:p>
@@ -1267,7 +1269,7 @@
             <a:fld id="{C3CE9471-DEB6-4DE0-B19C-141FBC909CBF}" type="datetimeFigureOut">
               <a:rPr lang="en-US" smtClean="0"/>
               <a:pPr/>
-              <a:t>10/27/2012</a:t>
+              <a:t>5/4/13</a:t>
             </a:fld>
             <a:endParaRPr lang="en-US"/>
           </a:p>
@@ -1434,7 +1436,7 @@
             <a:fld id="{C3CE9471-DEB6-4DE0-B19C-141FBC909CBF}" type="datetimeFigureOut">
               <a:rPr lang="en-US" smtClean="0"/>
               <a:pPr/>
-              <a:t>10/27/2012</a:t>
+              <a:t>5/4/13</a:t>
             </a:fld>
             <a:endParaRPr lang="en-US"/>
           </a:p>
@@ -1677,7 +1679,7 @@
             <a:fld id="{C3CE9471-DEB6-4DE0-B19C-141FBC909CBF}" type="datetimeFigureOut">
               <a:rPr lang="en-US" smtClean="0"/>
               <a:pPr/>
-              <a:t>10/27/2012</a:t>
+              <a:t>5/4/13</a:t>
             </a:fld>
             <a:endParaRPr lang="en-US"/>
           </a:p>
@@ -1962,7 +1964,7 @@
             <a:fld id="{C3CE9471-DEB6-4DE0-B19C-141FBC909CBF}" type="datetimeFigureOut">
               <a:rPr lang="en-US" smtClean="0"/>
               <a:pPr/>
-              <a:t>10/27/2012</a:t>
+              <a:t>5/4/13</a:t>
             </a:fld>
             <a:endParaRPr lang="en-US"/>
           </a:p>
@@ -2381,7 +2383,7 @@
             <a:fld id="{C3CE9471-DEB6-4DE0-B19C-141FBC909CBF}" type="datetimeFigureOut">
               <a:rPr lang="en-US" smtClean="0"/>
               <a:pPr/>
-              <a:t>10/27/2012</a:t>
+              <a:t>5/4/13</a:t>
             </a:fld>
             <a:endParaRPr lang="en-US"/>
           </a:p>
@@ -2496,7 +2498,7 @@
             <a:fld id="{C3CE9471-DEB6-4DE0-B19C-141FBC909CBF}" type="datetimeFigureOut">
               <a:rPr lang="en-US" smtClean="0"/>
               <a:pPr/>
-              <a:t>10/27/2012</a:t>
+              <a:t>5/4/13</a:t>
             </a:fld>
             <a:endParaRPr lang="en-US"/>
           </a:p>
@@ -2588,7 +2590,7 @@
             <a:fld id="{C3CE9471-DEB6-4DE0-B19C-141FBC909CBF}" type="datetimeFigureOut">
               <a:rPr lang="en-US" smtClean="0"/>
               <a:pPr/>
-              <a:t>10/27/2012</a:t>
+              <a:t>5/4/13</a:t>
             </a:fld>
             <a:endParaRPr lang="en-US"/>
           </a:p>
@@ -2862,7 +2864,7 @@
             <a:fld id="{C3CE9471-DEB6-4DE0-B19C-141FBC909CBF}" type="datetimeFigureOut">
               <a:rPr lang="en-US" smtClean="0"/>
               <a:pPr/>
-              <a:t>10/27/2012</a:t>
+              <a:t>5/4/13</a:t>
             </a:fld>
             <a:endParaRPr lang="en-US"/>
           </a:p>
@@ -3116,7 +3118,7 @@
             <a:fld id="{C3CE9471-DEB6-4DE0-B19C-141FBC909CBF}" type="datetimeFigureOut">
               <a:rPr lang="en-US" smtClean="0"/>
               <a:pPr/>
-              <a:t>10/27/2012</a:t>
+              <a:t>5/4/13</a:t>
             </a:fld>
             <a:endParaRPr lang="en-US"/>
           </a:p>
@@ -3243,7 +3245,7 @@
           </a:prstGeom>
           <a:noFill/>
           <a:extLst>
-            <a:ext uri="{909E8E84-426E-40DD-AFC4-6F175D3DCCD1}">
+            <a:ext uri="{909E8E84-426E-40dd-AFC4-6F175D3DCCD1}">
               <a14:hiddenFill xmlns:a14="http://schemas.microsoft.com/office/drawing/2010/main">
                 <a:solidFill>
                   <a:srgbClr val="FFFFFF"/>
@@ -3384,7 +3386,7 @@
             <a:fld id="{C3CE9471-DEB6-4DE0-B19C-141FBC909CBF}" type="datetimeFigureOut">
               <a:rPr lang="en-US" smtClean="0"/>
               <a:pPr/>
-              <a:t>10/27/2012</a:t>
+              <a:t>5/4/13</a:t>
             </a:fld>
             <a:endParaRPr lang="en-US"/>
           </a:p>
@@ -3757,55 +3759,1114 @@
       </p:grpSpPr>
       <p:sp>
         <p:nvSpPr>
-          <p:cNvPr id="2" name="Title 1"/>
-          <p:cNvSpPr>
-            <a:spLocks noGrp="1"/>
-          </p:cNvSpPr>
-          <p:nvPr>
-            <p:ph type="ctrTitle"/>
-          </p:nvPr>
+          <p:cNvPr id="2" name="Rectangle 1"/>
+          <p:cNvSpPr/>
+          <p:nvPr/>
         </p:nvSpPr>
         <p:spPr>
           <a:xfrm>
-            <a:off x="685800" y="1371600"/>
-            <a:ext cx="7772400" cy="1470025"/>
+            <a:off x="-152400" y="-76200"/>
+            <a:ext cx="9296400" cy="6934200"/>
+          </a:xfrm>
+          <a:prstGeom prst="rect">
+            <a:avLst/>
+          </a:prstGeom>
+          <a:solidFill>
+            <a:schemeClr val="tx1"/>
+          </a:solidFill>
+        </p:spPr>
+        <p:style>
+          <a:lnRef idx="2">
+            <a:schemeClr val="accent1">
+              <a:shade val="50000"/>
+            </a:schemeClr>
+          </a:lnRef>
+          <a:fillRef idx="1">
+            <a:schemeClr val="accent1"/>
+          </a:fillRef>
+          <a:effectRef idx="0">
+            <a:schemeClr val="accent1"/>
+          </a:effectRef>
+          <a:fontRef idx="minor">
+            <a:schemeClr val="lt1"/>
+          </a:fontRef>
+        </p:style>
+        <p:txBody>
+          <a:bodyPr rtlCol="0" anchor="ctr"/>
+          <a:lstStyle/>
+          <a:p>
+            <a:pPr algn="ctr"/>
+            <a:endParaRPr lang="en-US"/>
+          </a:p>
+        </p:txBody>
+      </p:sp>
+      <p:cxnSp>
+        <p:nvCxnSpPr>
+          <p:cNvPr id="8" name="Straight Connector 7"/>
+          <p:cNvCxnSpPr/>
+          <p:nvPr/>
+        </p:nvCxnSpPr>
+        <p:spPr>
+          <a:xfrm>
+            <a:off x="141118" y="423320"/>
+            <a:ext cx="8934528" cy="0"/>
+          </a:xfrm>
+          <a:prstGeom prst="line">
+            <a:avLst/>
+          </a:prstGeom>
+          <a:ln>
+            <a:solidFill>
+              <a:schemeClr val="tx1"/>
+            </a:solidFill>
+          </a:ln>
+        </p:spPr>
+        <p:style>
+          <a:lnRef idx="2">
+            <a:schemeClr val="accent1"/>
+          </a:lnRef>
+          <a:fillRef idx="0">
+            <a:schemeClr val="accent1"/>
+          </a:fillRef>
+          <a:effectRef idx="1">
+            <a:schemeClr val="accent1"/>
+          </a:effectRef>
+          <a:fontRef idx="minor">
+            <a:schemeClr val="tx1"/>
+          </a:fontRef>
+        </p:style>
+      </p:cxnSp>
+      <p:pic>
+        <p:nvPicPr>
+          <p:cNvPr id="9" name="Picture 8" descr="Paige Technologies.png"/>
+          <p:cNvPicPr>
+            <a:picLocks noChangeAspect="1"/>
+          </p:cNvPicPr>
+          <p:nvPr/>
+        </p:nvPicPr>
+        <p:blipFill>
+          <a:blip r:embed="rId2">
+            <a:extLst>
+              <a:ext uri="{28A0092B-C50C-407E-A947-70E740481C1C}">
+                <a14:useLocalDpi xmlns:a14="http://schemas.microsoft.com/office/drawing/2010/main" val="0"/>
+              </a:ext>
+            </a:extLst>
+          </a:blip>
+          <a:stretch>
+            <a:fillRect/>
+          </a:stretch>
+        </p:blipFill>
+        <p:spPr>
+          <a:xfrm>
+            <a:off x="3284605" y="446380"/>
+            <a:ext cx="2274149" cy="1091592"/>
+          </a:xfrm>
+          <a:prstGeom prst="rect">
+            <a:avLst/>
+          </a:prstGeom>
+        </p:spPr>
+      </p:pic>
+      <p:pic>
+        <p:nvPicPr>
+          <p:cNvPr id="10" name="Picture 9" descr="Stackify.png"/>
+          <p:cNvPicPr>
+            <a:picLocks noChangeAspect="1"/>
+          </p:cNvPicPr>
+          <p:nvPr/>
+        </p:nvPicPr>
+        <p:blipFill>
+          <a:blip r:embed="rId3">
+            <a:extLst>
+              <a:ext uri="{28A0092B-C50C-407E-A947-70E740481C1C}">
+                <a14:useLocalDpi xmlns:a14="http://schemas.microsoft.com/office/drawing/2010/main" val="0"/>
+              </a:ext>
+            </a:extLst>
+          </a:blip>
+          <a:stretch>
+            <a:fillRect/>
+          </a:stretch>
+        </p:blipFill>
+        <p:spPr>
+          <a:xfrm>
+            <a:off x="151392" y="483327"/>
+            <a:ext cx="2846936" cy="993356"/>
+          </a:xfrm>
+          <a:prstGeom prst="rect">
+            <a:avLst/>
+          </a:prstGeom>
+        </p:spPr>
+      </p:pic>
+      <p:pic>
+        <p:nvPicPr>
+          <p:cNvPr id="11" name="Picture 10" descr="Ingenuity Consulting Partners.png"/>
+          <p:cNvPicPr>
+            <a:picLocks noChangeAspect="1"/>
+          </p:cNvPicPr>
+          <p:nvPr/>
+        </p:nvPicPr>
+        <p:blipFill>
+          <a:blip r:embed="rId4">
+            <a:extLst>
+              <a:ext uri="{28A0092B-C50C-407E-A947-70E740481C1C}">
+                <a14:useLocalDpi xmlns:a14="http://schemas.microsoft.com/office/drawing/2010/main" val="0"/>
+              </a:ext>
+            </a:extLst>
+          </a:blip>
+          <a:stretch>
+            <a:fillRect/>
+          </a:stretch>
+        </p:blipFill>
+        <p:spPr>
+          <a:xfrm>
+            <a:off x="3132245" y="1567113"/>
+            <a:ext cx="2719254" cy="1020766"/>
+          </a:xfrm>
+          <a:prstGeom prst="rect">
+            <a:avLst/>
+          </a:prstGeom>
+        </p:spPr>
+      </p:pic>
+      <p:pic>
+        <p:nvPicPr>
+          <p:cNvPr id="12" name="Picture 11" descr="Sprint.png"/>
+          <p:cNvPicPr>
+            <a:picLocks noChangeAspect="1"/>
+          </p:cNvPicPr>
+          <p:nvPr/>
+        </p:nvPicPr>
+        <p:blipFill>
+          <a:blip r:embed="rId5">
+            <a:extLst>
+              <a:ext uri="{28A0092B-C50C-407E-A947-70E740481C1C}">
+                <a14:useLocalDpi xmlns:a14="http://schemas.microsoft.com/office/drawing/2010/main" val="0"/>
+              </a:ext>
+            </a:extLst>
+          </a:blip>
+          <a:stretch>
+            <a:fillRect/>
+          </a:stretch>
+        </p:blipFill>
+        <p:spPr>
+          <a:xfrm>
+            <a:off x="5988180" y="1481391"/>
+            <a:ext cx="3068170" cy="1331116"/>
+          </a:xfrm>
+          <a:prstGeom prst="rect">
+            <a:avLst/>
+          </a:prstGeom>
+        </p:spPr>
+      </p:pic>
+      <p:pic>
+        <p:nvPicPr>
+          <p:cNvPr id="13" name="Picture 12" descr="Alfresco.png"/>
+          <p:cNvPicPr>
+            <a:picLocks noChangeAspect="1"/>
+          </p:cNvPicPr>
+          <p:nvPr/>
+        </p:nvPicPr>
+        <p:blipFill>
+          <a:blip r:embed="rId6">
+            <a:extLst>
+              <a:ext uri="{28A0092B-C50C-407E-A947-70E740481C1C}">
+                <a14:useLocalDpi xmlns:a14="http://schemas.microsoft.com/office/drawing/2010/main" val="0"/>
+              </a:ext>
+            </a:extLst>
+          </a:blip>
+          <a:stretch>
+            <a:fillRect/>
+          </a:stretch>
+        </p:blipFill>
+        <p:spPr>
+          <a:xfrm>
+            <a:off x="5959793" y="488735"/>
+            <a:ext cx="3070354" cy="1001408"/>
+          </a:xfrm>
+          <a:prstGeom prst="rect">
+            <a:avLst/>
+          </a:prstGeom>
+        </p:spPr>
+      </p:pic>
+      <p:pic>
+        <p:nvPicPr>
+          <p:cNvPr id="14" name="Picture 13" descr="Balance Innovations.png"/>
+          <p:cNvPicPr>
+            <a:picLocks noChangeAspect="1"/>
+          </p:cNvPicPr>
+          <p:nvPr/>
+        </p:nvPicPr>
+        <p:blipFill>
+          <a:blip r:embed="rId7">
+            <a:extLst>
+              <a:ext uri="{28A0092B-C50C-407E-A947-70E740481C1C}">
+                <a14:useLocalDpi xmlns:a14="http://schemas.microsoft.com/office/drawing/2010/main" val="0"/>
+              </a:ext>
+            </a:extLst>
+          </a:blip>
+          <a:stretch>
+            <a:fillRect/>
+          </a:stretch>
+        </p:blipFill>
+        <p:spPr>
+          <a:xfrm>
+            <a:off x="559689" y="1532352"/>
+            <a:ext cx="1525435" cy="1206269"/>
+          </a:xfrm>
+          <a:prstGeom prst="rect">
+            <a:avLst/>
+          </a:prstGeom>
+        </p:spPr>
+      </p:pic>
+      <p:cxnSp>
+        <p:nvCxnSpPr>
+          <p:cNvPr id="16" name="Straight Connector 15"/>
+          <p:cNvCxnSpPr/>
+          <p:nvPr/>
+        </p:nvCxnSpPr>
+        <p:spPr>
+          <a:xfrm>
+            <a:off x="98520" y="2846319"/>
+            <a:ext cx="8934528" cy="0"/>
+          </a:xfrm>
+          <a:prstGeom prst="line">
+            <a:avLst/>
+          </a:prstGeom>
+          <a:ln>
+            <a:solidFill>
+              <a:srgbClr val="000000"/>
+            </a:solidFill>
+          </a:ln>
+        </p:spPr>
+        <p:style>
+          <a:lnRef idx="2">
+            <a:schemeClr val="accent1"/>
+          </a:lnRef>
+          <a:fillRef idx="0">
+            <a:schemeClr val="accent1"/>
+          </a:fillRef>
+          <a:effectRef idx="1">
+            <a:schemeClr val="accent1"/>
+          </a:effectRef>
+          <a:fontRef idx="minor">
+            <a:schemeClr val="tx1"/>
+          </a:fontRef>
+        </p:style>
+      </p:cxnSp>
+      <p:sp>
+        <p:nvSpPr>
+          <p:cNvPr id="18" name="TextBox 17"/>
+          <p:cNvSpPr txBox="1"/>
+          <p:nvPr/>
+        </p:nvSpPr>
+        <p:spPr>
+          <a:xfrm>
+            <a:off x="0" y="2476987"/>
+            <a:ext cx="9144000" cy="369332"/>
+          </a:xfrm>
+          <a:prstGeom prst="rect">
+            <a:avLst/>
+          </a:prstGeom>
+          <a:noFill/>
+        </p:spPr>
+        <p:txBody>
+          <a:bodyPr wrap="square" rtlCol="0">
+            <a:spAutoFit/>
+          </a:bodyPr>
+          <a:lstStyle/>
+          <a:p>
+            <a:pPr algn="ctr"/>
+            <a:r>
+              <a:rPr lang="en-US" dirty="0" smtClean="0">
+                <a:solidFill>
+                  <a:schemeClr val="bg1"/>
+                </a:solidFill>
+              </a:rPr>
+              <a:t>GOLD SPONSORS</a:t>
+            </a:r>
+            <a:endParaRPr lang="en-US" dirty="0">
+              <a:solidFill>
+                <a:schemeClr val="bg1"/>
+              </a:solidFill>
+            </a:endParaRPr>
+          </a:p>
+        </p:txBody>
+      </p:sp>
+      <p:pic>
+        <p:nvPicPr>
+          <p:cNvPr id="19" name="Picture 18" descr="Advantage Tech.png"/>
+          <p:cNvPicPr>
+            <a:picLocks noChangeAspect="1"/>
+          </p:cNvPicPr>
+          <p:nvPr/>
+        </p:nvPicPr>
+        <p:blipFill>
+          <a:blip r:embed="rId8">
+            <a:extLst>
+              <a:ext uri="{28A0092B-C50C-407E-A947-70E740481C1C}">
+                <a14:useLocalDpi xmlns:a14="http://schemas.microsoft.com/office/drawing/2010/main" val="0"/>
+              </a:ext>
+            </a:extLst>
+          </a:blip>
+          <a:stretch>
+            <a:fillRect/>
+          </a:stretch>
+        </p:blipFill>
+        <p:spPr>
+          <a:xfrm>
+            <a:off x="5088809" y="2896723"/>
+            <a:ext cx="2275458" cy="647241"/>
+          </a:xfrm>
+          <a:prstGeom prst="rect">
+            <a:avLst/>
+          </a:prstGeom>
+        </p:spPr>
+      </p:pic>
+      <p:pic>
+        <p:nvPicPr>
+          <p:cNvPr id="20" name="Picture 19" descr="AdventureTech.png"/>
+          <p:cNvPicPr>
+            <a:picLocks noChangeAspect="1"/>
+          </p:cNvPicPr>
+          <p:nvPr/>
+        </p:nvPicPr>
+        <p:blipFill>
+          <a:blip r:embed="rId9">
+            <a:extLst>
+              <a:ext uri="{28A0092B-C50C-407E-A947-70E740481C1C}">
+                <a14:useLocalDpi xmlns:a14="http://schemas.microsoft.com/office/drawing/2010/main" val="0"/>
+              </a:ext>
+            </a:extLst>
+          </a:blip>
+          <a:stretch>
+            <a:fillRect/>
+          </a:stretch>
+        </p:blipFill>
+        <p:spPr>
+          <a:xfrm>
+            <a:off x="1829343" y="3638092"/>
+            <a:ext cx="1395526" cy="930351"/>
+          </a:xfrm>
+          <a:prstGeom prst="rect">
+            <a:avLst/>
+          </a:prstGeom>
+        </p:spPr>
+      </p:pic>
+      <p:pic>
+        <p:nvPicPr>
+          <p:cNvPr id="21" name="Picture 20" descr="DST.png"/>
+          <p:cNvPicPr>
+            <a:picLocks noChangeAspect="1"/>
+          </p:cNvPicPr>
+          <p:nvPr/>
+        </p:nvPicPr>
+        <p:blipFill>
+          <a:blip r:embed="rId10">
+            <a:extLst>
+              <a:ext uri="{28A0092B-C50C-407E-A947-70E740481C1C}">
+                <a14:useLocalDpi xmlns:a14="http://schemas.microsoft.com/office/drawing/2010/main" val="0"/>
+              </a:ext>
+            </a:extLst>
+          </a:blip>
+          <a:stretch>
+            <a:fillRect/>
+          </a:stretch>
+        </p:blipFill>
+        <p:spPr>
+          <a:xfrm>
+            <a:off x="922459" y="4704244"/>
+            <a:ext cx="1136260" cy="1022634"/>
+          </a:xfrm>
+          <a:prstGeom prst="rect">
+            <a:avLst/>
+          </a:prstGeom>
+        </p:spPr>
+      </p:pic>
+      <p:pic>
+        <p:nvPicPr>
+          <p:cNvPr id="22" name="Picture 21" descr="Telerik.png"/>
+          <p:cNvPicPr>
+            <a:picLocks noChangeAspect="1"/>
+          </p:cNvPicPr>
+          <p:nvPr/>
+        </p:nvPicPr>
+        <p:blipFill>
+          <a:blip r:embed="rId11">
+            <a:extLst>
+              <a:ext uri="{28A0092B-C50C-407E-A947-70E740481C1C}">
+                <a14:useLocalDpi xmlns:a14="http://schemas.microsoft.com/office/drawing/2010/main" val="0"/>
+              </a:ext>
+            </a:extLst>
+          </a:blip>
+          <a:stretch>
+            <a:fillRect/>
+          </a:stretch>
+        </p:blipFill>
+        <p:spPr>
+          <a:xfrm>
+            <a:off x="6393429" y="5097405"/>
+            <a:ext cx="2130222" cy="852089"/>
+          </a:xfrm>
+          <a:prstGeom prst="rect">
+            <a:avLst/>
+          </a:prstGeom>
+        </p:spPr>
+      </p:pic>
+      <p:pic>
+        <p:nvPicPr>
+          <p:cNvPr id="23" name="Picture 22" descr="Keyhole Software.png"/>
+          <p:cNvPicPr>
+            <a:picLocks noChangeAspect="1"/>
+          </p:cNvPicPr>
+          <p:nvPr/>
+        </p:nvPicPr>
+        <p:blipFill>
+          <a:blip r:embed="rId12">
+            <a:extLst>
+              <a:ext uri="{28A0092B-C50C-407E-A947-70E740481C1C}">
+                <a14:useLocalDpi xmlns:a14="http://schemas.microsoft.com/office/drawing/2010/main" val="0"/>
+              </a:ext>
+            </a:extLst>
+          </a:blip>
+          <a:stretch>
+            <a:fillRect/>
+          </a:stretch>
+        </p:blipFill>
+        <p:spPr>
+          <a:xfrm>
+            <a:off x="250920" y="2900881"/>
+            <a:ext cx="1951942" cy="706417"/>
+          </a:xfrm>
+          <a:prstGeom prst="rect">
+            <a:avLst/>
+          </a:prstGeom>
+        </p:spPr>
+      </p:pic>
+      <p:pic>
+        <p:nvPicPr>
+          <p:cNvPr id="24" name="Picture 23" descr="Centriq.png"/>
+          <p:cNvPicPr>
+            <a:picLocks noChangeAspect="1"/>
+          </p:cNvPicPr>
+          <p:nvPr/>
+        </p:nvPicPr>
+        <p:blipFill>
+          <a:blip r:embed="rId13">
+            <a:extLst>
+              <a:ext uri="{28A0092B-C50C-407E-A947-70E740481C1C}">
+                <a14:useLocalDpi xmlns:a14="http://schemas.microsoft.com/office/drawing/2010/main" val="0"/>
+              </a:ext>
+            </a:extLst>
+          </a:blip>
+          <a:stretch>
+            <a:fillRect/>
+          </a:stretch>
+        </p:blipFill>
+        <p:spPr>
+          <a:xfrm>
+            <a:off x="7654693" y="2863031"/>
+            <a:ext cx="1442271" cy="665125"/>
+          </a:xfrm>
+          <a:prstGeom prst="rect">
+            <a:avLst/>
+          </a:prstGeom>
+        </p:spPr>
+      </p:pic>
+      <p:pic>
+        <p:nvPicPr>
+          <p:cNvPr id="25" name="Picture 24" descr="CARFAX.png"/>
+          <p:cNvPicPr>
+            <a:picLocks noChangeAspect="1"/>
+          </p:cNvPicPr>
+          <p:nvPr/>
+        </p:nvPicPr>
+        <p:blipFill>
+          <a:blip r:embed="rId14">
+            <a:extLst>
+              <a:ext uri="{28A0092B-C50C-407E-A947-70E740481C1C}">
+                <a14:useLocalDpi xmlns:a14="http://schemas.microsoft.com/office/drawing/2010/main" val="0"/>
+              </a:ext>
+            </a:extLst>
+          </a:blip>
+          <a:stretch>
+            <a:fillRect/>
+          </a:stretch>
+        </p:blipFill>
+        <p:spPr>
+          <a:xfrm>
+            <a:off x="3149784" y="5069046"/>
+            <a:ext cx="2130222" cy="395614"/>
+          </a:xfrm>
+          <a:prstGeom prst="rect">
+            <a:avLst/>
+          </a:prstGeom>
+        </p:spPr>
+      </p:pic>
+      <p:pic>
+        <p:nvPicPr>
+          <p:cNvPr id="26" name="Picture 25" descr="Perceptive Software.png"/>
+          <p:cNvPicPr>
+            <a:picLocks noChangeAspect="1"/>
+          </p:cNvPicPr>
+          <p:nvPr/>
+        </p:nvPicPr>
+        <p:blipFill>
+          <a:blip r:embed="rId15">
+            <a:extLst>
+              <a:ext uri="{28A0092B-C50C-407E-A947-70E740481C1C}">
+                <a14:useLocalDpi xmlns:a14="http://schemas.microsoft.com/office/drawing/2010/main" val="0"/>
+              </a:ext>
+            </a:extLst>
+          </a:blip>
+          <a:stretch>
+            <a:fillRect/>
+          </a:stretch>
+        </p:blipFill>
+        <p:spPr>
+          <a:xfrm>
+            <a:off x="5520136" y="4420332"/>
+            <a:ext cx="3511653" cy="635442"/>
+          </a:xfrm>
+          <a:prstGeom prst="rect">
+            <a:avLst/>
+          </a:prstGeom>
+        </p:spPr>
+      </p:pic>
+      <p:pic>
+        <p:nvPicPr>
+          <p:cNvPr id="27" name="Picture 26" descr="VersionOne.png"/>
+          <p:cNvPicPr>
+            <a:picLocks noChangeAspect="1"/>
+          </p:cNvPicPr>
+          <p:nvPr/>
+        </p:nvPicPr>
+        <p:blipFill>
+          <a:blip r:embed="rId16">
+            <a:extLst>
+              <a:ext uri="{28A0092B-C50C-407E-A947-70E740481C1C}">
+                <a14:useLocalDpi xmlns:a14="http://schemas.microsoft.com/office/drawing/2010/main" val="0"/>
+              </a:ext>
+            </a:extLst>
+          </a:blip>
+          <a:stretch>
+            <a:fillRect/>
+          </a:stretch>
+        </p:blipFill>
+        <p:spPr>
+          <a:xfrm>
+            <a:off x="3204975" y="3686999"/>
+            <a:ext cx="1332318" cy="1332318"/>
+          </a:xfrm>
+          <a:prstGeom prst="rect">
+            <a:avLst/>
+          </a:prstGeom>
+        </p:spPr>
+      </p:pic>
+      <p:pic>
+        <p:nvPicPr>
+          <p:cNvPr id="28" name="Picture 27" descr="UMB.png"/>
+          <p:cNvPicPr>
+            <a:picLocks noChangeAspect="1"/>
+          </p:cNvPicPr>
+          <p:nvPr/>
+        </p:nvPicPr>
+        <p:blipFill>
+          <a:blip r:embed="rId17">
+            <a:extLst>
+              <a:ext uri="{28A0092B-C50C-407E-A947-70E740481C1C}">
+                <a14:useLocalDpi xmlns:a14="http://schemas.microsoft.com/office/drawing/2010/main" val="0"/>
+              </a:ext>
+            </a:extLst>
+          </a:blip>
+          <a:stretch>
+            <a:fillRect/>
+          </a:stretch>
+        </p:blipFill>
+        <p:spPr>
+          <a:xfrm>
+            <a:off x="2912147" y="3038007"/>
+            <a:ext cx="1849623" cy="466809"/>
+          </a:xfrm>
+          <a:prstGeom prst="rect">
+            <a:avLst/>
+          </a:prstGeom>
+        </p:spPr>
+      </p:pic>
+      <p:pic>
+        <p:nvPicPr>
+          <p:cNvPr id="29" name="Picture 28" descr="kcpmi.png"/>
+          <p:cNvPicPr>
+            <a:picLocks noChangeAspect="1"/>
+          </p:cNvPicPr>
+          <p:nvPr/>
+        </p:nvPicPr>
+        <p:blipFill>
+          <a:blip r:embed="rId18">
+            <a:extLst>
+              <a:ext uri="{28A0092B-C50C-407E-A947-70E740481C1C}">
+                <a14:useLocalDpi xmlns:a14="http://schemas.microsoft.com/office/drawing/2010/main" val="0"/>
+              </a:ext>
+            </a:extLst>
+          </a:blip>
+          <a:stretch>
+            <a:fillRect/>
+          </a:stretch>
+        </p:blipFill>
+        <p:spPr>
+          <a:xfrm>
+            <a:off x="7385623" y="3661406"/>
+            <a:ext cx="1604183" cy="695146"/>
+          </a:xfrm>
+          <a:prstGeom prst="rect">
+            <a:avLst/>
+          </a:prstGeom>
+        </p:spPr>
+      </p:pic>
+      <p:pic>
+        <p:nvPicPr>
+          <p:cNvPr id="30" name="Picture 29" descr="Adaptive Solutions Group.png"/>
+          <p:cNvPicPr>
+            <a:picLocks noChangeAspect="1"/>
+          </p:cNvPicPr>
+          <p:nvPr/>
+        </p:nvPicPr>
+        <p:blipFill>
+          <a:blip r:embed="rId19">
+            <a:extLst>
+              <a:ext uri="{28A0092B-C50C-407E-A947-70E740481C1C}">
+                <a14:useLocalDpi xmlns:a14="http://schemas.microsoft.com/office/drawing/2010/main" val="0"/>
+              </a:ext>
+            </a:extLst>
+          </a:blip>
+          <a:stretch>
+            <a:fillRect/>
+          </a:stretch>
+        </p:blipFill>
+        <p:spPr>
+          <a:xfrm>
+            <a:off x="4730191" y="3712478"/>
+            <a:ext cx="2424545" cy="554182"/>
+          </a:xfrm>
+          <a:prstGeom prst="rect">
+            <a:avLst/>
+          </a:prstGeom>
+        </p:spPr>
+      </p:pic>
+      <p:sp>
+        <p:nvSpPr>
+          <p:cNvPr id="31" name="TextBox 30"/>
+          <p:cNvSpPr txBox="1"/>
+          <p:nvPr/>
+        </p:nvSpPr>
+        <p:spPr>
+          <a:xfrm>
+            <a:off x="0" y="5679508"/>
+            <a:ext cx="9144000" cy="369332"/>
+          </a:xfrm>
+          <a:prstGeom prst="rect">
+            <a:avLst/>
+          </a:prstGeom>
+          <a:noFill/>
+        </p:spPr>
+        <p:txBody>
+          <a:bodyPr wrap="square" rtlCol="0">
+            <a:spAutoFit/>
+          </a:bodyPr>
+          <a:lstStyle/>
+          <a:p>
+            <a:pPr algn="ctr"/>
+            <a:r>
+              <a:rPr lang="en-US" dirty="0" smtClean="0">
+                <a:solidFill>
+                  <a:schemeClr val="bg1"/>
+                </a:solidFill>
+              </a:rPr>
+              <a:t>SILVER SPONSORS</a:t>
+            </a:r>
+            <a:endParaRPr lang="en-US" dirty="0">
+              <a:solidFill>
+                <a:schemeClr val="bg1"/>
+              </a:solidFill>
+            </a:endParaRPr>
+          </a:p>
+        </p:txBody>
+      </p:sp>
+      <p:cxnSp>
+        <p:nvCxnSpPr>
+          <p:cNvPr id="35" name="Straight Connector 34"/>
+          <p:cNvCxnSpPr/>
+          <p:nvPr/>
+        </p:nvCxnSpPr>
+        <p:spPr>
+          <a:xfrm>
+            <a:off x="97261" y="6051315"/>
+            <a:ext cx="8934528" cy="0"/>
+          </a:xfrm>
+          <a:prstGeom prst="line">
+            <a:avLst/>
+          </a:prstGeom>
+          <a:ln>
+            <a:solidFill>
+              <a:schemeClr val="tx1"/>
+            </a:solidFill>
+          </a:ln>
+        </p:spPr>
+        <p:style>
+          <a:lnRef idx="2">
+            <a:schemeClr val="accent1"/>
+          </a:lnRef>
+          <a:fillRef idx="0">
+            <a:schemeClr val="accent1"/>
+          </a:fillRef>
+          <a:effectRef idx="1">
+            <a:schemeClr val="accent1"/>
+          </a:effectRef>
+          <a:fontRef idx="minor">
+            <a:schemeClr val="tx1"/>
+          </a:fontRef>
+        </p:style>
+      </p:cxnSp>
+      <p:pic>
+        <p:nvPicPr>
+          <p:cNvPr id="36" name="Picture 35" descr="Discount ASP.NET.png"/>
+          <p:cNvPicPr>
+            <a:picLocks noChangeAspect="1"/>
+          </p:cNvPicPr>
+          <p:nvPr/>
+        </p:nvPicPr>
+        <p:blipFill>
+          <a:blip r:embed="rId20">
+            <a:extLst>
+              <a:ext uri="{28A0092B-C50C-407E-A947-70E740481C1C}">
+                <a14:useLocalDpi xmlns:a14="http://schemas.microsoft.com/office/drawing/2010/main" val="0"/>
+              </a:ext>
+            </a:extLst>
+          </a:blip>
+          <a:stretch>
+            <a:fillRect/>
+          </a:stretch>
+        </p:blipFill>
+        <p:spPr>
+          <a:xfrm>
+            <a:off x="910240" y="6204896"/>
+            <a:ext cx="1225691" cy="459634"/>
+          </a:xfrm>
+          <a:prstGeom prst="rect">
+            <a:avLst/>
+          </a:prstGeom>
+        </p:spPr>
+      </p:pic>
+      <p:pic>
+        <p:nvPicPr>
+          <p:cNvPr id="37" name="Picture 36" descr="Microsoft.png"/>
+          <p:cNvPicPr>
+            <a:picLocks noChangeAspect="1"/>
+          </p:cNvPicPr>
+          <p:nvPr/>
+        </p:nvPicPr>
+        <p:blipFill>
+          <a:blip r:embed="rId21">
+            <a:extLst>
+              <a:ext uri="{28A0092B-C50C-407E-A947-70E740481C1C}">
+                <a14:useLocalDpi xmlns:a14="http://schemas.microsoft.com/office/drawing/2010/main" val="0"/>
+              </a:ext>
+            </a:extLst>
+          </a:blip>
+          <a:stretch>
+            <a:fillRect/>
+          </a:stretch>
+        </p:blipFill>
+        <p:spPr>
+          <a:xfrm>
+            <a:off x="3659021" y="6258088"/>
+            <a:ext cx="1872159" cy="401177"/>
+          </a:xfrm>
+          <a:prstGeom prst="rect">
+            <a:avLst/>
+          </a:prstGeom>
+        </p:spPr>
+      </p:pic>
+      <p:pic>
+        <p:nvPicPr>
+          <p:cNvPr id="38" name="Picture 37" descr="ComponentOne.png"/>
+          <p:cNvPicPr>
+            <a:picLocks noChangeAspect="1"/>
+          </p:cNvPicPr>
+          <p:nvPr/>
+        </p:nvPicPr>
+        <p:blipFill>
+          <a:blip r:embed="rId22">
+            <a:extLst>
+              <a:ext uri="{28A0092B-C50C-407E-A947-70E740481C1C}">
+                <a14:useLocalDpi xmlns:a14="http://schemas.microsoft.com/office/drawing/2010/main" val="0"/>
+              </a:ext>
+            </a:extLst>
+          </a:blip>
+          <a:stretch>
+            <a:fillRect/>
+          </a:stretch>
+        </p:blipFill>
+        <p:spPr>
+          <a:xfrm>
+            <a:off x="6984204" y="6117963"/>
+            <a:ext cx="754852" cy="603882"/>
+          </a:xfrm>
+          <a:prstGeom prst="rect">
+            <a:avLst/>
+          </a:prstGeom>
+        </p:spPr>
+      </p:pic>
+      <p:sp>
+        <p:nvSpPr>
+          <p:cNvPr id="6" name="TextBox 5"/>
+          <p:cNvSpPr txBox="1"/>
+          <p:nvPr/>
+        </p:nvSpPr>
+        <p:spPr>
+          <a:xfrm>
+            <a:off x="0" y="53988"/>
+            <a:ext cx="9144000" cy="369332"/>
+          </a:xfrm>
+          <a:prstGeom prst="rect">
+            <a:avLst/>
+          </a:prstGeom>
+          <a:noFill/>
+        </p:spPr>
+        <p:txBody>
+          <a:bodyPr wrap="square" rtlCol="0">
+            <a:spAutoFit/>
+          </a:bodyPr>
+          <a:lstStyle/>
+          <a:p>
+            <a:pPr algn="ctr"/>
+            <a:r>
+              <a:rPr lang="en-US" b="1" dirty="0" smtClean="0">
+                <a:solidFill>
+                  <a:schemeClr val="bg1"/>
+                </a:solidFill>
+              </a:rPr>
+              <a:t>PLATINUM SPONSORS</a:t>
+            </a:r>
+            <a:endParaRPr lang="en-US" b="1" dirty="0">
+              <a:solidFill>
+                <a:schemeClr val="bg1"/>
+              </a:solidFill>
+            </a:endParaRPr>
+          </a:p>
+        </p:txBody>
+      </p:sp>
+    </p:spTree>
+    <p:extLst>
+      <p:ext uri="{BB962C8B-B14F-4D97-AF65-F5344CB8AC3E}">
+        <p14:creationId xmlns:p14="http://schemas.microsoft.com/office/powerpoint/2010/main" val="777807252"/>
+      </p:ext>
+    </p:extLst>
+  </p:cSld>
+  <p:clrMapOvr>
+    <a:masterClrMapping/>
+  </p:clrMapOvr>
+  <p:timing>
+    <p:tnLst>
+      <p:par>
+        <p:cTn xmlns:p14="http://schemas.microsoft.com/office/powerpoint/2010/main" id="1" dur="indefinite" restart="never" nodeType="tmRoot"/>
+      </p:par>
+    </p:tnLst>
+  </p:timing>
+</p:sld>
+</file>
+
+<file path=ppt/slides/slide10.xml><?xml version="1.0" encoding="utf-8"?>
+<p:sld xmlns:a="http://schemas.openxmlformats.org/drawingml/2006/main" xmlns:r="http://schemas.openxmlformats.org/officeDocument/2006/relationships" xmlns:p="http://schemas.openxmlformats.org/presentationml/2006/main">
+  <p:cSld>
+    <p:spTree>
+      <p:nvGrpSpPr>
+        <p:cNvPr id="1" name=""/>
+        <p:cNvGrpSpPr/>
+        <p:nvPr/>
+      </p:nvGrpSpPr>
+      <p:grpSpPr>
+        <a:xfrm>
+          <a:off x="0" y="0"/>
+          <a:ext cx="0" cy="0"/>
+          <a:chOff x="0" y="0"/>
+          <a:chExt cx="0" cy="0"/>
+        </a:xfrm>
+      </p:grpSpPr>
+      <p:sp>
+        <p:nvSpPr>
+          <p:cNvPr id="2" name="Title 1"/>
+          <p:cNvSpPr>
+            <a:spLocks noGrp="1"/>
+          </p:cNvSpPr>
+          <p:nvPr>
+            <p:ph type="title"/>
+          </p:nvPr>
+        </p:nvSpPr>
+        <p:spPr/>
+        <p:txBody>
+          <a:bodyPr/>
+          <a:lstStyle/>
+          <a:p>
+            <a:r>
+              <a:rPr lang="en-US" dirty="0" smtClean="0"/>
+              <a:t>Install Chocolatey?</a:t>
+            </a:r>
+            <a:endParaRPr lang="en-US" dirty="0"/>
+          </a:p>
+        </p:txBody>
+      </p:sp>
+      <p:sp>
+        <p:nvSpPr>
+          <p:cNvPr id="3" name="Content Placeholder 2"/>
+          <p:cNvSpPr>
+            <a:spLocks noGrp="1"/>
+          </p:cNvSpPr>
+          <p:nvPr>
+            <p:ph idx="1"/>
+          </p:nvPr>
+        </p:nvSpPr>
+        <p:spPr/>
+        <p:txBody>
+          <a:bodyPr/>
+          <a:lstStyle/>
+          <a:p>
+            <a:r>
+              <a:rPr lang="en-US" dirty="0" smtClean="0"/>
+              <a:t>Listed on chocolatey.org</a:t>
+            </a:r>
+          </a:p>
+          <a:p>
+            <a:r>
+              <a:rPr lang="en-US" dirty="0"/>
+              <a:t>@</a:t>
+            </a:r>
+            <a:r>
+              <a:rPr lang="en-US" dirty="0" err="1"/>
+              <a:t>powershell</a:t>
+            </a:r>
+            <a:r>
+              <a:rPr lang="en-US" dirty="0"/>
+              <a:t> -</a:t>
+            </a:r>
+            <a:r>
+              <a:rPr lang="en-US" dirty="0" err="1"/>
+              <a:t>NoProfile</a:t>
+            </a:r>
+            <a:r>
+              <a:rPr lang="en-US" dirty="0"/>
+              <a:t> -</a:t>
+            </a:r>
+            <a:r>
+              <a:rPr lang="en-US" dirty="0" err="1"/>
+              <a:t>ExecutionPolicy</a:t>
+            </a:r>
+            <a:r>
+              <a:rPr lang="en-US" dirty="0"/>
+              <a:t> unrestricted -Command "</a:t>
+            </a:r>
+            <a:r>
+              <a:rPr lang="en-US" dirty="0" err="1"/>
+              <a:t>iex</a:t>
+            </a:r>
+            <a:r>
+              <a:rPr lang="en-US" dirty="0"/>
+              <a:t> ((new-object </a:t>
+            </a:r>
+            <a:r>
+              <a:rPr lang="en-US" dirty="0" err="1"/>
+              <a:t>net.webclient</a:t>
+            </a:r>
+            <a:r>
+              <a:rPr lang="en-US" dirty="0"/>
+              <a:t>).</a:t>
+            </a:r>
+            <a:r>
+              <a:rPr lang="en-US" dirty="0" err="1"/>
+              <a:t>DownloadString</a:t>
+            </a:r>
+            <a:r>
+              <a:rPr lang="en-US" dirty="0"/>
+              <a:t>(</a:t>
+            </a:r>
+            <a:r>
+              <a:rPr lang="en-US" dirty="0" smtClean="0"/>
+              <a:t>'https://chocolatey.org/install.ps1'))" </a:t>
+            </a:r>
+            <a:r>
+              <a:rPr lang="en-US" dirty="0"/>
+              <a:t>&amp;&amp; SET PATH=%PATH%;%</a:t>
+            </a:r>
+            <a:r>
+              <a:rPr lang="en-US" dirty="0" err="1"/>
+              <a:t>systemdrive</a:t>
+            </a:r>
+            <a:r>
+              <a:rPr lang="en-US" dirty="0"/>
+              <a:t>%\chocolatey\bin</a:t>
+            </a:r>
+          </a:p>
+        </p:txBody>
+      </p:sp>
+    </p:spTree>
+    <p:extLst>
+      <p:ext uri="{BB962C8B-B14F-4D97-AF65-F5344CB8AC3E}">
+        <p14:creationId xmlns:p14="http://schemas.microsoft.com/office/powerpoint/2010/main" val="3361044654"/>
+      </p:ext>
+    </p:extLst>
+  </p:cSld>
+  <p:clrMapOvr>
+    <a:masterClrMapping/>
+  </p:clrMapOvr>
+  <p:timing>
+    <p:tnLst>
+      <p:par>
+        <p:cTn xmlns:p14="http://schemas.microsoft.com/office/powerpoint/2010/main" id="1" dur="indefinite" restart="never" nodeType="tmRoot"/>
+      </p:par>
+    </p:tnLst>
+  </p:timing>
+</p:sld>
+</file>
+
+<file path=ppt/slides/slide11.xml><?xml version="1.0" encoding="utf-8"?>
+<p:sld xmlns:a="http://schemas.openxmlformats.org/drawingml/2006/main" xmlns:r="http://schemas.openxmlformats.org/officeDocument/2006/relationships" xmlns:p="http://schemas.openxmlformats.org/presentationml/2006/main">
+  <p:cSld>
+    <p:spTree>
+      <p:nvGrpSpPr>
+        <p:cNvPr id="1" name=""/>
+        <p:cNvGrpSpPr/>
+        <p:nvPr/>
+      </p:nvGrpSpPr>
+      <p:grpSpPr>
+        <a:xfrm>
+          <a:off x="0" y="0"/>
+          <a:ext cx="0" cy="0"/>
+          <a:chOff x="0" y="0"/>
+          <a:chExt cx="0" cy="0"/>
+        </a:xfrm>
+      </p:grpSpPr>
+      <p:sp>
+        <p:nvSpPr>
+          <p:cNvPr id="3" name="Content Placeholder 2"/>
+          <p:cNvSpPr>
+            <a:spLocks noGrp="1"/>
+          </p:cNvSpPr>
+          <p:nvPr>
+            <p:ph idx="1"/>
+          </p:nvPr>
+        </p:nvSpPr>
+        <p:spPr>
+          <a:xfrm>
+            <a:off x="457200" y="1981200"/>
+            <a:ext cx="8229600" cy="3840163"/>
           </a:xfrm>
         </p:spPr>
         <p:txBody>
           <a:bodyPr/>
           <a:lstStyle/>
           <a:p>
-            <a:r>
-              <a:rPr lang="en-US" dirty="0" smtClean="0"/>
-              <a:t>Chocolatey goodness - what…</a:t>
-            </a:r>
-            <a:endParaRPr lang="en-US" dirty="0"/>
-          </a:p>
-        </p:txBody>
-      </p:sp>
-      <p:sp>
-        <p:nvSpPr>
-          <p:cNvPr id="3" name="Subtitle 2"/>
-          <p:cNvSpPr>
-            <a:spLocks noGrp="1"/>
-          </p:cNvSpPr>
-          <p:nvPr>
-            <p:ph type="subTitle" idx="1"/>
-          </p:nvPr>
-        </p:nvSpPr>
-        <p:spPr>
-          <a:xfrm>
-            <a:off x="1371600" y="2895600"/>
-            <a:ext cx="6400800" cy="914400"/>
-          </a:xfrm>
-        </p:spPr>
-        <p:txBody>
-          <a:bodyPr/>
-          <a:lstStyle/>
-          <a:p>
-            <a:r>
-              <a:rPr lang="en-US" dirty="0" smtClean="0"/>
-              <a:t>Rob Reynolds</a:t>
+            <a:pPr marL="0" indent="0" algn="ctr">
+              <a:buNone/>
+            </a:pPr>
+            <a:r>
+              <a:rPr lang="en-US" dirty="0" err="1" smtClean="0"/>
+              <a:t>Statlight</a:t>
             </a:r>
             <a:endParaRPr lang="en-US" dirty="0"/>
           </a:p>
@@ -3813,7 +4874,7 @@
       </p:sp>
       <p:pic>
         <p:nvPicPr>
-          <p:cNvPr id="7170" name="Picture 2"/>
+          <p:cNvPr id="1026" name="Picture 2"/>
           <p:cNvPicPr>
             <a:picLocks noChangeAspect="1" noChangeArrowheads="1"/>
           </p:cNvPicPr>
@@ -3834,8 +4895,8 @@
         </p:blipFill>
         <p:spPr bwMode="auto">
           <a:xfrm>
-            <a:off x="2667000" y="4267200"/>
-            <a:ext cx="3810000" cy="2143125"/>
+            <a:off x="1819275" y="2576513"/>
+            <a:ext cx="5505450" cy="1704975"/>
           </a:xfrm>
           <a:prstGeom prst="rect">
             <a:avLst/>
@@ -3846,14 +4907,14 @@
           </a:ln>
           <a:effectLst/>
           <a:extLst>
-            <a:ext uri="{909E8E84-426E-40DD-AFC4-6F175D3DCCD1}">
+            <a:ext uri="{909E8E84-426E-40dd-AFC4-6F175D3DCCD1}">
               <a14:hiddenFill xmlns:a14="http://schemas.microsoft.com/office/drawing/2010/main">
                 <a:solidFill>
                   <a:schemeClr val="accent1"/>
                 </a:solidFill>
               </a14:hiddenFill>
             </a:ext>
-            <a:ext uri="{91240B29-F687-4F45-9708-019B960494DF}">
+            <a:ext uri="{91240B29-F687-4f45-9708-019B960494DF}">
               <a14:hiddenLine xmlns:a14="http://schemas.microsoft.com/office/drawing/2010/main" w="9525">
                 <a:solidFill>
                   <a:schemeClr val="tx1"/>
@@ -3863,7 +4924,7 @@
                 <a:tailEnd/>
               </a14:hiddenLine>
             </a:ext>
-            <a:ext uri="{AF507438-7753-43E0-B8FC-AC1667EBCBE1}">
+            <a:ext uri="{AF507438-7753-43e0-B8FC-AC1667EBCBE1}">
               <a14:hiddenEffects xmlns:a14="http://schemas.microsoft.com/office/drawing/2010/main">
                 <a:effectLst>
                   <a:outerShdw dist="35921" dir="2700000" algn="ctr" rotWithShape="0">
@@ -3875,6 +4936,37 @@
           </a:extLst>
         </p:spPr>
       </p:pic>
+      <p:sp>
+        <p:nvSpPr>
+          <p:cNvPr id="2" name="TextBox 1"/>
+          <p:cNvSpPr txBox="1"/>
+          <p:nvPr/>
+        </p:nvSpPr>
+        <p:spPr>
+          <a:xfrm>
+            <a:off x="1519238" y="381000"/>
+            <a:ext cx="6105525" cy="769441"/>
+          </a:xfrm>
+          <a:prstGeom prst="rect">
+            <a:avLst/>
+          </a:prstGeom>
+          <a:noFill/>
+        </p:spPr>
+        <p:txBody>
+          <a:bodyPr wrap="square" rtlCol="0">
+            <a:spAutoFit/>
+          </a:bodyPr>
+          <a:lstStyle/>
+          <a:p>
+            <a:pPr algn="ctr"/>
+            <a:r>
+              <a:rPr lang="en-US" sz="4400" dirty="0" smtClean="0"/>
+              <a:t>Install a Tool</a:t>
+            </a:r>
+            <a:endParaRPr lang="en-US" sz="4400" dirty="0"/>
+          </a:p>
+        </p:txBody>
+      </p:sp>
     </p:spTree>
   </p:cSld>
   <p:clrMapOvr>
@@ -3883,14 +4975,14 @@
   <p:timing>
     <p:tnLst>
       <p:par>
-        <p:cTn id="1" dur="indefinite" restart="never" nodeType="tmRoot"/>
+        <p:cTn xmlns:p14="http://schemas.microsoft.com/office/powerpoint/2010/main" id="1" dur="indefinite" restart="never" nodeType="tmRoot"/>
       </p:par>
     </p:tnLst>
   </p:timing>
 </p:sld>
 </file>
 
-<file path=ppt/slides/slide10.xml><?xml version="1.0" encoding="utf-8"?>
+<file path=ppt/slides/slide12.xml><?xml version="1.0" encoding="utf-8"?>
 <p:sld xmlns:a="http://schemas.openxmlformats.org/drawingml/2006/main" xmlns:r="http://schemas.openxmlformats.org/officeDocument/2006/relationships" xmlns:p="http://schemas.openxmlformats.org/presentationml/2006/main">
   <p:cSld>
     <p:spTree>
@@ -4006,14 +5098,14 @@
           </a:ln>
           <a:effectLst/>
           <a:extLst>
-            <a:ext uri="{909E8E84-426E-40DD-AFC4-6F175D3DCCD1}">
+            <a:ext uri="{909E8E84-426E-40dd-AFC4-6F175D3DCCD1}">
               <a14:hiddenFill xmlns:a14="http://schemas.microsoft.com/office/drawing/2010/main">
                 <a:solidFill>
                   <a:schemeClr val="accent1"/>
                 </a:solidFill>
               </a14:hiddenFill>
             </a:ext>
-            <a:ext uri="{91240B29-F687-4F45-9708-019B960494DF}">
+            <a:ext uri="{91240B29-F687-4f45-9708-019B960494DF}">
               <a14:hiddenLine xmlns:a14="http://schemas.microsoft.com/office/drawing/2010/main" w="9525">
                 <a:solidFill>
                   <a:schemeClr val="tx1"/>
@@ -4023,7 +5115,7 @@
                 <a:tailEnd/>
               </a14:hiddenLine>
             </a:ext>
-            <a:ext uri="{AF507438-7753-43E0-B8FC-AC1667EBCBE1}">
+            <a:ext uri="{AF507438-7753-43e0-B8FC-AC1667EBCBE1}">
               <a14:hiddenEffects xmlns:a14="http://schemas.microsoft.com/office/drawing/2010/main">
                 <a:effectLst>
                   <a:outerShdw dist="35921" dir="2700000" algn="ctr" rotWithShape="0">
@@ -4048,14 +5140,14 @@
   <p:timing>
     <p:tnLst>
       <p:par>
-        <p:cTn id="1" dur="indefinite" restart="never" nodeType="tmRoot"/>
+        <p:cTn xmlns:p14="http://schemas.microsoft.com/office/powerpoint/2010/main" id="1" dur="indefinite" restart="never" nodeType="tmRoot"/>
       </p:par>
     </p:tnLst>
   </p:timing>
 </p:sld>
 </file>
 
-<file path=ppt/slides/slide11.xml><?xml version="1.0" encoding="utf-8"?>
+<file path=ppt/slides/slide13.xml><?xml version="1.0" encoding="utf-8"?>
 <p:sld xmlns:a="http://schemas.openxmlformats.org/drawingml/2006/main" xmlns:r="http://schemas.openxmlformats.org/officeDocument/2006/relationships" xmlns:p="http://schemas.openxmlformats.org/presentationml/2006/main">
   <p:cSld>
     <p:spTree>
@@ -4142,14 +5234,14 @@
           </a:ln>
           <a:effectLst/>
           <a:extLst>
-            <a:ext uri="{909E8E84-426E-40DD-AFC4-6F175D3DCCD1}">
+            <a:ext uri="{909E8E84-426E-40dd-AFC4-6F175D3DCCD1}">
               <a14:hiddenFill xmlns:a14="http://schemas.microsoft.com/office/drawing/2010/main">
                 <a:solidFill>
                   <a:schemeClr val="accent1"/>
                 </a:solidFill>
               </a14:hiddenFill>
             </a:ext>
-            <a:ext uri="{91240B29-F687-4F45-9708-019B960494DF}">
+            <a:ext uri="{91240B29-F687-4f45-9708-019B960494DF}">
               <a14:hiddenLine xmlns:a14="http://schemas.microsoft.com/office/drawing/2010/main" w="9525">
                 <a:solidFill>
                   <a:schemeClr val="tx1"/>
@@ -4159,7 +5251,7 @@
                 <a:tailEnd/>
               </a14:hiddenLine>
             </a:ext>
-            <a:ext uri="{AF507438-7753-43E0-B8FC-AC1667EBCBE1}">
+            <a:ext uri="{AF507438-7753-43e0-B8FC-AC1667EBCBE1}">
               <a14:hiddenEffects xmlns:a14="http://schemas.microsoft.com/office/drawing/2010/main">
                 <a:effectLst>
                   <a:outerShdw dist="35921" dir="2700000" algn="ctr" rotWithShape="0">
@@ -4206,14 +5298,14 @@
           </a:ln>
           <a:effectLst/>
           <a:extLst>
-            <a:ext uri="{909E8E84-426E-40DD-AFC4-6F175D3DCCD1}">
+            <a:ext uri="{909E8E84-426E-40dd-AFC4-6F175D3DCCD1}">
               <a14:hiddenFill xmlns:a14="http://schemas.microsoft.com/office/drawing/2010/main">
                 <a:solidFill>
                   <a:schemeClr val="accent1"/>
                 </a:solidFill>
               </a14:hiddenFill>
             </a:ext>
-            <a:ext uri="{91240B29-F687-4F45-9708-019B960494DF}">
+            <a:ext uri="{91240B29-F687-4f45-9708-019B960494DF}">
               <a14:hiddenLine xmlns:a14="http://schemas.microsoft.com/office/drawing/2010/main" w="9525">
                 <a:solidFill>
                   <a:schemeClr val="tx1"/>
@@ -4223,7 +5315,7 @@
                 <a:tailEnd/>
               </a14:hiddenLine>
             </a:ext>
-            <a:ext uri="{AF507438-7753-43E0-B8FC-AC1667EBCBE1}">
+            <a:ext uri="{AF507438-7753-43e0-B8FC-AC1667EBCBE1}">
               <a14:hiddenEffects xmlns:a14="http://schemas.microsoft.com/office/drawing/2010/main">
                 <a:effectLst>
                   <a:outerShdw dist="35921" dir="2700000" algn="ctr" rotWithShape="0">
@@ -4274,14 +5366,14 @@
   <p:timing>
     <p:tnLst>
       <p:par>
-        <p:cTn id="1" dur="indefinite" restart="never" nodeType="tmRoot"/>
+        <p:cTn xmlns:p14="http://schemas.microsoft.com/office/powerpoint/2010/main" id="1" dur="indefinite" restart="never" nodeType="tmRoot"/>
       </p:par>
     </p:tnLst>
   </p:timing>
 </p:sld>
 </file>
 
-<file path=ppt/slides/slide12.xml><?xml version="1.0" encoding="utf-8"?>
+<file path=ppt/slides/slide14.xml><?xml version="1.0" encoding="utf-8"?>
 <p:sld xmlns:a="http://schemas.openxmlformats.org/drawingml/2006/main" xmlns:r="http://schemas.openxmlformats.org/officeDocument/2006/relationships" xmlns:p="http://schemas.openxmlformats.org/presentationml/2006/main">
   <p:cSld>
     <p:spTree>
@@ -4397,14 +5489,14 @@
           </a:ln>
           <a:effectLst/>
           <a:extLst>
-            <a:ext uri="{909E8E84-426E-40DD-AFC4-6F175D3DCCD1}">
+            <a:ext uri="{909E8E84-426E-40dd-AFC4-6F175D3DCCD1}">
               <a14:hiddenFill xmlns:a14="http://schemas.microsoft.com/office/drawing/2010/main">
                 <a:solidFill>
                   <a:schemeClr val="accent1"/>
                 </a:solidFill>
               </a14:hiddenFill>
             </a:ext>
-            <a:ext uri="{91240B29-F687-4F45-9708-019B960494DF}">
+            <a:ext uri="{91240B29-F687-4f45-9708-019B960494DF}">
               <a14:hiddenLine xmlns:a14="http://schemas.microsoft.com/office/drawing/2010/main" w="9525">
                 <a:solidFill>
                   <a:schemeClr val="tx1"/>
@@ -4414,7 +5506,7 @@
                 <a:tailEnd/>
               </a14:hiddenLine>
             </a:ext>
-            <a:ext uri="{AF507438-7753-43E0-B8FC-AC1667EBCBE1}">
+            <a:ext uri="{AF507438-7753-43e0-B8FC-AC1667EBCBE1}">
               <a14:hiddenEffects xmlns:a14="http://schemas.microsoft.com/office/drawing/2010/main">
                 <a:effectLst>
                   <a:outerShdw dist="35921" dir="2700000" algn="ctr" rotWithShape="0">
@@ -4439,235 +5531,7 @@
   <p:timing>
     <p:tnLst>
       <p:par>
-        <p:cTn id="1" dur="indefinite" restart="never" nodeType="tmRoot"/>
-      </p:par>
-    </p:tnLst>
-  </p:timing>
-</p:sld>
-</file>
-
-<file path=ppt/slides/slide13.xml><?xml version="1.0" encoding="utf-8"?>
-<p:sld xmlns:a="http://schemas.openxmlformats.org/drawingml/2006/main" xmlns:r="http://schemas.openxmlformats.org/officeDocument/2006/relationships" xmlns:p="http://schemas.openxmlformats.org/presentationml/2006/main">
-  <p:cSld>
-    <p:spTree>
-      <p:nvGrpSpPr>
-        <p:cNvPr id="1" name=""/>
-        <p:cNvGrpSpPr/>
-        <p:nvPr/>
-      </p:nvGrpSpPr>
-      <p:grpSpPr>
-        <a:xfrm>
-          <a:off x="0" y="0"/>
-          <a:ext cx="0" cy="0"/>
-          <a:chOff x="0" y="0"/>
-          <a:chExt cx="0" cy="0"/>
-        </a:xfrm>
-      </p:grpSpPr>
-      <p:sp>
-        <p:nvSpPr>
-          <p:cNvPr id="2" name="Title 1"/>
-          <p:cNvSpPr>
-            <a:spLocks noGrp="1"/>
-          </p:cNvSpPr>
-          <p:nvPr>
-            <p:ph type="title"/>
-          </p:nvPr>
-        </p:nvSpPr>
-        <p:spPr/>
-        <p:txBody>
-          <a:bodyPr/>
-          <a:lstStyle/>
-          <a:p>
-            <a:r>
-              <a:rPr lang="en-US" dirty="0" smtClean="0"/>
-              <a:t>What can I install?</a:t>
-            </a:r>
-            <a:endParaRPr lang="en-US" dirty="0"/>
-          </a:p>
-        </p:txBody>
-      </p:sp>
-      <p:sp>
-        <p:nvSpPr>
-          <p:cNvPr id="3" name="Content Placeholder 2"/>
-          <p:cNvSpPr>
-            <a:spLocks noGrp="1"/>
-          </p:cNvSpPr>
-          <p:nvPr>
-            <p:ph idx="1"/>
-          </p:nvPr>
-        </p:nvSpPr>
-        <p:spPr/>
-        <p:txBody>
-          <a:bodyPr/>
-          <a:lstStyle/>
-          <a:p>
-            <a:r>
-              <a:rPr lang="en-US" dirty="0" err="1"/>
-              <a:t>c</a:t>
-            </a:r>
-            <a:r>
-              <a:rPr lang="en-US" dirty="0" err="1" smtClean="0"/>
-              <a:t>list</a:t>
-            </a:r>
-            <a:r>
-              <a:rPr lang="en-US" dirty="0" smtClean="0"/>
-              <a:t> (chocolatey list) </a:t>
-            </a:r>
-            <a:r>
-              <a:rPr lang="en-US" i="1" dirty="0" err="1" smtClean="0"/>
-              <a:t>searchTerm</a:t>
-            </a:r>
-            <a:endParaRPr lang="en-US" i="1" dirty="0" smtClean="0"/>
-          </a:p>
-          <a:p>
-            <a:r>
-              <a:rPr lang="en-US" dirty="0" smtClean="0"/>
-              <a:t>Chocolatey.org</a:t>
-            </a:r>
-          </a:p>
-          <a:p>
-            <a:r>
-              <a:rPr lang="en-US" dirty="0" smtClean="0"/>
-              <a:t>Nuget.org</a:t>
-            </a:r>
-          </a:p>
-          <a:p>
-            <a:r>
-              <a:rPr lang="en-US" dirty="0" err="1" smtClean="0"/>
-              <a:t>Myget</a:t>
-            </a:r>
-            <a:r>
-              <a:rPr lang="en-US" dirty="0" smtClean="0"/>
-              <a:t> feeds</a:t>
-            </a:r>
-          </a:p>
-          <a:p>
-            <a:r>
-              <a:rPr lang="en-US" dirty="0" smtClean="0"/>
-              <a:t>File shares</a:t>
-            </a:r>
-          </a:p>
-          <a:p>
-            <a:endParaRPr lang="en-US" dirty="0"/>
-          </a:p>
-        </p:txBody>
-      </p:sp>
-    </p:spTree>
-    <p:extLst>
-      <p:ext uri="{BB962C8B-B14F-4D97-AF65-F5344CB8AC3E}">
-        <p14:creationId xmlns:p14="http://schemas.microsoft.com/office/powerpoint/2010/main" val="639419945"/>
-      </p:ext>
-    </p:extLst>
-  </p:cSld>
-  <p:clrMapOvr>
-    <a:masterClrMapping/>
-  </p:clrMapOvr>
-  <p:timing>
-    <p:tnLst>
-      <p:par>
-        <p:cTn id="1" dur="indefinite" restart="never" nodeType="tmRoot"/>
-      </p:par>
-    </p:tnLst>
-  </p:timing>
-</p:sld>
-</file>
-
-<file path=ppt/slides/slide14.xml><?xml version="1.0" encoding="utf-8"?>
-<p:sld xmlns:a="http://schemas.openxmlformats.org/drawingml/2006/main" xmlns:r="http://schemas.openxmlformats.org/officeDocument/2006/relationships" xmlns:p="http://schemas.openxmlformats.org/presentationml/2006/main">
-  <p:cSld>
-    <p:spTree>
-      <p:nvGrpSpPr>
-        <p:cNvPr id="1" name=""/>
-        <p:cNvGrpSpPr/>
-        <p:nvPr/>
-      </p:nvGrpSpPr>
-      <p:grpSpPr>
-        <a:xfrm>
-          <a:off x="0" y="0"/>
-          <a:ext cx="0" cy="0"/>
-          <a:chOff x="0" y="0"/>
-          <a:chExt cx="0" cy="0"/>
-        </a:xfrm>
-      </p:grpSpPr>
-      <p:sp>
-        <p:nvSpPr>
-          <p:cNvPr id="2" name="Title 1"/>
-          <p:cNvSpPr>
-            <a:spLocks noGrp="1"/>
-          </p:cNvSpPr>
-          <p:nvPr>
-            <p:ph type="title"/>
-          </p:nvPr>
-        </p:nvSpPr>
-        <p:spPr/>
-        <p:txBody>
-          <a:bodyPr/>
-          <a:lstStyle/>
-          <a:p>
-            <a:r>
-              <a:rPr lang="en-US" dirty="0" err="1" smtClean="0"/>
-              <a:t>Chocolatey</a:t>
-            </a:r>
-            <a:r>
-              <a:rPr lang="en-US" dirty="0" smtClean="0"/>
-              <a:t> Update</a:t>
-            </a:r>
-            <a:endParaRPr lang="en-US" dirty="0"/>
-          </a:p>
-        </p:txBody>
-      </p:sp>
-      <p:sp>
-        <p:nvSpPr>
-          <p:cNvPr id="3" name="Content Placeholder 2"/>
-          <p:cNvSpPr>
-            <a:spLocks noGrp="1"/>
-          </p:cNvSpPr>
-          <p:nvPr>
-            <p:ph idx="1"/>
-          </p:nvPr>
-        </p:nvSpPr>
-        <p:spPr/>
-        <p:txBody>
-          <a:bodyPr/>
-          <a:lstStyle/>
-          <a:p>
-            <a:r>
-              <a:rPr lang="en-US" dirty="0" smtClean="0"/>
-              <a:t>cup </a:t>
-            </a:r>
-            <a:r>
-              <a:rPr lang="en-US" dirty="0" err="1" smtClean="0"/>
-              <a:t>SomePackage</a:t>
-            </a:r>
-            <a:endParaRPr lang="en-US" dirty="0" smtClean="0"/>
-          </a:p>
-          <a:p>
-            <a:r>
-              <a:rPr lang="en-US" dirty="0"/>
-              <a:t>c</a:t>
-            </a:r>
-            <a:r>
-              <a:rPr lang="en-US" dirty="0" smtClean="0"/>
-              <a:t>up all</a:t>
-            </a:r>
-            <a:endParaRPr lang="en-US" dirty="0"/>
-          </a:p>
-        </p:txBody>
-      </p:sp>
-    </p:spTree>
-    <p:extLst>
-      <p:ext uri="{BB962C8B-B14F-4D97-AF65-F5344CB8AC3E}">
-        <p14:creationId xmlns:p14="http://schemas.microsoft.com/office/powerpoint/2010/main" val="3105525598"/>
-      </p:ext>
-    </p:extLst>
-  </p:cSld>
-  <p:clrMapOvr>
-    <a:masterClrMapping/>
-  </p:clrMapOvr>
-  <p:timing>
-    <p:tnLst>
-      <p:par>
-        <p:cTn id="1" dur="indefinite" restart="never" nodeType="tmRoot"/>
+        <p:cTn xmlns:p14="http://schemas.microsoft.com/office/powerpoint/2010/main" id="1" dur="indefinite" restart="never" nodeType="tmRoot"/>
       </p:par>
     </p:tnLst>
   </p:timing>
@@ -4708,7 +5572,7 @@
           <a:p>
             <a:r>
               <a:rPr lang="en-US" dirty="0" smtClean="0"/>
-              <a:t>Uninstall?</a:t>
+              <a:t>What can I install?</a:t>
             </a:r>
             <a:endParaRPr lang="en-US" dirty="0"/>
           </a:p>
@@ -4730,15 +5594,52 @@
           <a:lstStyle/>
           <a:p>
             <a:r>
-              <a:rPr lang="en-US" dirty="0" smtClean="0"/>
-              <a:t>Yep, chocolatey uninstall</a:t>
-            </a:r>
-          </a:p>
-          <a:p>
+              <a:rPr lang="en-US" dirty="0" err="1"/>
+              <a:t>c</a:t>
+            </a:r>
             <a:r>
               <a:rPr lang="en-US" dirty="0" err="1" smtClean="0"/>
-              <a:t>cuninst</a:t>
-            </a:r>
+              <a:t>list</a:t>
+            </a:r>
+            <a:r>
+              <a:rPr lang="en-US" dirty="0" smtClean="0"/>
+              <a:t> (chocolatey list) </a:t>
+            </a:r>
+            <a:r>
+              <a:rPr lang="en-US" i="1" dirty="0" err="1" smtClean="0"/>
+              <a:t>searchTerm</a:t>
+            </a:r>
+            <a:endParaRPr lang="en-US" i="1" dirty="0" smtClean="0"/>
+          </a:p>
+          <a:p>
+            <a:r>
+              <a:rPr lang="en-US" dirty="0" smtClean="0"/>
+              <a:t>Chocolatey.org</a:t>
+            </a:r>
+          </a:p>
+          <a:p>
+            <a:r>
+              <a:rPr lang="en-US" dirty="0" smtClean="0"/>
+              <a:t>Nuget.org</a:t>
+            </a:r>
+          </a:p>
+          <a:p>
+            <a:r>
+              <a:rPr lang="en-US" dirty="0" err="1" smtClean="0"/>
+              <a:t>Myget</a:t>
+            </a:r>
+            <a:r>
+              <a:rPr lang="en-US" dirty="0" smtClean="0"/>
+              <a:t> feeds</a:t>
+            </a:r>
+          </a:p>
+          <a:p>
+            <a:r>
+              <a:rPr lang="en-US" dirty="0" smtClean="0"/>
+              <a:t>File shares</a:t>
+            </a:r>
+          </a:p>
+          <a:p>
             <a:endParaRPr lang="en-US" dirty="0"/>
           </a:p>
         </p:txBody>
@@ -4746,7 +5647,7 @@
     </p:spTree>
     <p:extLst>
       <p:ext uri="{BB962C8B-B14F-4D97-AF65-F5344CB8AC3E}">
-        <p14:creationId xmlns:p14="http://schemas.microsoft.com/office/powerpoint/2010/main" val="2762078966"/>
+        <p14:creationId xmlns:p14="http://schemas.microsoft.com/office/powerpoint/2010/main" val="639419945"/>
       </p:ext>
     </p:extLst>
   </p:cSld>
@@ -4756,7 +5657,7 @@
   <p:timing>
     <p:tnLst>
       <p:par>
-        <p:cTn id="1" dur="indefinite" restart="never" nodeType="tmRoot"/>
+        <p:cTn xmlns:p14="http://schemas.microsoft.com/office/powerpoint/2010/main" id="1" dur="indefinite" restart="never" nodeType="tmRoot"/>
       </p:par>
     </p:tnLst>
   </p:timing>
@@ -4790,25 +5691,67 @@
             <p:ph type="title"/>
           </p:nvPr>
         </p:nvSpPr>
-        <p:spPr>
-          <a:xfrm>
-            <a:off x="457200" y="2857500"/>
-            <a:ext cx="8229600" cy="1143000"/>
-          </a:xfrm>
-        </p:spPr>
-        <p:txBody>
-          <a:bodyPr/>
-          <a:lstStyle/>
-          <a:p>
-            <a:r>
-              <a:rPr lang="en-US" dirty="0" smtClean="0"/>
-              <a:t>Demo</a:t>
+        <p:spPr/>
+        <p:txBody>
+          <a:bodyPr/>
+          <a:lstStyle/>
+          <a:p>
+            <a:r>
+              <a:rPr lang="en-US" dirty="0" err="1" smtClean="0"/>
+              <a:t>Chocolatey</a:t>
+            </a:r>
+            <a:r>
+              <a:rPr lang="en-US" dirty="0" smtClean="0"/>
+              <a:t> Update</a:t>
             </a:r>
             <a:endParaRPr lang="en-US" dirty="0"/>
           </a:p>
         </p:txBody>
       </p:sp>
+      <p:sp>
+        <p:nvSpPr>
+          <p:cNvPr id="3" name="Content Placeholder 2"/>
+          <p:cNvSpPr>
+            <a:spLocks noGrp="1"/>
+          </p:cNvSpPr>
+          <p:nvPr>
+            <p:ph idx="1"/>
+          </p:nvPr>
+        </p:nvSpPr>
+        <p:spPr/>
+        <p:txBody>
+          <a:bodyPr/>
+          <a:lstStyle/>
+          <a:p>
+            <a:r>
+              <a:rPr lang="en-US" dirty="0" smtClean="0"/>
+              <a:t>cup </a:t>
+            </a:r>
+            <a:r>
+              <a:rPr lang="en-US" dirty="0" err="1" smtClean="0"/>
+              <a:t>SomePackage</a:t>
+            </a:r>
+            <a:endParaRPr lang="en-US" dirty="0" smtClean="0"/>
+          </a:p>
+          <a:p>
+            <a:r>
+              <a:rPr lang="en-US" dirty="0"/>
+              <a:t>c</a:t>
+            </a:r>
+            <a:r>
+              <a:rPr lang="en-US" dirty="0" smtClean="0"/>
+              <a:t>up all</a:t>
+            </a:r>
+            <a:endParaRPr lang="en-US" dirty="0"/>
+          </a:p>
+        </p:txBody>
+      </p:sp>
     </p:spTree>
+    <p:extLst>
+      <p:ext uri="{BB962C8B-B14F-4D97-AF65-F5344CB8AC3E}">
+        <p14:creationId xmlns:p14="http://schemas.microsoft.com/office/powerpoint/2010/main" val="3105525598"/>
+      </p:ext>
+    </p:extLst>
   </p:cSld>
   <p:clrMapOvr>
     <a:masterClrMapping/>
@@ -4816,7 +5759,7 @@
   <p:timing>
     <p:tnLst>
       <p:par>
-        <p:cTn id="1" dur="indefinite" restart="never" nodeType="tmRoot"/>
+        <p:cTn xmlns:p14="http://schemas.microsoft.com/office/powerpoint/2010/main" id="1" dur="indefinite" restart="never" nodeType="tmRoot"/>
       </p:par>
     </p:tnLst>
   </p:timing>
@@ -4857,7 +5800,7 @@
           <a:p>
             <a:r>
               <a:rPr lang="en-US" dirty="0" smtClean="0"/>
-              <a:t>Scripting</a:t>
+              <a:t>Uninstall?</a:t>
             </a:r>
             <a:endParaRPr lang="en-US" dirty="0"/>
           </a:p>
@@ -4879,55 +5822,14 @@
           <a:lstStyle/>
           <a:p>
             <a:r>
+              <a:rPr lang="en-US" dirty="0" smtClean="0"/>
+              <a:t>Yep, chocolatey uninstall</a:t>
+            </a:r>
+          </a:p>
+          <a:p>
+            <a:r>
               <a:rPr lang="en-US" dirty="0" err="1" smtClean="0"/>
-              <a:t>Packages.config</a:t>
-            </a:r>
-            <a:endParaRPr lang="en-US" dirty="0" smtClean="0"/>
-          </a:p>
-          <a:p>
-            <a:r>
-              <a:rPr lang="en-US" dirty="0" smtClean="0"/>
-              <a:t>setup.ps1 – set up an full </a:t>
-            </a:r>
-            <a:r>
-              <a:rPr lang="en-US" dirty="0" err="1" smtClean="0"/>
-              <a:t>Dev</a:t>
-            </a:r>
-            <a:r>
-              <a:rPr lang="en-US" dirty="0" smtClean="0"/>
-              <a:t> environment!</a:t>
-            </a:r>
-          </a:p>
-          <a:p>
-            <a:pPr lvl="1"/>
-            <a:r>
-              <a:rPr lang="en-US" dirty="0" smtClean="0"/>
-              <a:t>Someone needs Ruby for Rake? Install it</a:t>
-            </a:r>
-          </a:p>
-          <a:p>
-            <a:pPr lvl="1"/>
-            <a:r>
-              <a:rPr lang="en-US" dirty="0" err="1" smtClean="0"/>
-              <a:t>SQLExpress</a:t>
-            </a:r>
-            <a:r>
-              <a:rPr lang="en-US" dirty="0" smtClean="0"/>
-              <a:t>? Install it</a:t>
-            </a:r>
-          </a:p>
-          <a:p>
-            <a:pPr lvl="1"/>
-            <a:r>
-              <a:rPr lang="en-US" dirty="0" smtClean="0"/>
-              <a:t>Visual Studio? Install it</a:t>
-            </a:r>
-          </a:p>
-          <a:p>
-            <a:pPr lvl="1"/>
-            <a:r>
-              <a:rPr lang="en-US" dirty="0" smtClean="0"/>
-              <a:t>Check setup.ps1 into source control</a:t>
+              <a:t>cuninst</a:t>
             </a:r>
             <a:endParaRPr lang="en-US" dirty="0"/>
           </a:p>
@@ -4936,7 +5838,7 @@
     </p:spTree>
     <p:extLst>
       <p:ext uri="{BB962C8B-B14F-4D97-AF65-F5344CB8AC3E}">
-        <p14:creationId xmlns:p14="http://schemas.microsoft.com/office/powerpoint/2010/main" val="433458225"/>
+        <p14:creationId xmlns:p14="http://schemas.microsoft.com/office/powerpoint/2010/main" val="2762078966"/>
       </p:ext>
     </p:extLst>
   </p:cSld>
@@ -4946,7 +5848,7 @@
   <p:timing>
     <p:tnLst>
       <p:par>
-        <p:cTn id="1" dur="indefinite" restart="never" nodeType="tmRoot"/>
+        <p:cTn xmlns:p14="http://schemas.microsoft.com/office/powerpoint/2010/main" id="1" dur="indefinite" restart="never" nodeType="tmRoot"/>
       </p:par>
     </p:tnLst>
   </p:timing>
@@ -4999,6 +5901,314 @@
         </p:txBody>
       </p:sp>
     </p:spTree>
+  </p:cSld>
+  <p:clrMapOvr>
+    <a:masterClrMapping/>
+  </p:clrMapOvr>
+  <p:timing>
+    <p:tnLst>
+      <p:par>
+        <p:cTn xmlns:p14="http://schemas.microsoft.com/office/powerpoint/2010/main" id="1" dur="indefinite" restart="never" nodeType="tmRoot"/>
+      </p:par>
+    </p:tnLst>
+  </p:timing>
+</p:sld>
+</file>
+
+<file path=ppt/slides/slide19.xml><?xml version="1.0" encoding="utf-8"?>
+<p:sld xmlns:a="http://schemas.openxmlformats.org/drawingml/2006/main" xmlns:r="http://schemas.openxmlformats.org/officeDocument/2006/relationships" xmlns:p="http://schemas.openxmlformats.org/presentationml/2006/main">
+  <p:cSld>
+    <p:spTree>
+      <p:nvGrpSpPr>
+        <p:cNvPr id="1" name=""/>
+        <p:cNvGrpSpPr/>
+        <p:nvPr/>
+      </p:nvGrpSpPr>
+      <p:grpSpPr>
+        <a:xfrm>
+          <a:off x="0" y="0"/>
+          <a:ext cx="0" cy="0"/>
+          <a:chOff x="0" y="0"/>
+          <a:chExt cx="0" cy="0"/>
+        </a:xfrm>
+      </p:grpSpPr>
+      <p:sp>
+        <p:nvSpPr>
+          <p:cNvPr id="2" name="Title 1"/>
+          <p:cNvSpPr>
+            <a:spLocks noGrp="1"/>
+          </p:cNvSpPr>
+          <p:nvPr>
+            <p:ph type="title"/>
+          </p:nvPr>
+        </p:nvSpPr>
+        <p:spPr/>
+        <p:txBody>
+          <a:bodyPr/>
+          <a:lstStyle/>
+          <a:p>
+            <a:r>
+              <a:rPr lang="en-US" dirty="0" smtClean="0"/>
+              <a:t>Scripting</a:t>
+            </a:r>
+            <a:endParaRPr lang="en-US" dirty="0"/>
+          </a:p>
+        </p:txBody>
+      </p:sp>
+      <p:sp>
+        <p:nvSpPr>
+          <p:cNvPr id="3" name="Content Placeholder 2"/>
+          <p:cNvSpPr>
+            <a:spLocks noGrp="1"/>
+          </p:cNvSpPr>
+          <p:nvPr>
+            <p:ph idx="1"/>
+          </p:nvPr>
+        </p:nvSpPr>
+        <p:spPr/>
+        <p:txBody>
+          <a:bodyPr/>
+          <a:lstStyle/>
+          <a:p>
+            <a:r>
+              <a:rPr lang="en-US" dirty="0" err="1" smtClean="0"/>
+              <a:t>Packages.config</a:t>
+            </a:r>
+            <a:endParaRPr lang="en-US" dirty="0" smtClean="0"/>
+          </a:p>
+          <a:p>
+            <a:r>
+              <a:rPr lang="en-US" dirty="0" smtClean="0"/>
+              <a:t>setup.ps1 – set up an full </a:t>
+            </a:r>
+            <a:r>
+              <a:rPr lang="en-US" dirty="0" err="1" smtClean="0"/>
+              <a:t>Dev</a:t>
+            </a:r>
+            <a:r>
+              <a:rPr lang="en-US" dirty="0" smtClean="0"/>
+              <a:t> environment!</a:t>
+            </a:r>
+          </a:p>
+          <a:p>
+            <a:pPr lvl="1"/>
+            <a:r>
+              <a:rPr lang="en-US" dirty="0" smtClean="0"/>
+              <a:t>Someone needs Ruby for Rake? Install it</a:t>
+            </a:r>
+          </a:p>
+          <a:p>
+            <a:pPr lvl="1"/>
+            <a:r>
+              <a:rPr lang="en-US" dirty="0" err="1" smtClean="0"/>
+              <a:t>SQLExpress</a:t>
+            </a:r>
+            <a:r>
+              <a:rPr lang="en-US" dirty="0" smtClean="0"/>
+              <a:t>? Install it</a:t>
+            </a:r>
+          </a:p>
+          <a:p>
+            <a:pPr lvl="1"/>
+            <a:r>
+              <a:rPr lang="en-US" dirty="0" smtClean="0"/>
+              <a:t>Visual Studio? Install it</a:t>
+            </a:r>
+          </a:p>
+          <a:p>
+            <a:pPr lvl="1"/>
+            <a:r>
+              <a:rPr lang="en-US" dirty="0" smtClean="0"/>
+              <a:t>Check setup.ps1 into source control</a:t>
+            </a:r>
+            <a:endParaRPr lang="en-US" dirty="0"/>
+          </a:p>
+        </p:txBody>
+      </p:sp>
+    </p:spTree>
+    <p:extLst>
+      <p:ext uri="{BB962C8B-B14F-4D97-AF65-F5344CB8AC3E}">
+        <p14:creationId xmlns:p14="http://schemas.microsoft.com/office/powerpoint/2010/main" val="433458225"/>
+      </p:ext>
+    </p:extLst>
+  </p:cSld>
+  <p:clrMapOvr>
+    <a:masterClrMapping/>
+  </p:clrMapOvr>
+  <p:timing>
+    <p:tnLst>
+      <p:par>
+        <p:cTn xmlns:p14="http://schemas.microsoft.com/office/powerpoint/2010/main" id="1" dur="indefinite" restart="never" nodeType="tmRoot"/>
+      </p:par>
+    </p:tnLst>
+  </p:timing>
+</p:sld>
+</file>
+
+<file path=ppt/slides/slide2.xml><?xml version="1.0" encoding="utf-8"?>
+<p:sld xmlns:a="http://schemas.openxmlformats.org/drawingml/2006/main" xmlns:r="http://schemas.openxmlformats.org/officeDocument/2006/relationships" xmlns:p="http://schemas.openxmlformats.org/presentationml/2006/main">
+  <p:cSld>
+    <p:spTree>
+      <p:nvGrpSpPr>
+        <p:cNvPr id="1" name=""/>
+        <p:cNvGrpSpPr/>
+        <p:nvPr/>
+      </p:nvGrpSpPr>
+      <p:grpSpPr>
+        <a:xfrm>
+          <a:off x="0" y="0"/>
+          <a:ext cx="0" cy="0"/>
+          <a:chOff x="0" y="0"/>
+          <a:chExt cx="0" cy="0"/>
+        </a:xfrm>
+      </p:grpSpPr>
+      <p:sp>
+        <p:nvSpPr>
+          <p:cNvPr id="2" name="Title 1"/>
+          <p:cNvSpPr>
+            <a:spLocks noGrp="1"/>
+          </p:cNvSpPr>
+          <p:nvPr>
+            <p:ph type="ctrTitle"/>
+          </p:nvPr>
+        </p:nvSpPr>
+        <p:spPr>
+          <a:xfrm>
+            <a:off x="685800" y="1371600"/>
+            <a:ext cx="7772400" cy="1470025"/>
+          </a:xfrm>
+        </p:spPr>
+        <p:txBody>
+          <a:bodyPr/>
+          <a:lstStyle/>
+          <a:p>
+            <a:r>
+              <a:rPr lang="en-US" dirty="0" smtClean="0"/>
+              <a:t>Chocolatey goodness - what…</a:t>
+            </a:r>
+            <a:endParaRPr lang="en-US" dirty="0"/>
+          </a:p>
+        </p:txBody>
+      </p:sp>
+      <p:sp>
+        <p:nvSpPr>
+          <p:cNvPr id="3" name="Subtitle 2"/>
+          <p:cNvSpPr>
+            <a:spLocks noGrp="1"/>
+          </p:cNvSpPr>
+          <p:nvPr>
+            <p:ph type="subTitle" idx="1"/>
+          </p:nvPr>
+        </p:nvSpPr>
+        <p:spPr>
+          <a:xfrm>
+            <a:off x="1371600" y="2895600"/>
+            <a:ext cx="6400800" cy="914400"/>
+          </a:xfrm>
+        </p:spPr>
+        <p:txBody>
+          <a:bodyPr/>
+          <a:lstStyle/>
+          <a:p>
+            <a:r>
+              <a:rPr lang="en-US" dirty="0" smtClean="0"/>
+              <a:t>Rob Reynolds</a:t>
+            </a:r>
+            <a:endParaRPr lang="en-US" dirty="0"/>
+          </a:p>
+        </p:txBody>
+      </p:sp>
+      <p:pic>
+        <p:nvPicPr>
+          <p:cNvPr id="4" name="Picture 3"/>
+          <p:cNvPicPr>
+            <a:picLocks noChangeAspect="1"/>
+          </p:cNvPicPr>
+          <p:nvPr/>
+        </p:nvPicPr>
+        <p:blipFill>
+          <a:blip r:embed="rId2">
+            <a:extLst>
+              <a:ext uri="{28A0092B-C50C-407E-A947-70E740481C1C}">
+                <a14:useLocalDpi xmlns:a14="http://schemas.microsoft.com/office/drawing/2010/main" val="0"/>
+              </a:ext>
+            </a:extLst>
+          </a:blip>
+          <a:stretch>
+            <a:fillRect/>
+          </a:stretch>
+        </p:blipFill>
+        <p:spPr>
+          <a:xfrm>
+            <a:off x="2981325" y="3657600"/>
+            <a:ext cx="3181350" cy="2876550"/>
+          </a:xfrm>
+          <a:prstGeom prst="rect">
+            <a:avLst/>
+          </a:prstGeom>
+        </p:spPr>
+      </p:pic>
+    </p:spTree>
+  </p:cSld>
+  <p:clrMapOvr>
+    <a:masterClrMapping/>
+  </p:clrMapOvr>
+  <p:timing>
+    <p:tnLst>
+      <p:par>
+        <p:cTn xmlns:p14="http://schemas.microsoft.com/office/powerpoint/2010/main" id="1" dur="indefinite" restart="never" nodeType="tmRoot"/>
+      </p:par>
+    </p:tnLst>
+  </p:timing>
+</p:sld>
+</file>
+
+<file path=ppt/slides/slide20.xml><?xml version="1.0" encoding="utf-8"?>
+<p:sld xmlns:a="http://schemas.openxmlformats.org/drawingml/2006/main" xmlns:r="http://schemas.openxmlformats.org/officeDocument/2006/relationships" xmlns:p="http://schemas.openxmlformats.org/presentationml/2006/main">
+  <p:cSld>
+    <p:spTree>
+      <p:nvGrpSpPr>
+        <p:cNvPr id="1" name=""/>
+        <p:cNvGrpSpPr/>
+        <p:nvPr/>
+      </p:nvGrpSpPr>
+      <p:grpSpPr>
+        <a:xfrm>
+          <a:off x="0" y="0"/>
+          <a:ext cx="0" cy="0"/>
+          <a:chOff x="0" y="0"/>
+          <a:chExt cx="0" cy="0"/>
+        </a:xfrm>
+      </p:grpSpPr>
+      <p:sp>
+        <p:nvSpPr>
+          <p:cNvPr id="2" name="Title 1"/>
+          <p:cNvSpPr>
+            <a:spLocks noGrp="1"/>
+          </p:cNvSpPr>
+          <p:nvPr>
+            <p:ph type="title"/>
+          </p:nvPr>
+        </p:nvSpPr>
+        <p:spPr>
+          <a:xfrm>
+            <a:off x="457200" y="2857500"/>
+            <a:ext cx="8229600" cy="1143000"/>
+          </a:xfrm>
+        </p:spPr>
+        <p:txBody>
+          <a:bodyPr/>
+          <a:lstStyle/>
+          <a:p>
+            <a:r>
+              <a:rPr lang="en-US" dirty="0" smtClean="0"/>
+              <a:t>Demo</a:t>
+            </a:r>
+            <a:endParaRPr lang="en-US" dirty="0"/>
+          </a:p>
+        </p:txBody>
+      </p:sp>
+    </p:spTree>
     <p:extLst>
       <p:ext uri="{BB962C8B-B14F-4D97-AF65-F5344CB8AC3E}">
         <p14:creationId xmlns:p14="http://schemas.microsoft.com/office/powerpoint/2010/main" val="190026734"/>
@@ -5011,14 +6221,14 @@
   <p:timing>
     <p:tnLst>
       <p:par>
-        <p:cTn id="1" dur="indefinite" restart="never" nodeType="tmRoot"/>
+        <p:cTn xmlns:p14="http://schemas.microsoft.com/office/powerpoint/2010/main" id="1" dur="indefinite" restart="never" nodeType="tmRoot"/>
       </p:par>
     </p:tnLst>
   </p:timing>
 </p:sld>
 </file>
 
-<file path=ppt/slides/slide19.xml><?xml version="1.0" encoding="utf-8"?>
+<file path=ppt/slides/slide21.xml><?xml version="1.0" encoding="utf-8"?>
 <p:sld xmlns:a="http://schemas.openxmlformats.org/drawingml/2006/main" xmlns:r="http://schemas.openxmlformats.org/officeDocument/2006/relationships" xmlns:p="http://schemas.openxmlformats.org/presentationml/2006/main">
   <p:cSld>
     <p:spTree>
@@ -5140,14 +6350,14 @@
           </a:ln>
           <a:effectLst/>
           <a:extLst>
-            <a:ext uri="{909E8E84-426E-40DD-AFC4-6F175D3DCCD1}">
+            <a:ext uri="{909E8E84-426E-40dd-AFC4-6F175D3DCCD1}">
               <a14:hiddenFill xmlns:a14="http://schemas.microsoft.com/office/drawing/2010/main">
                 <a:solidFill>
                   <a:schemeClr val="accent1"/>
                 </a:solidFill>
               </a14:hiddenFill>
             </a:ext>
-            <a:ext uri="{91240B29-F687-4F45-9708-019B960494DF}">
+            <a:ext uri="{91240B29-F687-4f45-9708-019B960494DF}">
               <a14:hiddenLine xmlns:a14="http://schemas.microsoft.com/office/drawing/2010/main" w="9525">
                 <a:solidFill>
                   <a:schemeClr val="tx1"/>
@@ -5157,7 +6367,7 @@
                 <a:tailEnd/>
               </a14:hiddenLine>
             </a:ext>
-            <a:ext uri="{AF507438-7753-43E0-B8FC-AC1667EBCBE1}">
+            <a:ext uri="{AF507438-7753-43e0-B8FC-AC1667EBCBE1}">
               <a14:hiddenEffects xmlns:a14="http://schemas.microsoft.com/office/drawing/2010/main">
                 <a:effectLst>
                   <a:outerShdw dist="35921" dir="2700000" algn="ctr" rotWithShape="0">
@@ -5182,201 +6392,14 @@
   <p:timing>
     <p:tnLst>
       <p:par>
-        <p:cTn id="1" dur="indefinite" restart="never" nodeType="tmRoot"/>
+        <p:cTn xmlns:p14="http://schemas.microsoft.com/office/powerpoint/2010/main" id="1" dur="indefinite" restart="never" nodeType="tmRoot"/>
       </p:par>
     </p:tnLst>
   </p:timing>
 </p:sld>
 </file>
 
-<file path=ppt/slides/slide2.xml><?xml version="1.0" encoding="utf-8"?>
-<p:sld xmlns:a="http://schemas.openxmlformats.org/drawingml/2006/main" xmlns:r="http://schemas.openxmlformats.org/officeDocument/2006/relationships" xmlns:p="http://schemas.openxmlformats.org/presentationml/2006/main">
-  <p:cSld>
-    <p:spTree>
-      <p:nvGrpSpPr>
-        <p:cNvPr id="1" name=""/>
-        <p:cNvGrpSpPr/>
-        <p:nvPr/>
-      </p:nvGrpSpPr>
-      <p:grpSpPr>
-        <a:xfrm>
-          <a:off x="0" y="0"/>
-          <a:ext cx="0" cy="0"/>
-          <a:chOff x="0" y="0"/>
-          <a:chExt cx="0" cy="0"/>
-        </a:xfrm>
-      </p:grpSpPr>
-      <p:sp>
-        <p:nvSpPr>
-          <p:cNvPr id="2" name="Title 1"/>
-          <p:cNvSpPr>
-            <a:spLocks noGrp="1"/>
-          </p:cNvSpPr>
-          <p:nvPr>
-            <p:ph type="title"/>
-          </p:nvPr>
-        </p:nvSpPr>
-        <p:spPr/>
-        <p:txBody>
-          <a:bodyPr/>
-          <a:lstStyle/>
-          <a:p>
-            <a:r>
-              <a:rPr lang="en-US" dirty="0" smtClean="0"/>
-              <a:t>Who am I? Who cares…</a:t>
-            </a:r>
-            <a:endParaRPr lang="en-US" dirty="0"/>
-          </a:p>
-        </p:txBody>
-      </p:sp>
-      <p:sp>
-        <p:nvSpPr>
-          <p:cNvPr id="3" name="Content Placeholder 2"/>
-          <p:cNvSpPr>
-            <a:spLocks noGrp="1"/>
-          </p:cNvSpPr>
-          <p:nvPr>
-            <p:ph idx="1"/>
-          </p:nvPr>
-        </p:nvSpPr>
-        <p:spPr>
-          <a:xfrm>
-            <a:off x="457200" y="1600200"/>
-            <a:ext cx="8229600" cy="4953000"/>
-          </a:xfrm>
-        </p:spPr>
-        <p:txBody>
-          <a:bodyPr>
-            <a:normAutofit lnSpcReduction="10000"/>
-          </a:bodyPr>
-          <a:lstStyle/>
-          <a:p>
-            <a:r>
-              <a:rPr lang="en-US" dirty="0" smtClean="0"/>
-              <a:t>Rob Reynolds</a:t>
-            </a:r>
-          </a:p>
-          <a:p>
-            <a:r>
-              <a:rPr lang="en-US" dirty="0" smtClean="0"/>
-              <a:t>Technical Lead for VML</a:t>
-            </a:r>
-          </a:p>
-          <a:p>
-            <a:r>
-              <a:rPr lang="en-US" dirty="0" smtClean="0"/>
-              <a:t>OSS</a:t>
-            </a:r>
-          </a:p>
-          <a:p>
-            <a:pPr lvl="1"/>
-            <a:r>
-              <a:rPr lang="en-US" dirty="0" smtClean="0"/>
-              <a:t>Chuck Norris Framework</a:t>
-            </a:r>
-          </a:p>
-          <a:p>
-            <a:pPr lvl="1"/>
-            <a:r>
-              <a:rPr lang="en-US" dirty="0" smtClean="0"/>
-              <a:t>Chocolatey</a:t>
-            </a:r>
-          </a:p>
-          <a:p>
-            <a:pPr lvl="1"/>
-            <a:r>
-              <a:rPr lang="en-US" dirty="0" err="1" smtClean="0"/>
-              <a:t>NuGet</a:t>
-            </a:r>
-            <a:r>
-              <a:rPr lang="en-US" dirty="0" smtClean="0"/>
-              <a:t> core team member</a:t>
-            </a:r>
-          </a:p>
-          <a:p>
-            <a:pPr lvl="1"/>
-            <a:r>
-              <a:rPr lang="en-US" dirty="0" smtClean="0"/>
-              <a:t>Various contributions to other projects</a:t>
-            </a:r>
-          </a:p>
-          <a:p>
-            <a:r>
-              <a:rPr lang="en-US" dirty="0" smtClean="0"/>
-              <a:t>ferventcoder – twitter, </a:t>
-            </a:r>
-            <a:r>
-              <a:rPr lang="en-US" dirty="0" err="1" smtClean="0"/>
-              <a:t>gmail</a:t>
-            </a:r>
-            <a:r>
-              <a:rPr lang="en-US" dirty="0" smtClean="0"/>
-              <a:t>, you name it</a:t>
-            </a:r>
-          </a:p>
-          <a:p>
-            <a:r>
-              <a:rPr lang="en-US" dirty="0" smtClean="0"/>
-              <a:t>ferventcoder.com / </a:t>
-            </a:r>
-            <a:r>
-              <a:rPr lang="en-US" dirty="0" err="1" smtClean="0"/>
-              <a:t>Devlicio.us</a:t>
-            </a:r>
-            <a:endParaRPr lang="en-US" dirty="0" smtClean="0"/>
-          </a:p>
-        </p:txBody>
-      </p:sp>
-      <p:sp>
-        <p:nvSpPr>
-          <p:cNvPr id="4" name="Rectangle 3"/>
-          <p:cNvSpPr/>
-          <p:nvPr/>
-        </p:nvSpPr>
-        <p:spPr>
-          <a:xfrm>
-            <a:off x="3073400" y="6488668"/>
-            <a:ext cx="6070600" cy="369332"/>
-          </a:xfrm>
-          <a:prstGeom prst="rect">
-            <a:avLst/>
-          </a:prstGeom>
-        </p:spPr>
-        <p:txBody>
-          <a:bodyPr wrap="square">
-            <a:spAutoFit/>
-          </a:bodyPr>
-          <a:lstStyle/>
-          <a:p>
-            <a:pPr algn="r"/>
-            <a:r>
-              <a:rPr lang="en-US" dirty="0"/>
-              <a:t>Project managers never ask Chuck Norris for estimations…ever.</a:t>
-            </a:r>
-          </a:p>
-        </p:txBody>
-      </p:sp>
-    </p:spTree>
-    <p:extLst>
-      <p:ext uri="{BB962C8B-B14F-4D97-AF65-F5344CB8AC3E}">
-        <p14:creationId xmlns:p14="http://schemas.microsoft.com/office/powerpoint/2010/main" val="3020299016"/>
-      </p:ext>
-    </p:extLst>
-  </p:cSld>
-  <p:clrMapOvr>
-    <a:masterClrMapping/>
-  </p:clrMapOvr>
-  <p:timing>
-    <p:tnLst>
-      <p:par>
-        <p:cTn id="1" dur="indefinite" restart="never" nodeType="tmRoot"/>
-      </p:par>
-    </p:tnLst>
-  </p:timing>
-</p:sld>
-</file>
-
-<file path=ppt/slides/slide20.xml><?xml version="1.0" encoding="utf-8"?>
+<file path=ppt/slides/slide22.xml><?xml version="1.0" encoding="utf-8"?>
 <p:sld xmlns:a="http://schemas.openxmlformats.org/drawingml/2006/main" xmlns:r="http://schemas.openxmlformats.org/officeDocument/2006/relationships" xmlns:p="http://schemas.openxmlformats.org/presentationml/2006/main">
   <p:cSld>
     <p:spTree>
@@ -5498,14 +6521,14 @@
           </a:ln>
           <a:effectLst/>
           <a:extLst>
-            <a:ext uri="{909E8E84-426E-40DD-AFC4-6F175D3DCCD1}">
+            <a:ext uri="{909E8E84-426E-40dd-AFC4-6F175D3DCCD1}">
               <a14:hiddenFill xmlns:a14="http://schemas.microsoft.com/office/drawing/2010/main">
                 <a:solidFill>
                   <a:schemeClr val="accent1"/>
                 </a:solidFill>
               </a14:hiddenFill>
             </a:ext>
-            <a:ext uri="{91240B29-F687-4F45-9708-019B960494DF}">
+            <a:ext uri="{91240B29-F687-4f45-9708-019B960494DF}">
               <a14:hiddenLine xmlns:a14="http://schemas.microsoft.com/office/drawing/2010/main" w="9525">
                 <a:solidFill>
                   <a:schemeClr val="tx1"/>
@@ -5515,7 +6538,7 @@
                 <a:tailEnd/>
               </a14:hiddenLine>
             </a:ext>
-            <a:ext uri="{AF507438-7753-43E0-B8FC-AC1667EBCBE1}">
+            <a:ext uri="{AF507438-7753-43e0-B8FC-AC1667EBCBE1}">
               <a14:hiddenEffects xmlns:a14="http://schemas.microsoft.com/office/drawing/2010/main">
                 <a:effectLst>
                   <a:outerShdw dist="35921" dir="2700000" algn="ctr" rotWithShape="0">
@@ -5540,161 +6563,7 @@
   <p:timing>
     <p:tnLst>
       <p:par>
-        <p:cTn id="1" dur="indefinite" restart="never" nodeType="tmRoot"/>
-      </p:par>
-    </p:tnLst>
-  </p:timing>
-</p:sld>
-</file>
-
-<file path=ppt/slides/slide21.xml><?xml version="1.0" encoding="utf-8"?>
-<p:sld xmlns:a="http://schemas.openxmlformats.org/drawingml/2006/main" xmlns:r="http://schemas.openxmlformats.org/officeDocument/2006/relationships" xmlns:p="http://schemas.openxmlformats.org/presentationml/2006/main">
-  <p:cSld>
-    <p:spTree>
-      <p:nvGrpSpPr>
-        <p:cNvPr id="1" name=""/>
-        <p:cNvGrpSpPr/>
-        <p:nvPr/>
-      </p:nvGrpSpPr>
-      <p:grpSpPr>
-        <a:xfrm>
-          <a:off x="0" y="0"/>
-          <a:ext cx="0" cy="0"/>
-          <a:chOff x="0" y="0"/>
-          <a:chExt cx="0" cy="0"/>
-        </a:xfrm>
-      </p:grpSpPr>
-      <p:sp>
-        <p:nvSpPr>
-          <p:cNvPr id="2" name="Title 1"/>
-          <p:cNvSpPr>
-            <a:spLocks noGrp="1"/>
-          </p:cNvSpPr>
-          <p:nvPr>
-            <p:ph type="title"/>
-          </p:nvPr>
-        </p:nvSpPr>
-        <p:spPr>
-          <a:xfrm>
-            <a:off x="457200" y="2857500"/>
-            <a:ext cx="8229600" cy="1143000"/>
-          </a:xfrm>
-        </p:spPr>
-        <p:txBody>
-          <a:bodyPr/>
-          <a:lstStyle/>
-          <a:p>
-            <a:r>
-              <a:rPr lang="en-US" dirty="0" smtClean="0"/>
-              <a:t>Demo</a:t>
-            </a:r>
-            <a:endParaRPr lang="en-US" dirty="0"/>
-          </a:p>
-        </p:txBody>
-      </p:sp>
-    </p:spTree>
-    <p:extLst>
-      <p:ext uri="{BB962C8B-B14F-4D97-AF65-F5344CB8AC3E}">
-        <p14:creationId xmlns:p14="http://schemas.microsoft.com/office/powerpoint/2010/main" val="3388222861"/>
-      </p:ext>
-    </p:extLst>
-  </p:cSld>
-  <p:clrMapOvr>
-    <a:masterClrMapping/>
-  </p:clrMapOvr>
-  <p:timing>
-    <p:tnLst>
-      <p:par>
-        <p:cTn id="1" dur="indefinite" restart="never" nodeType="tmRoot"/>
-      </p:par>
-    </p:tnLst>
-  </p:timing>
-</p:sld>
-</file>
-
-<file path=ppt/slides/slide22.xml><?xml version="1.0" encoding="utf-8"?>
-<p:sld xmlns:a="http://schemas.openxmlformats.org/drawingml/2006/main" xmlns:r="http://schemas.openxmlformats.org/officeDocument/2006/relationships" xmlns:p="http://schemas.openxmlformats.org/presentationml/2006/main">
-  <p:cSld>
-    <p:spTree>
-      <p:nvGrpSpPr>
-        <p:cNvPr id="1" name=""/>
-        <p:cNvGrpSpPr/>
-        <p:nvPr/>
-      </p:nvGrpSpPr>
-      <p:grpSpPr>
-        <a:xfrm>
-          <a:off x="0" y="0"/>
-          <a:ext cx="0" cy="0"/>
-          <a:chOff x="0" y="0"/>
-          <a:chExt cx="0" cy="0"/>
-        </a:xfrm>
-      </p:grpSpPr>
-      <p:sp>
-        <p:nvSpPr>
-          <p:cNvPr id="2" name="Title 1"/>
-          <p:cNvSpPr>
-            <a:spLocks noGrp="1"/>
-          </p:cNvSpPr>
-          <p:nvPr>
-            <p:ph type="title"/>
-          </p:nvPr>
-        </p:nvSpPr>
-        <p:spPr/>
-        <p:txBody>
-          <a:bodyPr/>
-          <a:lstStyle/>
-          <a:p>
-            <a:r>
-              <a:rPr lang="en-US" dirty="0" smtClean="0"/>
-              <a:t>Automatic Packages</a:t>
-            </a:r>
-            <a:endParaRPr lang="en-US" dirty="0"/>
-          </a:p>
-        </p:txBody>
-      </p:sp>
-      <p:sp>
-        <p:nvSpPr>
-          <p:cNvPr id="3" name="Content Placeholder 2"/>
-          <p:cNvSpPr>
-            <a:spLocks noGrp="1"/>
-          </p:cNvSpPr>
-          <p:nvPr>
-            <p:ph idx="1"/>
-          </p:nvPr>
-        </p:nvSpPr>
-        <p:spPr/>
-        <p:txBody>
-          <a:bodyPr/>
-          <a:lstStyle/>
-          <a:p>
-            <a:r>
-              <a:rPr lang="en-US" dirty="0" smtClean="0"/>
-              <a:t>I released new versions of packages this morning.</a:t>
-            </a:r>
-          </a:p>
-          <a:p>
-            <a:r>
-              <a:rPr lang="en-US" dirty="0" smtClean="0"/>
-              <a:t>Well, twitter told me I did</a:t>
-            </a:r>
-            <a:endParaRPr lang="en-US" dirty="0"/>
-          </a:p>
-        </p:txBody>
-      </p:sp>
-    </p:spTree>
-    <p:extLst>
-      <p:ext uri="{BB962C8B-B14F-4D97-AF65-F5344CB8AC3E}">
-        <p14:creationId xmlns:p14="http://schemas.microsoft.com/office/powerpoint/2010/main" val="1556462263"/>
-      </p:ext>
-    </p:extLst>
-  </p:cSld>
-  <p:clrMapOvr>
-    <a:masterClrMapping/>
-  </p:clrMapOvr>
-  <p:timing>
-    <p:tnLst>
-      <p:par>
-        <p:cTn id="1" dur="indefinite" restart="never" nodeType="tmRoot"/>
+        <p:cTn xmlns:p14="http://schemas.microsoft.com/office/powerpoint/2010/main" id="1" dur="indefinite" restart="never" nodeType="tmRoot"/>
       </p:par>
     </p:tnLst>
   </p:timing>
@@ -5728,6 +6597,160 @@
             <p:ph type="title"/>
           </p:nvPr>
         </p:nvSpPr>
+        <p:spPr>
+          <a:xfrm>
+            <a:off x="457200" y="2857500"/>
+            <a:ext cx="8229600" cy="1143000"/>
+          </a:xfrm>
+        </p:spPr>
+        <p:txBody>
+          <a:bodyPr/>
+          <a:lstStyle/>
+          <a:p>
+            <a:r>
+              <a:rPr lang="en-US" dirty="0" smtClean="0"/>
+              <a:t>Demo</a:t>
+            </a:r>
+            <a:endParaRPr lang="en-US" dirty="0"/>
+          </a:p>
+        </p:txBody>
+      </p:sp>
+    </p:spTree>
+    <p:extLst>
+      <p:ext uri="{BB962C8B-B14F-4D97-AF65-F5344CB8AC3E}">
+        <p14:creationId xmlns:p14="http://schemas.microsoft.com/office/powerpoint/2010/main" val="3388222861"/>
+      </p:ext>
+    </p:extLst>
+  </p:cSld>
+  <p:clrMapOvr>
+    <a:masterClrMapping/>
+  </p:clrMapOvr>
+  <p:timing>
+    <p:tnLst>
+      <p:par>
+        <p:cTn xmlns:p14="http://schemas.microsoft.com/office/powerpoint/2010/main" id="1" dur="indefinite" restart="never" nodeType="tmRoot"/>
+      </p:par>
+    </p:tnLst>
+  </p:timing>
+</p:sld>
+</file>
+
+<file path=ppt/slides/slide24.xml><?xml version="1.0" encoding="utf-8"?>
+<p:sld xmlns:a="http://schemas.openxmlformats.org/drawingml/2006/main" xmlns:r="http://schemas.openxmlformats.org/officeDocument/2006/relationships" xmlns:p="http://schemas.openxmlformats.org/presentationml/2006/main">
+  <p:cSld>
+    <p:spTree>
+      <p:nvGrpSpPr>
+        <p:cNvPr id="1" name=""/>
+        <p:cNvGrpSpPr/>
+        <p:nvPr/>
+      </p:nvGrpSpPr>
+      <p:grpSpPr>
+        <a:xfrm>
+          <a:off x="0" y="0"/>
+          <a:ext cx="0" cy="0"/>
+          <a:chOff x="0" y="0"/>
+          <a:chExt cx="0" cy="0"/>
+        </a:xfrm>
+      </p:grpSpPr>
+      <p:sp>
+        <p:nvSpPr>
+          <p:cNvPr id="2" name="Title 1"/>
+          <p:cNvSpPr>
+            <a:spLocks noGrp="1"/>
+          </p:cNvSpPr>
+          <p:nvPr>
+            <p:ph type="title"/>
+          </p:nvPr>
+        </p:nvSpPr>
+        <p:spPr/>
+        <p:txBody>
+          <a:bodyPr/>
+          <a:lstStyle/>
+          <a:p>
+            <a:r>
+              <a:rPr lang="en-US" dirty="0" smtClean="0"/>
+              <a:t>Automatic Packages</a:t>
+            </a:r>
+            <a:endParaRPr lang="en-US" dirty="0"/>
+          </a:p>
+        </p:txBody>
+      </p:sp>
+      <p:sp>
+        <p:nvSpPr>
+          <p:cNvPr id="3" name="Content Placeholder 2"/>
+          <p:cNvSpPr>
+            <a:spLocks noGrp="1"/>
+          </p:cNvSpPr>
+          <p:nvPr>
+            <p:ph idx="1"/>
+          </p:nvPr>
+        </p:nvSpPr>
+        <p:spPr/>
+        <p:txBody>
+          <a:bodyPr/>
+          <a:lstStyle/>
+          <a:p>
+            <a:r>
+              <a:rPr lang="en-US" dirty="0" smtClean="0"/>
+              <a:t>I released new versions of packages this morning.</a:t>
+            </a:r>
+          </a:p>
+          <a:p>
+            <a:r>
+              <a:rPr lang="en-US" dirty="0" smtClean="0"/>
+              <a:t>Well, twitter told me I did</a:t>
+            </a:r>
+            <a:endParaRPr lang="en-US" dirty="0"/>
+          </a:p>
+        </p:txBody>
+      </p:sp>
+    </p:spTree>
+    <p:extLst>
+      <p:ext uri="{BB962C8B-B14F-4D97-AF65-F5344CB8AC3E}">
+        <p14:creationId xmlns:p14="http://schemas.microsoft.com/office/powerpoint/2010/main" val="1556462263"/>
+      </p:ext>
+    </p:extLst>
+  </p:cSld>
+  <p:clrMapOvr>
+    <a:masterClrMapping/>
+  </p:clrMapOvr>
+  <p:timing>
+    <p:tnLst>
+      <p:par>
+        <p:cTn xmlns:p14="http://schemas.microsoft.com/office/powerpoint/2010/main" id="1" dur="indefinite" restart="never" nodeType="tmRoot"/>
+      </p:par>
+    </p:tnLst>
+  </p:timing>
+</p:sld>
+</file>
+
+<file path=ppt/slides/slide25.xml><?xml version="1.0" encoding="utf-8"?>
+<p:sld xmlns:a="http://schemas.openxmlformats.org/drawingml/2006/main" xmlns:r="http://schemas.openxmlformats.org/officeDocument/2006/relationships" xmlns:p="http://schemas.openxmlformats.org/presentationml/2006/main">
+  <p:cSld>
+    <p:spTree>
+      <p:nvGrpSpPr>
+        <p:cNvPr id="1" name=""/>
+        <p:cNvGrpSpPr/>
+        <p:nvPr/>
+      </p:nvGrpSpPr>
+      <p:grpSpPr>
+        <a:xfrm>
+          <a:off x="0" y="0"/>
+          <a:ext cx="0" cy="0"/>
+          <a:chOff x="0" y="0"/>
+          <a:chExt cx="0" cy="0"/>
+        </a:xfrm>
+      </p:grpSpPr>
+      <p:sp>
+        <p:nvSpPr>
+          <p:cNvPr id="2" name="Title 1"/>
+          <p:cNvSpPr>
+            <a:spLocks noGrp="1"/>
+          </p:cNvSpPr>
+          <p:nvPr>
+            <p:ph type="title"/>
+          </p:nvPr>
+        </p:nvSpPr>
         <p:spPr/>
         <p:txBody>
           <a:bodyPr/>
@@ -5772,11 +6795,7 @@
           <a:p>
             <a:r>
               <a:rPr lang="en-US" dirty="0" smtClean="0"/>
-              <a:t>Chocolatey </a:t>
-            </a:r>
-            <a:r>
-              <a:rPr lang="en-US" dirty="0" smtClean="0"/>
-              <a:t>- </a:t>
+              <a:t>Chocolatey - </a:t>
             </a:r>
             <a:r>
               <a:rPr lang="en-US" dirty="0" smtClean="0">
@@ -5817,7 +6836,7 @@
         </p:blipFill>
         <p:spPr bwMode="auto">
           <a:xfrm>
-            <a:off x="1676400" y="2971800"/>
+            <a:off x="2780771" y="2971800"/>
             <a:ext cx="3582458" cy="3582458"/>
           </a:xfrm>
           <a:prstGeom prst="rect">
@@ -5829,14 +6848,14 @@
           </a:ln>
           <a:effectLst/>
           <a:extLst>
-            <a:ext uri="{909E8E84-426E-40DD-AFC4-6F175D3DCCD1}">
+            <a:ext uri="{909E8E84-426E-40dd-AFC4-6F175D3DCCD1}">
               <a14:hiddenFill xmlns:a14="http://schemas.microsoft.com/office/drawing/2010/main">
                 <a:solidFill>
                   <a:schemeClr val="accent1"/>
                 </a:solidFill>
               </a14:hiddenFill>
             </a:ext>
-            <a:ext uri="{91240B29-F687-4F45-9708-019B960494DF}">
+            <a:ext uri="{91240B29-F687-4f45-9708-019B960494DF}">
               <a14:hiddenLine xmlns:a14="http://schemas.microsoft.com/office/drawing/2010/main" w="9525">
                 <a:solidFill>
                   <a:schemeClr val="tx1"/>
@@ -5846,7 +6865,7 @@
                 <a:tailEnd/>
               </a14:hiddenLine>
             </a:ext>
-            <a:ext uri="{AF507438-7753-43E0-B8FC-AC1667EBCBE1}">
+            <a:ext uri="{AF507438-7753-43e0-B8FC-AC1667EBCBE1}">
               <a14:hiddenEffects xmlns:a14="http://schemas.microsoft.com/office/drawing/2010/main">
                 <a:effectLst>
                   <a:outerShdw dist="35921" dir="2700000" algn="ctr" rotWithShape="0">
@@ -5866,14 +6885,14 @@
   <p:timing>
     <p:tnLst>
       <p:par>
-        <p:cTn id="1" dur="indefinite" restart="never" nodeType="tmRoot"/>
+        <p:cTn xmlns:p14="http://schemas.microsoft.com/office/powerpoint/2010/main" id="1" dur="indefinite" restart="never" nodeType="tmRoot"/>
       </p:par>
     </p:tnLst>
   </p:timing>
 </p:sld>
 </file>
 
-<file path=ppt/slides/slide24.xml><?xml version="1.0" encoding="utf-8"?>
+<file path=ppt/slides/slide26.xml><?xml version="1.0" encoding="utf-8"?>
 <p:sld xmlns:a="http://schemas.openxmlformats.org/drawingml/2006/main" xmlns:r="http://schemas.openxmlformats.org/officeDocument/2006/relationships" xmlns:p="http://schemas.openxmlformats.org/presentationml/2006/main" show="0">
   <p:cSld>
     <p:spTree>
@@ -5959,7 +6978,7 @@
           </a:prstGeom>
           <a:noFill/>
           <a:extLst>
-            <a:ext uri="{909E8E84-426E-40DD-AFC4-6F175D3DCCD1}">
+            <a:ext uri="{909E8E84-426E-40dd-AFC4-6F175D3DCCD1}">
               <a14:hiddenFill xmlns:a14="http://schemas.microsoft.com/office/drawing/2010/main">
                 <a:solidFill>
                   <a:srgbClr val="FFFFFF"/>
@@ -5979,18 +6998,18 @@
   <p:clrMapOvr>
     <a:masterClrMapping/>
   </p:clrMapOvr>
-  <mc:AlternateContent xmlns:mc="http://schemas.openxmlformats.org/markup-compatibility/2006">
-    <mc:Choice xmlns:p14="http://schemas.microsoft.com/office/powerpoint/2010/main" Requires="p14">
+  <mc:AlternateContent xmlns:mc="http://schemas.openxmlformats.org/markup-compatibility/2006" xmlns:p14="http://schemas.microsoft.com/office/powerpoint/2010/main">
+    <mc:Choice Requires="p14">
       <p:transition spd="slow" p14:dur="2000"/>
     </mc:Choice>
-    <mc:Fallback>
+    <mc:Fallback xmlns="">
       <p:transition spd="slow"/>
     </mc:Fallback>
   </mc:AlternateContent>
   <p:timing>
     <p:tnLst>
       <p:par>
-        <p:cTn id="1" dur="indefinite" restart="never" nodeType="tmRoot"/>
+        <p:cTn xmlns:p14="http://schemas.microsoft.com/office/powerpoint/2010/main" id="1" dur="indefinite" restart="never" nodeType="tmRoot"/>
       </p:par>
     </p:tnLst>
   </p:timing>
@@ -6031,11 +7050,7 @@
           <a:p>
             <a:r>
               <a:rPr lang="en-US" dirty="0" smtClean="0"/>
-              <a:t>What the …. </a:t>
-            </a:r>
-            <a:r>
-              <a:rPr lang="en-US" smtClean="0"/>
-              <a:t>Is Chocolatey?</a:t>
+              <a:t>Who am I? Who cares…</a:t>
             </a:r>
             <a:endParaRPr lang="en-US" dirty="0"/>
           </a:p>
@@ -6051,58 +7066,129 @@
             <p:ph idx="1"/>
           </p:nvPr>
         </p:nvSpPr>
-        <p:spPr/>
-        <p:txBody>
-          <a:bodyPr/>
-          <a:lstStyle/>
-          <a:p>
-            <a:r>
-              <a:rPr lang="en-US" dirty="0" smtClean="0"/>
-              <a:t>Familiar w/</a:t>
-            </a:r>
+        <p:spPr>
+          <a:xfrm>
+            <a:off x="457200" y="1600200"/>
+            <a:ext cx="8229600" cy="4953000"/>
+          </a:xfrm>
+        </p:spPr>
+        <p:txBody>
+          <a:bodyPr>
+            <a:normAutofit lnSpcReduction="10000"/>
+          </a:bodyPr>
+          <a:lstStyle/>
+          <a:p>
+            <a:r>
+              <a:rPr lang="en-US" dirty="0" smtClean="0"/>
+              <a:t>Rob Reynolds</a:t>
+            </a:r>
+          </a:p>
+          <a:p>
+            <a:r>
+              <a:rPr lang="en-US" dirty="0" smtClean="0"/>
+              <a:t>Technical Architect for VML</a:t>
+            </a:r>
+          </a:p>
+          <a:p>
+            <a:r>
+              <a:rPr lang="en-US" dirty="0" smtClean="0"/>
+              <a:t>OSS</a:t>
+            </a:r>
+          </a:p>
+          <a:p>
+            <a:pPr lvl="1"/>
+            <a:r>
+              <a:rPr lang="en-US" dirty="0" smtClean="0"/>
+              <a:t>Chuck Norris Framework</a:t>
+            </a:r>
+          </a:p>
+          <a:p>
+            <a:pPr lvl="1"/>
+            <a:r>
+              <a:rPr lang="en-US" dirty="0" smtClean="0"/>
+              <a:t>Chocolatey</a:t>
+            </a:r>
+          </a:p>
+          <a:p>
+            <a:pPr lvl="1"/>
             <a:r>
               <a:rPr lang="en-US" dirty="0" err="1" smtClean="0"/>
-              <a:t>Debian</a:t>
-            </a:r>
-            <a:r>
-              <a:rPr lang="en-US" dirty="0" smtClean="0"/>
-              <a:t>? apt-get?</a:t>
-            </a:r>
-          </a:p>
-          <a:p>
-            <a:r>
-              <a:rPr lang="en-US" dirty="0" smtClean="0"/>
-              <a:t>APT </a:t>
-            </a:r>
-            <a:r>
-              <a:rPr lang="en-US" dirty="0" smtClean="0"/>
-              <a:t>– </a:t>
-            </a:r>
-            <a:r>
-              <a:rPr lang="en-US" dirty="0" smtClean="0"/>
-              <a:t>advanced packaging </a:t>
-            </a:r>
-            <a:r>
-              <a:rPr lang="en-US" dirty="0" smtClean="0"/>
-              <a:t>tool</a:t>
+              <a:t>NuGet</a:t>
+            </a:r>
+            <a:r>
+              <a:rPr lang="en-US" dirty="0" smtClean="0"/>
+              <a:t> core team member</a:t>
             </a:r>
           </a:p>
           <a:p>
             <a:pPr lvl="1"/>
             <a:r>
               <a:rPr lang="en-US" dirty="0" smtClean="0"/>
-              <a:t>Automates retrieval, configuration, and installation of software</a:t>
-            </a:r>
-          </a:p>
-          <a:p>
-            <a:r>
-              <a:rPr lang="en-US" dirty="0" smtClean="0"/>
-              <a:t>Windows hasn’t really had anything take off</a:t>
+              <a:t>Various contributions to other projects</a:t>
+            </a:r>
+          </a:p>
+          <a:p>
+            <a:r>
+              <a:rPr lang="en-US" dirty="0" smtClean="0"/>
+              <a:t>ferventcoder – twitter, </a:t>
+            </a:r>
+            <a:r>
+              <a:rPr lang="en-US" dirty="0" err="1" smtClean="0"/>
+              <a:t>gmail</a:t>
+            </a:r>
+            <a:r>
+              <a:rPr lang="en-US" dirty="0" smtClean="0"/>
+              <a:t>, you name it</a:t>
+            </a:r>
+          </a:p>
+          <a:p>
+            <a:r>
+              <a:rPr lang="en-US" dirty="0" smtClean="0"/>
+              <a:t>ferventcoder.com / </a:t>
+            </a:r>
+            <a:r>
+              <a:rPr lang="en-US" dirty="0" err="1" smtClean="0"/>
+              <a:t>Devlicio.us</a:t>
+            </a:r>
+            <a:endParaRPr lang="en-US" dirty="0" smtClean="0"/>
+          </a:p>
+        </p:txBody>
+      </p:sp>
+      <p:sp>
+        <p:nvSpPr>
+          <p:cNvPr id="4" name="Rectangle 3"/>
+          <p:cNvSpPr/>
+          <p:nvPr/>
+        </p:nvSpPr>
+        <p:spPr>
+          <a:xfrm>
+            <a:off x="3073400" y="6488668"/>
+            <a:ext cx="6070600" cy="369332"/>
+          </a:xfrm>
+          <a:prstGeom prst="rect">
+            <a:avLst/>
+          </a:prstGeom>
+        </p:spPr>
+        <p:txBody>
+          <a:bodyPr wrap="square">
+            <a:spAutoFit/>
+          </a:bodyPr>
+          <a:lstStyle/>
+          <a:p>
+            <a:pPr algn="r"/>
+            <a:r>
+              <a:rPr lang="en-US" dirty="0"/>
+              <a:t>Project managers never ask Chuck Norris for estimations…ever.</a:t>
             </a:r>
           </a:p>
         </p:txBody>
       </p:sp>
     </p:spTree>
+    <p:extLst>
+      <p:ext uri="{BB962C8B-B14F-4D97-AF65-F5344CB8AC3E}">
+        <p14:creationId xmlns:p14="http://schemas.microsoft.com/office/powerpoint/2010/main" val="3020299016"/>
+      </p:ext>
+    </p:extLst>
   </p:cSld>
   <p:clrMapOvr>
     <a:masterClrMapping/>
@@ -6110,7 +7196,7 @@
   <p:timing>
     <p:tnLst>
       <p:par>
-        <p:cTn id="1" dur="indefinite" restart="never" nodeType="tmRoot"/>
+        <p:cTn xmlns:p14="http://schemas.microsoft.com/office/powerpoint/2010/main" id="1" dur="indefinite" restart="never" nodeType="tmRoot"/>
       </p:par>
     </p:tnLst>
   </p:timing>
@@ -6136,101 +7222,384 @@
       </p:grpSpPr>
       <p:sp>
         <p:nvSpPr>
-          <p:cNvPr id="2" name="Title 1"/>
-          <p:cNvSpPr>
-            <a:spLocks noGrp="1"/>
-          </p:cNvSpPr>
-          <p:nvPr>
-            <p:ph type="title"/>
-          </p:nvPr>
-        </p:nvSpPr>
-        <p:spPr/>
-        <p:txBody>
-          <a:bodyPr/>
-          <a:lstStyle/>
-          <a:p>
-            <a:r>
-              <a:rPr lang="en-US" dirty="0" smtClean="0"/>
-              <a:t>Chocolatey</a:t>
-            </a:r>
+          <p:cNvPr id="3" name="Content Placeholder 2"/>
+          <p:cNvSpPr>
+            <a:spLocks noGrp="1"/>
+          </p:cNvSpPr>
+          <p:nvPr>
+            <p:ph idx="1"/>
+          </p:nvPr>
+        </p:nvSpPr>
+        <p:spPr>
+          <a:xfrm>
+            <a:off x="76200" y="1600201"/>
+            <a:ext cx="9067800" cy="4525962"/>
+          </a:xfrm>
+        </p:spPr>
+        <p:txBody>
+          <a:bodyPr/>
+          <a:lstStyle/>
+          <a:p>
+            <a:pPr algn="r"/>
+            <a:r>
+              <a:rPr lang="en-US" dirty="0" smtClean="0"/>
+              <a:t>Full-Service Digital Marketing Agency</a:t>
+            </a:r>
+          </a:p>
+          <a:p>
             <a:endParaRPr lang="en-US" dirty="0"/>
           </a:p>
         </p:txBody>
       </p:sp>
-      <p:sp>
-        <p:nvSpPr>
-          <p:cNvPr id="3" name="Content Placeholder 2"/>
-          <p:cNvSpPr>
-            <a:spLocks noGrp="1"/>
-          </p:cNvSpPr>
-          <p:nvPr>
-            <p:ph idx="1"/>
-          </p:nvPr>
-        </p:nvSpPr>
-        <p:spPr/>
-        <p:txBody>
-          <a:bodyPr>
+      <p:pic>
+        <p:nvPicPr>
+          <p:cNvPr id="1027" name="Picture 3"/>
+          <p:cNvPicPr>
+            <a:picLocks noChangeAspect="1" noChangeArrowheads="1"/>
+          </p:cNvPicPr>
+          <p:nvPr/>
+        </p:nvPicPr>
+        <p:blipFill rotWithShape="1">
+          <a:blip r:embed="rId2">
+            <a:extLst>
+              <a:ext uri="{28A0092B-C50C-407E-A947-70E740481C1C}">
+                <a14:useLocalDpi xmlns:a14="http://schemas.microsoft.com/office/drawing/2010/main" val="0"/>
+              </a:ext>
+            </a:extLst>
+          </a:blip>
+          <a:srcRect l="-1" r="15756"/>
+          <a:stretch/>
+        </p:blipFill>
+        <p:spPr bwMode="auto">
+          <a:xfrm>
+            <a:off x="76200" y="2209800"/>
+            <a:ext cx="6073036" cy="4566944"/>
+          </a:xfrm>
+          <a:prstGeom prst="rect">
+            <a:avLst/>
+          </a:prstGeom>
+          <a:noFill/>
+          <a:ln>
+            <a:noFill/>
+          </a:ln>
+          <a:extLst>
+            <a:ext uri="{909E8E84-426E-40dd-AFC4-6F175D3DCCD1}">
+              <a14:hiddenFill xmlns:a14="http://schemas.microsoft.com/office/drawing/2010/main">
+                <a:solidFill>
+                  <a:schemeClr val="accent1"/>
+                </a:solidFill>
+              </a14:hiddenFill>
+            </a:ext>
+            <a:ext uri="{91240B29-F687-4f45-9708-019B960494DF}">
+              <a14:hiddenLine xmlns:a14="http://schemas.microsoft.com/office/drawing/2010/main" w="9525">
+                <a:solidFill>
+                  <a:schemeClr val="tx1"/>
+                </a:solidFill>
+                <a:miter lim="800000"/>
+                <a:headEnd/>
+                <a:tailEnd/>
+              </a14:hiddenLine>
+            </a:ext>
+          </a:extLst>
+        </p:spPr>
+      </p:pic>
+      <p:pic>
+        <p:nvPicPr>
+          <p:cNvPr id="1026" name="Picture 2" descr="https://secure.gravatar.com/avatar/2865e5c1e48c8e1d35d01af820d3dab7?s=420&amp;d=https://a248.e.akamai.net/assets.github.com%2Fimages%2Fgravatars%2Fgravatar-org-420.png"/>
+          <p:cNvPicPr>
+            <a:picLocks noChangeAspect="1" noChangeArrowheads="1"/>
+          </p:cNvPicPr>
+          <p:nvPr/>
+        </p:nvPicPr>
+        <p:blipFill>
+          <a:blip r:embed="rId3" cstate="print">
+            <a:extLst>
+              <a:ext uri="{28A0092B-C50C-407E-A947-70E740481C1C}">
+                <a14:useLocalDpi xmlns:a14="http://schemas.microsoft.com/office/drawing/2010/main" val="0"/>
+              </a:ext>
+            </a:extLst>
+          </a:blip>
+          <a:srcRect/>
+          <a:stretch>
+            <a:fillRect/>
+          </a:stretch>
+        </p:blipFill>
+        <p:spPr bwMode="auto">
+          <a:xfrm>
+            <a:off x="3771900" y="0"/>
+            <a:ext cx="1600200" cy="1600201"/>
+          </a:xfrm>
+          <a:prstGeom prst="rect">
+            <a:avLst/>
+          </a:prstGeom>
+          <a:noFill/>
+          <a:extLst>
+            <a:ext uri="{909E8E84-426E-40dd-AFC4-6F175D3DCCD1}">
+              <a14:hiddenFill xmlns:a14="http://schemas.microsoft.com/office/drawing/2010/main">
+                <a:solidFill>
+                  <a:srgbClr val="FFFFFF"/>
+                </a:solidFill>
+              </a14:hiddenFill>
+            </a:ext>
+          </a:extLst>
+        </p:spPr>
+      </p:pic>
+      <p:sp>
+        <p:nvSpPr>
+          <p:cNvPr id="4" name="Rectangle 3"/>
+          <p:cNvSpPr/>
+          <p:nvPr/>
+        </p:nvSpPr>
+        <p:spPr>
+          <a:xfrm>
+            <a:off x="7391400" y="0"/>
+            <a:ext cx="1752600" cy="1676400"/>
+          </a:xfrm>
+          <a:prstGeom prst="rect">
+            <a:avLst/>
+          </a:prstGeom>
+          <a:solidFill>
+            <a:schemeClr val="bg1"/>
+          </a:solidFill>
+          <a:ln>
+            <a:solidFill>
+              <a:schemeClr val="bg1"/>
+            </a:solidFill>
+          </a:ln>
+        </p:spPr>
+        <p:style>
+          <a:lnRef idx="2">
+            <a:schemeClr val="accent1">
+              <a:shade val="50000"/>
+            </a:schemeClr>
+          </a:lnRef>
+          <a:fillRef idx="1">
+            <a:schemeClr val="accent1"/>
+          </a:fillRef>
+          <a:effectRef idx="0">
+            <a:schemeClr val="accent1"/>
+          </a:effectRef>
+          <a:fontRef idx="minor">
+            <a:schemeClr val="lt1"/>
+          </a:fontRef>
+        </p:style>
+        <p:txBody>
+          <a:bodyPr rtlCol="0" anchor="ctr"/>
+          <a:lstStyle/>
+          <a:p>
+            <a:pPr algn="ctr"/>
+            <a:endParaRPr lang="en-US"/>
+          </a:p>
+        </p:txBody>
+      </p:sp>
+      <p:sp>
+        <p:nvSpPr>
+          <p:cNvPr id="9" name="Content Placeholder 2"/>
+          <p:cNvSpPr txBox="1">
+            <a:spLocks/>
+          </p:cNvSpPr>
+          <p:nvPr/>
+        </p:nvSpPr>
+        <p:spPr>
+          <a:xfrm>
+            <a:off x="6149236" y="2209800"/>
+            <a:ext cx="3147164" cy="4566944"/>
+          </a:xfrm>
+          <a:prstGeom prst="rect">
+            <a:avLst/>
+          </a:prstGeom>
+        </p:spPr>
+        <p:txBody>
+          <a:bodyPr vert="horz" lIns="91440" tIns="45720" rIns="91440" bIns="45720" rtlCol="0">
             <a:normAutofit/>
           </a:bodyPr>
-          <a:lstStyle/>
-          <a:p>
-            <a:r>
-              <a:rPr lang="en-US" dirty="0" err="1" smtClean="0"/>
-              <a:t>Chocolatey</a:t>
-            </a:r>
-            <a:r>
-              <a:rPr lang="en-US" dirty="0" smtClean="0"/>
-              <a:t> </a:t>
-            </a:r>
-            <a:r>
-              <a:rPr lang="en-US" dirty="0" err="1" smtClean="0"/>
-              <a:t>NuGet</a:t>
-            </a:r>
-            <a:r>
-              <a:rPr lang="en-US" dirty="0" smtClean="0"/>
-              <a:t> – local machine repository</a:t>
-            </a:r>
-          </a:p>
-          <a:p>
-            <a:pPr lvl="1"/>
-            <a:r>
-              <a:rPr lang="en-US" dirty="0" smtClean="0"/>
-              <a:t>Think ruby gems on steroids</a:t>
-            </a:r>
-          </a:p>
-          <a:p>
-            <a:pPr lvl="1"/>
-            <a:r>
-              <a:rPr lang="en-US" dirty="0" smtClean="0"/>
-              <a:t>Think apt-get for windows</a:t>
-            </a:r>
-          </a:p>
-          <a:p>
-            <a:r>
-              <a:rPr lang="en-US" dirty="0" smtClean="0"/>
-              <a:t>What is it?</a:t>
-            </a:r>
-          </a:p>
-          <a:p>
-            <a:pPr lvl="1"/>
-            <a:r>
-              <a:rPr lang="en-US" dirty="0" smtClean="0"/>
-              <a:t>PowerShell instructions for “retrieval, configuration, and installation of software”</a:t>
-            </a:r>
-          </a:p>
-          <a:p>
-            <a:pPr lvl="1"/>
-            <a:r>
-              <a:rPr lang="en-US" dirty="0" smtClean="0"/>
-              <a:t>Global PowerShell Execution Engine</a:t>
+          <a:lstStyle>
+            <a:lvl1pPr marL="342900" indent="-342900" algn="l" defTabSz="914400" rtl="0" eaLnBrk="1" latinLnBrk="0" hangingPunct="1">
+              <a:spcBef>
+                <a:spcPct val="20000"/>
+              </a:spcBef>
+              <a:buFont typeface="Arial" pitchFamily="34" charset="0"/>
+              <a:buChar char="•"/>
+              <a:defRPr sz="3200" kern="1200">
+                <a:solidFill>
+                  <a:schemeClr val="tx1"/>
+                </a:solidFill>
+                <a:latin typeface="+mn-lt"/>
+                <a:ea typeface="+mn-ea"/>
+                <a:cs typeface="+mn-cs"/>
+              </a:defRPr>
+            </a:lvl1pPr>
+            <a:lvl2pPr marL="742950" indent="-285750" algn="l" defTabSz="914400" rtl="0" eaLnBrk="1" latinLnBrk="0" hangingPunct="1">
+              <a:spcBef>
+                <a:spcPct val="20000"/>
+              </a:spcBef>
+              <a:buFont typeface="Arial" pitchFamily="34" charset="0"/>
+              <a:buChar char="–"/>
+              <a:defRPr sz="2800" kern="1200">
+                <a:solidFill>
+                  <a:schemeClr val="tx1"/>
+                </a:solidFill>
+                <a:latin typeface="+mn-lt"/>
+                <a:ea typeface="+mn-ea"/>
+                <a:cs typeface="+mn-cs"/>
+              </a:defRPr>
+            </a:lvl2pPr>
+            <a:lvl3pPr marL="1143000" indent="-228600" algn="l" defTabSz="914400" rtl="0" eaLnBrk="1" latinLnBrk="0" hangingPunct="1">
+              <a:spcBef>
+                <a:spcPct val="20000"/>
+              </a:spcBef>
+              <a:buFont typeface="Arial" pitchFamily="34" charset="0"/>
+              <a:buChar char="•"/>
+              <a:defRPr sz="2400" kern="1200">
+                <a:solidFill>
+                  <a:schemeClr val="tx1"/>
+                </a:solidFill>
+                <a:latin typeface="+mn-lt"/>
+                <a:ea typeface="+mn-ea"/>
+                <a:cs typeface="+mn-cs"/>
+              </a:defRPr>
+            </a:lvl3pPr>
+            <a:lvl4pPr marL="1600200" indent="-228600" algn="l" defTabSz="914400" rtl="0" eaLnBrk="1" latinLnBrk="0" hangingPunct="1">
+              <a:spcBef>
+                <a:spcPct val="20000"/>
+              </a:spcBef>
+              <a:buFont typeface="Arial" pitchFamily="34" charset="0"/>
+              <a:buChar char="–"/>
+              <a:defRPr sz="2000" kern="1200">
+                <a:solidFill>
+                  <a:schemeClr val="tx1"/>
+                </a:solidFill>
+                <a:latin typeface="+mn-lt"/>
+                <a:ea typeface="+mn-ea"/>
+                <a:cs typeface="+mn-cs"/>
+              </a:defRPr>
+            </a:lvl4pPr>
+            <a:lvl5pPr marL="2057400" indent="-228600" algn="l" defTabSz="914400" rtl="0" eaLnBrk="1" latinLnBrk="0" hangingPunct="1">
+              <a:spcBef>
+                <a:spcPct val="20000"/>
+              </a:spcBef>
+              <a:buFont typeface="Arial" pitchFamily="34" charset="0"/>
+              <a:buChar char="»"/>
+              <a:defRPr sz="2000" kern="1200">
+                <a:solidFill>
+                  <a:schemeClr val="tx1"/>
+                </a:solidFill>
+                <a:latin typeface="+mn-lt"/>
+                <a:ea typeface="+mn-ea"/>
+                <a:cs typeface="+mn-cs"/>
+              </a:defRPr>
+            </a:lvl5pPr>
+            <a:lvl6pPr marL="2514600" indent="-228600" algn="l" defTabSz="914400" rtl="0" eaLnBrk="1" latinLnBrk="0" hangingPunct="1">
+              <a:spcBef>
+                <a:spcPct val="20000"/>
+              </a:spcBef>
+              <a:buFont typeface="Arial" pitchFamily="34" charset="0"/>
+              <a:buChar char="•"/>
+              <a:defRPr sz="2000" kern="1200">
+                <a:solidFill>
+                  <a:schemeClr val="tx1"/>
+                </a:solidFill>
+                <a:latin typeface="+mn-lt"/>
+                <a:ea typeface="+mn-ea"/>
+                <a:cs typeface="+mn-cs"/>
+              </a:defRPr>
+            </a:lvl6pPr>
+            <a:lvl7pPr marL="2971800" indent="-228600" algn="l" defTabSz="914400" rtl="0" eaLnBrk="1" latinLnBrk="0" hangingPunct="1">
+              <a:spcBef>
+                <a:spcPct val="20000"/>
+              </a:spcBef>
+              <a:buFont typeface="Arial" pitchFamily="34" charset="0"/>
+              <a:buChar char="•"/>
+              <a:defRPr sz="2000" kern="1200">
+                <a:solidFill>
+                  <a:schemeClr val="tx1"/>
+                </a:solidFill>
+                <a:latin typeface="+mn-lt"/>
+                <a:ea typeface="+mn-ea"/>
+                <a:cs typeface="+mn-cs"/>
+              </a:defRPr>
+            </a:lvl7pPr>
+            <a:lvl8pPr marL="3429000" indent="-228600" algn="l" defTabSz="914400" rtl="0" eaLnBrk="1" latinLnBrk="0" hangingPunct="1">
+              <a:spcBef>
+                <a:spcPct val="20000"/>
+              </a:spcBef>
+              <a:buFont typeface="Arial" pitchFamily="34" charset="0"/>
+              <a:buChar char="•"/>
+              <a:defRPr sz="2000" kern="1200">
+                <a:solidFill>
+                  <a:schemeClr val="tx1"/>
+                </a:solidFill>
+                <a:latin typeface="+mn-lt"/>
+                <a:ea typeface="+mn-ea"/>
+                <a:cs typeface="+mn-cs"/>
+              </a:defRPr>
+            </a:lvl8pPr>
+            <a:lvl9pPr marL="3886200" indent="-228600" algn="l" defTabSz="914400" rtl="0" eaLnBrk="1" latinLnBrk="0" hangingPunct="1">
+              <a:spcBef>
+                <a:spcPct val="20000"/>
+              </a:spcBef>
+              <a:buFont typeface="Arial" pitchFamily="34" charset="0"/>
+              <a:buChar char="•"/>
+              <a:defRPr sz="2000" kern="1200">
+                <a:solidFill>
+                  <a:schemeClr val="tx1"/>
+                </a:solidFill>
+                <a:latin typeface="+mn-lt"/>
+                <a:ea typeface="+mn-ea"/>
+                <a:cs typeface="+mn-cs"/>
+              </a:defRPr>
+            </a:lvl9pPr>
+          </a:lstStyle>
+          <a:p>
+            <a:r>
+              <a:rPr lang="en-US" dirty="0"/>
+              <a:t>World-class </a:t>
+            </a:r>
+            <a:r>
+              <a:rPr lang="en-US" dirty="0" smtClean="0"/>
+              <a:t>Clients</a:t>
+            </a:r>
+          </a:p>
+          <a:p>
+            <a:r>
+              <a:rPr lang="en-US" dirty="0"/>
+              <a:t>Vibrant </a:t>
+            </a:r>
+            <a:r>
+              <a:rPr lang="en-US" dirty="0" smtClean="0"/>
+              <a:t>Culture</a:t>
+            </a:r>
+          </a:p>
+          <a:p>
+            <a:r>
+              <a:rPr lang="en-US" dirty="0"/>
+              <a:t>Benefits </a:t>
+            </a:r>
+            <a:r>
+              <a:rPr lang="en-US" dirty="0" smtClean="0"/>
+              <a:t>Philosophy</a:t>
+            </a:r>
+          </a:p>
+          <a:p>
+            <a:r>
+              <a:rPr lang="en-US" dirty="0" smtClean="0"/>
+              <a:t>http://vml.com </a:t>
             </a:r>
           </a:p>
           <a:p>
             <a:endParaRPr lang="en-US" dirty="0" smtClean="0"/>
           </a:p>
+          <a:p>
+            <a:endParaRPr lang="en-US" dirty="0"/>
+          </a:p>
         </p:txBody>
       </p:sp>
     </p:spTree>
+    <p:extLst>
+      <p:ext uri="{BB962C8B-B14F-4D97-AF65-F5344CB8AC3E}">
+        <p14:creationId xmlns:p14="http://schemas.microsoft.com/office/powerpoint/2010/main" val="3823840530"/>
+      </p:ext>
+    </p:extLst>
   </p:cSld>
   <p:clrMapOvr>
     <a:masterClrMapping/>
@@ -6238,7 +7607,7 @@
   <p:timing>
     <p:tnLst>
       <p:par>
-        <p:cTn id="1" dur="indefinite" restart="never" nodeType="tmRoot"/>
+        <p:cTn xmlns:p14="http://schemas.microsoft.com/office/powerpoint/2010/main" id="1" dur="indefinite" restart="never" nodeType="tmRoot"/>
       </p:par>
     </p:tnLst>
   </p:timing>
@@ -6279,7 +7648,11 @@
           <a:p>
             <a:r>
               <a:rPr lang="en-US" dirty="0" smtClean="0"/>
-              <a:t>What does it mean?</a:t>
+              <a:t>What the …. </a:t>
+            </a:r>
+            <a:r>
+              <a:rPr lang="en-US" smtClean="0"/>
+              <a:t>Is Chocolatey?</a:t>
             </a:r>
             <a:endParaRPr lang="en-US" dirty="0"/>
           </a:p>
@@ -6297,75 +7670,107 @@
         </p:nvSpPr>
         <p:spPr/>
         <p:txBody>
-          <a:bodyPr>
-            <a:normAutofit/>
-          </a:bodyPr>
-          <a:lstStyle/>
-          <a:p>
+          <a:bodyPr/>
+          <a:lstStyle/>
+          <a:p>
+            <a:r>
+              <a:rPr lang="en-US" dirty="0" smtClean="0"/>
+              <a:t>Familiar w/</a:t>
+            </a:r>
             <a:r>
               <a:rPr lang="en-US" dirty="0" err="1" smtClean="0"/>
-              <a:t>Chocolatey</a:t>
-            </a:r>
-            <a:r>
-              <a:rPr lang="en-US" dirty="0" smtClean="0"/>
-              <a:t> can download a native installer (</a:t>
-            </a:r>
-            <a:r>
-              <a:rPr lang="en-US" dirty="0" err="1" smtClean="0"/>
-              <a:t>msi</a:t>
-            </a:r>
-            <a:r>
-              <a:rPr lang="en-US" dirty="0" smtClean="0"/>
-              <a:t> or install.exe)</a:t>
-            </a:r>
-          </a:p>
-          <a:p>
-            <a:r>
-              <a:rPr lang="en-US" dirty="0" smtClean="0"/>
-              <a:t>Then execute it silently</a:t>
-            </a:r>
-          </a:p>
-          <a:p>
-            <a:r>
-              <a:rPr lang="en-US" dirty="0" smtClean="0"/>
-              <a:t>Then perform additional </a:t>
-            </a:r>
-            <a:r>
-              <a:rPr lang="en-US" dirty="0" smtClean="0"/>
-              <a:t>setup</a:t>
-            </a:r>
-          </a:p>
-          <a:p>
-            <a:endParaRPr lang="en-US" dirty="0" smtClean="0"/>
-          </a:p>
-          <a:p>
-            <a:r>
-              <a:rPr lang="en-US" dirty="0" smtClean="0"/>
-              <a:t>BUT IT CAN DO OTHER THINGS AS WELL</a:t>
-            </a:r>
-            <a:endParaRPr lang="en-US" dirty="0" smtClean="0"/>
-          </a:p>
-          <a:p>
-            <a:r>
-              <a:rPr lang="en-US" dirty="0" smtClean="0"/>
-              <a:t>It’s </a:t>
-            </a:r>
-            <a:r>
-              <a:rPr lang="en-US" dirty="0" err="1" smtClean="0"/>
-              <a:t>PowerShell</a:t>
-            </a:r>
-            <a:r>
-              <a:rPr lang="en-US" dirty="0" smtClean="0"/>
-              <a:t>, you can do nearly </a:t>
-            </a:r>
-            <a:r>
-              <a:rPr lang="en-US" b="1" i="1" dirty="0" smtClean="0"/>
-              <a:t>anything</a:t>
-            </a:r>
-            <a:endParaRPr lang="en-US" b="1" i="1" dirty="0"/>
-          </a:p>
-        </p:txBody>
-      </p:sp>
+              <a:t>Debian</a:t>
+            </a:r>
+            <a:r>
+              <a:rPr lang="en-US" dirty="0" smtClean="0"/>
+              <a:t>? apt-get?</a:t>
+            </a:r>
+          </a:p>
+          <a:p>
+            <a:r>
+              <a:rPr lang="en-US" dirty="0" smtClean="0"/>
+              <a:t>APT – advanced packaging tool</a:t>
+            </a:r>
+          </a:p>
+          <a:p>
+            <a:pPr lvl="1"/>
+            <a:r>
+              <a:rPr lang="en-US" dirty="0" smtClean="0"/>
+              <a:t>Automates retrieval, configuration, and installation of software</a:t>
+            </a:r>
+          </a:p>
+          <a:p>
+            <a:r>
+              <a:rPr lang="en-US" dirty="0" smtClean="0"/>
+              <a:t>Windows hasn’t really had anything take off</a:t>
+            </a:r>
+          </a:p>
+        </p:txBody>
+      </p:sp>
+      <p:pic>
+        <p:nvPicPr>
+          <p:cNvPr id="4" name="Picture 2"/>
+          <p:cNvPicPr>
+            <a:picLocks noChangeAspect="1" noChangeArrowheads="1"/>
+          </p:cNvPicPr>
+          <p:nvPr/>
+        </p:nvPicPr>
+        <p:blipFill>
+          <a:blip r:embed="rId3">
+            <a:extLst>
+              <a:ext uri="{28A0092B-C50C-407E-A947-70E740481C1C}">
+                <a14:useLocalDpi xmlns:a14="http://schemas.microsoft.com/office/drawing/2010/main" val="0"/>
+              </a:ext>
+            </a:extLst>
+          </a:blip>
+          <a:srcRect/>
+          <a:stretch>
+            <a:fillRect/>
+          </a:stretch>
+        </p:blipFill>
+        <p:spPr bwMode="auto">
+          <a:xfrm>
+            <a:off x="2667000" y="4267200"/>
+            <a:ext cx="3810000" cy="2143125"/>
+          </a:xfrm>
+          <a:prstGeom prst="rect">
+            <a:avLst/>
+          </a:prstGeom>
+          <a:noFill/>
+          <a:ln>
+            <a:noFill/>
+          </a:ln>
+          <a:effectLst/>
+          <a:extLst>
+            <a:ext uri="{909E8E84-426E-40dd-AFC4-6F175D3DCCD1}">
+              <a14:hiddenFill xmlns:a14="http://schemas.microsoft.com/office/drawing/2010/main">
+                <a:solidFill>
+                  <a:schemeClr val="accent1"/>
+                </a:solidFill>
+              </a14:hiddenFill>
+            </a:ext>
+            <a:ext uri="{91240B29-F687-4f45-9708-019B960494DF}">
+              <a14:hiddenLine xmlns:a14="http://schemas.microsoft.com/office/drawing/2010/main" w="9525">
+                <a:solidFill>
+                  <a:schemeClr val="tx1"/>
+                </a:solidFill>
+                <a:miter lim="800000"/>
+                <a:headEnd/>
+                <a:tailEnd/>
+              </a14:hiddenLine>
+            </a:ext>
+            <a:ext uri="{AF507438-7753-43e0-B8FC-AC1667EBCBE1}">
+              <a14:hiddenEffects xmlns:a14="http://schemas.microsoft.com/office/drawing/2010/main">
+                <a:effectLst>
+                  <a:outerShdw dist="35921" dir="2700000" algn="ctr" rotWithShape="0">
+                    <a:schemeClr val="bg2"/>
+                  </a:outerShdw>
+                </a:effectLst>
+              </a14:hiddenEffects>
+            </a:ext>
+          </a:extLst>
+        </p:spPr>
+      </p:pic>
     </p:spTree>
   </p:cSld>
   <p:clrMapOvr>
@@ -6374,7 +7779,7 @@
   <p:timing>
     <p:tnLst>
       <p:par>
-        <p:cTn id="1" dur="indefinite" restart="never" nodeType="tmRoot"/>
+        <p:cTn xmlns:p14="http://schemas.microsoft.com/office/powerpoint/2010/main" id="1" dur="indefinite" restart="never" nodeType="tmRoot"/>
       </p:par>
     </p:tnLst>
   </p:timing>
@@ -6382,6 +7787,265 @@
 </file>
 
 <file path=ppt/slides/slide6.xml><?xml version="1.0" encoding="utf-8"?>
+<p:sld xmlns:a="http://schemas.openxmlformats.org/drawingml/2006/main" xmlns:r="http://schemas.openxmlformats.org/officeDocument/2006/relationships" xmlns:p="http://schemas.openxmlformats.org/presentationml/2006/main">
+  <p:cSld>
+    <p:spTree>
+      <p:nvGrpSpPr>
+        <p:cNvPr id="1" name=""/>
+        <p:cNvGrpSpPr/>
+        <p:nvPr/>
+      </p:nvGrpSpPr>
+      <p:grpSpPr>
+        <a:xfrm>
+          <a:off x="0" y="0"/>
+          <a:ext cx="0" cy="0"/>
+          <a:chOff x="0" y="0"/>
+          <a:chExt cx="0" cy="0"/>
+        </a:xfrm>
+      </p:grpSpPr>
+      <p:sp>
+        <p:nvSpPr>
+          <p:cNvPr id="2" name="Title 1"/>
+          <p:cNvSpPr>
+            <a:spLocks noGrp="1"/>
+          </p:cNvSpPr>
+          <p:nvPr>
+            <p:ph type="title"/>
+          </p:nvPr>
+        </p:nvSpPr>
+        <p:spPr/>
+        <p:txBody>
+          <a:bodyPr/>
+          <a:lstStyle/>
+          <a:p>
+            <a:r>
+              <a:rPr lang="en-US" dirty="0" smtClean="0"/>
+              <a:t>Chocolatey</a:t>
+            </a:r>
+            <a:endParaRPr lang="en-US" dirty="0"/>
+          </a:p>
+        </p:txBody>
+      </p:sp>
+      <p:sp>
+        <p:nvSpPr>
+          <p:cNvPr id="3" name="Content Placeholder 2"/>
+          <p:cNvSpPr>
+            <a:spLocks noGrp="1"/>
+          </p:cNvSpPr>
+          <p:nvPr>
+            <p:ph idx="1"/>
+          </p:nvPr>
+        </p:nvSpPr>
+        <p:spPr/>
+        <p:txBody>
+          <a:bodyPr>
+            <a:normAutofit/>
+          </a:bodyPr>
+          <a:lstStyle/>
+          <a:p>
+            <a:r>
+              <a:rPr lang="en-US" dirty="0" err="1" smtClean="0"/>
+              <a:t>Chocolatey</a:t>
+            </a:r>
+            <a:r>
+              <a:rPr lang="en-US" dirty="0" smtClean="0"/>
+              <a:t> </a:t>
+            </a:r>
+            <a:r>
+              <a:rPr lang="en-US" dirty="0" err="1" smtClean="0"/>
+              <a:t>NuGet</a:t>
+            </a:r>
+            <a:r>
+              <a:rPr lang="en-US" dirty="0" smtClean="0"/>
+              <a:t> – local machine repository</a:t>
+            </a:r>
+          </a:p>
+          <a:p>
+            <a:pPr lvl="1"/>
+            <a:r>
+              <a:rPr lang="en-US" dirty="0" smtClean="0"/>
+              <a:t>Think ruby gems on steroids</a:t>
+            </a:r>
+          </a:p>
+          <a:p>
+            <a:pPr lvl="1"/>
+            <a:r>
+              <a:rPr lang="en-US" dirty="0" smtClean="0"/>
+              <a:t>Think apt-get for windows</a:t>
+            </a:r>
+          </a:p>
+          <a:p>
+            <a:r>
+              <a:rPr lang="en-US" dirty="0" smtClean="0"/>
+              <a:t>What is it?</a:t>
+            </a:r>
+          </a:p>
+          <a:p>
+            <a:pPr lvl="1"/>
+            <a:r>
+              <a:rPr lang="en-US" dirty="0" smtClean="0"/>
+              <a:t>PowerShell instructions for “retrieval, configuration, and installation of software”</a:t>
+            </a:r>
+          </a:p>
+          <a:p>
+            <a:pPr lvl="1"/>
+            <a:r>
+              <a:rPr lang="en-US" dirty="0" smtClean="0"/>
+              <a:t>Global PowerShell Execution Engine</a:t>
+            </a:r>
+          </a:p>
+          <a:p>
+            <a:endParaRPr lang="en-US" dirty="0" smtClean="0"/>
+          </a:p>
+        </p:txBody>
+      </p:sp>
+    </p:spTree>
+  </p:cSld>
+  <p:clrMapOvr>
+    <a:masterClrMapping/>
+  </p:clrMapOvr>
+  <p:timing>
+    <p:tnLst>
+      <p:par>
+        <p:cTn xmlns:p14="http://schemas.microsoft.com/office/powerpoint/2010/main" id="1" dur="indefinite" restart="never" nodeType="tmRoot"/>
+      </p:par>
+    </p:tnLst>
+  </p:timing>
+</p:sld>
+</file>
+
+<file path=ppt/slides/slide7.xml><?xml version="1.0" encoding="utf-8"?>
+<p:sld xmlns:a="http://schemas.openxmlformats.org/drawingml/2006/main" xmlns:r="http://schemas.openxmlformats.org/officeDocument/2006/relationships" xmlns:p="http://schemas.openxmlformats.org/presentationml/2006/main">
+  <p:cSld>
+    <p:spTree>
+      <p:nvGrpSpPr>
+        <p:cNvPr id="1" name=""/>
+        <p:cNvGrpSpPr/>
+        <p:nvPr/>
+      </p:nvGrpSpPr>
+      <p:grpSpPr>
+        <a:xfrm>
+          <a:off x="0" y="0"/>
+          <a:ext cx="0" cy="0"/>
+          <a:chOff x="0" y="0"/>
+          <a:chExt cx="0" cy="0"/>
+        </a:xfrm>
+      </p:grpSpPr>
+      <p:sp>
+        <p:nvSpPr>
+          <p:cNvPr id="2" name="Title 1"/>
+          <p:cNvSpPr>
+            <a:spLocks noGrp="1"/>
+          </p:cNvSpPr>
+          <p:nvPr>
+            <p:ph type="title"/>
+          </p:nvPr>
+        </p:nvSpPr>
+        <p:spPr/>
+        <p:txBody>
+          <a:bodyPr/>
+          <a:lstStyle/>
+          <a:p>
+            <a:r>
+              <a:rPr lang="en-US" dirty="0" smtClean="0"/>
+              <a:t>What does it mean?</a:t>
+            </a:r>
+            <a:endParaRPr lang="en-US" dirty="0"/>
+          </a:p>
+        </p:txBody>
+      </p:sp>
+      <p:sp>
+        <p:nvSpPr>
+          <p:cNvPr id="3" name="Content Placeholder 2"/>
+          <p:cNvSpPr>
+            <a:spLocks noGrp="1"/>
+          </p:cNvSpPr>
+          <p:nvPr>
+            <p:ph idx="1"/>
+          </p:nvPr>
+        </p:nvSpPr>
+        <p:spPr/>
+        <p:txBody>
+          <a:bodyPr>
+            <a:normAutofit/>
+          </a:bodyPr>
+          <a:lstStyle/>
+          <a:p>
+            <a:r>
+              <a:rPr lang="en-US" dirty="0" err="1" smtClean="0"/>
+              <a:t>Chocolatey</a:t>
+            </a:r>
+            <a:r>
+              <a:rPr lang="en-US" dirty="0" smtClean="0"/>
+              <a:t> can download a native installer (</a:t>
+            </a:r>
+            <a:r>
+              <a:rPr lang="en-US" dirty="0" err="1" smtClean="0"/>
+              <a:t>msi</a:t>
+            </a:r>
+            <a:r>
+              <a:rPr lang="en-US" dirty="0" smtClean="0"/>
+              <a:t> or install.exe)</a:t>
+            </a:r>
+          </a:p>
+          <a:p>
+            <a:r>
+              <a:rPr lang="en-US" dirty="0" smtClean="0"/>
+              <a:t>Then execute it silently</a:t>
+            </a:r>
+          </a:p>
+          <a:p>
+            <a:r>
+              <a:rPr lang="en-US" dirty="0" smtClean="0"/>
+              <a:t>Then perform additional setup</a:t>
+            </a:r>
+          </a:p>
+          <a:p>
+            <a:endParaRPr lang="en-US" dirty="0" smtClean="0"/>
+          </a:p>
+          <a:p>
+            <a:r>
+              <a:rPr lang="en-US" dirty="0" smtClean="0"/>
+              <a:t>BUT IT CAN DO OTHER THINGS AS WELL</a:t>
+            </a:r>
+          </a:p>
+          <a:p>
+            <a:r>
+              <a:rPr lang="en-US" dirty="0" smtClean="0"/>
+              <a:t>It’s </a:t>
+            </a:r>
+            <a:r>
+              <a:rPr lang="en-US" dirty="0" err="1" smtClean="0"/>
+              <a:t>PowerShell</a:t>
+            </a:r>
+            <a:r>
+              <a:rPr lang="en-US" dirty="0" smtClean="0"/>
+              <a:t>, you can do nearly </a:t>
+            </a:r>
+            <a:r>
+              <a:rPr lang="en-US" b="1" i="1" dirty="0" smtClean="0"/>
+              <a:t>anything</a:t>
+            </a:r>
+            <a:endParaRPr lang="en-US" b="1" i="1" dirty="0"/>
+          </a:p>
+        </p:txBody>
+      </p:sp>
+    </p:spTree>
+  </p:cSld>
+  <p:clrMapOvr>
+    <a:masterClrMapping/>
+  </p:clrMapOvr>
+  <p:timing>
+    <p:tnLst>
+      <p:par>
+        <p:cTn xmlns:p14="http://schemas.microsoft.com/office/powerpoint/2010/main" id="1" dur="indefinite" restart="never" nodeType="tmRoot"/>
+      </p:par>
+    </p:tnLst>
+  </p:timing>
+</p:sld>
+</file>
+
+<file path=ppt/slides/slide8.xml><?xml version="1.0" encoding="utf-8"?>
 <p:sld xmlns:a="http://schemas.openxmlformats.org/drawingml/2006/main" xmlns:r="http://schemas.openxmlformats.org/officeDocument/2006/relationships" xmlns:p="http://schemas.openxmlformats.org/presentationml/2006/main">
   <p:cSld>
     <p:spTree>
@@ -6479,14 +8143,14 @@
           </a:ln>
           <a:effectLst/>
           <a:extLst>
-            <a:ext uri="{909E8E84-426E-40DD-AFC4-6F175D3DCCD1}">
+            <a:ext uri="{909E8E84-426E-40dd-AFC4-6F175D3DCCD1}">
               <a14:hiddenFill xmlns:a14="http://schemas.microsoft.com/office/drawing/2010/main">
                 <a:solidFill>
                   <a:schemeClr val="accent1"/>
                 </a:solidFill>
               </a14:hiddenFill>
             </a:ext>
-            <a:ext uri="{91240B29-F687-4F45-9708-019B960494DF}">
+            <a:ext uri="{91240B29-F687-4f45-9708-019B960494DF}">
               <a14:hiddenLine xmlns:a14="http://schemas.microsoft.com/office/drawing/2010/main" w="9525">
                 <a:solidFill>
                   <a:schemeClr val="tx1"/>
@@ -6496,7 +8160,7 @@
                 <a:tailEnd/>
               </a14:hiddenLine>
             </a:ext>
-            <a:ext uri="{AF507438-7753-43E0-B8FC-AC1667EBCBE1}">
+            <a:ext uri="{AF507438-7753-43e0-B8FC-AC1667EBCBE1}">
               <a14:hiddenEffects xmlns:a14="http://schemas.microsoft.com/office/drawing/2010/main">
                 <a:effectLst>
                   <a:outerShdw dist="35921" dir="2700000" algn="ctr" rotWithShape="0">
@@ -6521,14 +8185,14 @@
   <p:timing>
     <p:tnLst>
       <p:par>
-        <p:cTn id="1" dur="indefinite" restart="never" nodeType="tmRoot"/>
+        <p:cTn xmlns:p14="http://schemas.microsoft.com/office/powerpoint/2010/main" id="1" dur="indefinite" restart="never" nodeType="tmRoot"/>
       </p:par>
     </p:tnLst>
   </p:timing>
 </p:sld>
 </file>
 
-<file path=ppt/slides/slide7.xml><?xml version="1.0" encoding="utf-8"?>
+<file path=ppt/slides/slide9.xml><?xml version="1.0" encoding="utf-8"?>
 <p:sld xmlns:a="http://schemas.openxmlformats.org/drawingml/2006/main" xmlns:r="http://schemas.openxmlformats.org/officeDocument/2006/relationships" xmlns:p="http://schemas.openxmlformats.org/presentationml/2006/main">
   <p:cSld>
     <p:spTree>
@@ -6660,14 +8324,14 @@
           </a:ln>
           <a:effectLst/>
           <a:extLst>
-            <a:ext uri="{909E8E84-426E-40DD-AFC4-6F175D3DCCD1}">
+            <a:ext uri="{909E8E84-426E-40dd-AFC4-6F175D3DCCD1}">
               <a14:hiddenFill xmlns:a14="http://schemas.microsoft.com/office/drawing/2010/main">
                 <a:solidFill>
                   <a:schemeClr val="accent1"/>
                 </a:solidFill>
               </a14:hiddenFill>
             </a:ext>
-            <a:ext uri="{91240B29-F687-4F45-9708-019B960494DF}">
+            <a:ext uri="{91240B29-F687-4f45-9708-019B960494DF}">
               <a14:hiddenLine xmlns:a14="http://schemas.microsoft.com/office/drawing/2010/main" w="9525">
                 <a:solidFill>
                   <a:schemeClr val="tx1"/>
@@ -6677,7 +8341,7 @@
                 <a:tailEnd/>
               </a14:hiddenLine>
             </a:ext>
-            <a:ext uri="{AF507438-7753-43E0-B8FC-AC1667EBCBE1}">
+            <a:ext uri="{AF507438-7753-43e0-B8FC-AC1667EBCBE1}">
               <a14:hiddenEffects xmlns:a14="http://schemas.microsoft.com/office/drawing/2010/main">
                 <a:effectLst>
                   <a:outerShdw dist="35921" dir="2700000" algn="ctr" rotWithShape="0">
@@ -6702,318 +8366,7 @@
   <p:timing>
     <p:tnLst>
       <p:par>
-        <p:cTn id="1" dur="indefinite" restart="never" nodeType="tmRoot"/>
-      </p:par>
-    </p:tnLst>
-  </p:timing>
-</p:sld>
-</file>
-
-<file path=ppt/slides/slide8.xml><?xml version="1.0" encoding="utf-8"?>
-<p:sld xmlns:a="http://schemas.openxmlformats.org/drawingml/2006/main" xmlns:r="http://schemas.openxmlformats.org/officeDocument/2006/relationships" xmlns:p="http://schemas.openxmlformats.org/presentationml/2006/main">
-  <p:cSld>
-    <p:spTree>
-      <p:nvGrpSpPr>
-        <p:cNvPr id="1" name=""/>
-        <p:cNvGrpSpPr/>
-        <p:nvPr/>
-      </p:nvGrpSpPr>
-      <p:grpSpPr>
-        <a:xfrm>
-          <a:off x="0" y="0"/>
-          <a:ext cx="0" cy="0"/>
-          <a:chOff x="0" y="0"/>
-          <a:chExt cx="0" cy="0"/>
-        </a:xfrm>
-      </p:grpSpPr>
-      <p:sp>
-        <p:nvSpPr>
-          <p:cNvPr id="2" name="Title 1"/>
-          <p:cNvSpPr>
-            <a:spLocks noGrp="1"/>
-          </p:cNvSpPr>
-          <p:nvPr>
-            <p:ph type="title"/>
-          </p:nvPr>
-        </p:nvSpPr>
-        <p:spPr/>
-        <p:txBody>
-          <a:bodyPr/>
-          <a:lstStyle/>
-          <a:p>
-            <a:r>
-              <a:rPr lang="en-US" dirty="0" smtClean="0"/>
-              <a:t>Install Chocolatey?</a:t>
-            </a:r>
-            <a:endParaRPr lang="en-US" dirty="0"/>
-          </a:p>
-        </p:txBody>
-      </p:sp>
-      <p:sp>
-        <p:nvSpPr>
-          <p:cNvPr id="3" name="Content Placeholder 2"/>
-          <p:cNvSpPr>
-            <a:spLocks noGrp="1"/>
-          </p:cNvSpPr>
-          <p:nvPr>
-            <p:ph idx="1"/>
-          </p:nvPr>
-        </p:nvSpPr>
-        <p:spPr/>
-        <p:txBody>
-          <a:bodyPr/>
-          <a:lstStyle/>
-          <a:p>
-            <a:r>
-              <a:rPr lang="en-US" dirty="0" smtClean="0"/>
-              <a:t>Listed on chocolatey.org</a:t>
-            </a:r>
-          </a:p>
-          <a:p>
-            <a:r>
-              <a:rPr lang="en-US" dirty="0"/>
-              <a:t>@</a:t>
-            </a:r>
-            <a:r>
-              <a:rPr lang="en-US" dirty="0" err="1"/>
-              <a:t>powershell</a:t>
-            </a:r>
-            <a:r>
-              <a:rPr lang="en-US" dirty="0"/>
-              <a:t> -</a:t>
-            </a:r>
-            <a:r>
-              <a:rPr lang="en-US" dirty="0" err="1"/>
-              <a:t>NoProfile</a:t>
-            </a:r>
-            <a:r>
-              <a:rPr lang="en-US" dirty="0"/>
-              <a:t> -</a:t>
-            </a:r>
-            <a:r>
-              <a:rPr lang="en-US" dirty="0" err="1"/>
-              <a:t>ExecutionPolicy</a:t>
-            </a:r>
-            <a:r>
-              <a:rPr lang="en-US" dirty="0"/>
-              <a:t> unrestricted -Command "</a:t>
-            </a:r>
-            <a:r>
-              <a:rPr lang="en-US" dirty="0" err="1"/>
-              <a:t>iex</a:t>
-            </a:r>
-            <a:r>
-              <a:rPr lang="en-US" dirty="0"/>
-              <a:t> ((new-object </a:t>
-            </a:r>
-            <a:r>
-              <a:rPr lang="en-US" dirty="0" err="1"/>
-              <a:t>net.webclient</a:t>
-            </a:r>
-            <a:r>
-              <a:rPr lang="en-US" dirty="0"/>
-              <a:t>).</a:t>
-            </a:r>
-            <a:r>
-              <a:rPr lang="en-US" dirty="0" err="1"/>
-              <a:t>DownloadString</a:t>
-            </a:r>
-            <a:r>
-              <a:rPr lang="en-US" dirty="0"/>
-              <a:t>('http://bit.ly/</a:t>
-            </a:r>
-            <a:r>
-              <a:rPr lang="en-US" dirty="0" err="1"/>
-              <a:t>psChocInstall</a:t>
-            </a:r>
-            <a:r>
-              <a:rPr lang="en-US" dirty="0"/>
-              <a:t>'))" &amp;&amp; SET PATH=%PATH%;%</a:t>
-            </a:r>
-            <a:r>
-              <a:rPr lang="en-US" dirty="0" err="1"/>
-              <a:t>systemdrive</a:t>
-            </a:r>
-            <a:r>
-              <a:rPr lang="en-US" dirty="0"/>
-              <a:t>%\chocolatey\bin</a:t>
-            </a:r>
-            <a:endParaRPr lang="en-US" dirty="0"/>
-          </a:p>
-        </p:txBody>
-      </p:sp>
-    </p:spTree>
-    <p:extLst>
-      <p:ext uri="{BB962C8B-B14F-4D97-AF65-F5344CB8AC3E}">
-        <p14:creationId xmlns:p14="http://schemas.microsoft.com/office/powerpoint/2010/main" val="3361044654"/>
-      </p:ext>
-    </p:extLst>
-  </p:cSld>
-  <p:clrMapOvr>
-    <a:masterClrMapping/>
-  </p:clrMapOvr>
-  <p:timing>
-    <p:tnLst>
-      <p:par>
-        <p:cTn id="1" dur="indefinite" restart="never" nodeType="tmRoot"/>
-      </p:par>
-    </p:tnLst>
-  </p:timing>
-</p:sld>
-</file>
-
-<file path=ppt/slides/slide9.xml><?xml version="1.0" encoding="utf-8"?>
-<p:sld xmlns:a="http://schemas.openxmlformats.org/drawingml/2006/main" xmlns:r="http://schemas.openxmlformats.org/officeDocument/2006/relationships" xmlns:p="http://schemas.openxmlformats.org/presentationml/2006/main">
-  <p:cSld>
-    <p:spTree>
-      <p:nvGrpSpPr>
-        <p:cNvPr id="1" name=""/>
-        <p:cNvGrpSpPr/>
-        <p:nvPr/>
-      </p:nvGrpSpPr>
-      <p:grpSpPr>
-        <a:xfrm>
-          <a:off x="0" y="0"/>
-          <a:ext cx="0" cy="0"/>
-          <a:chOff x="0" y="0"/>
-          <a:chExt cx="0" cy="0"/>
-        </a:xfrm>
-      </p:grpSpPr>
-      <p:sp>
-        <p:nvSpPr>
-          <p:cNvPr id="3" name="Content Placeholder 2"/>
-          <p:cNvSpPr>
-            <a:spLocks noGrp="1"/>
-          </p:cNvSpPr>
-          <p:nvPr>
-            <p:ph idx="1"/>
-          </p:nvPr>
-        </p:nvSpPr>
-        <p:spPr>
-          <a:xfrm>
-            <a:off x="457200" y="1981200"/>
-            <a:ext cx="8229600" cy="3840163"/>
-          </a:xfrm>
-        </p:spPr>
-        <p:txBody>
-          <a:bodyPr/>
-          <a:lstStyle/>
-          <a:p>
-            <a:pPr marL="0" indent="0" algn="ctr">
-              <a:buNone/>
-            </a:pPr>
-            <a:r>
-              <a:rPr lang="en-US" dirty="0" err="1" smtClean="0"/>
-              <a:t>Statlight</a:t>
-            </a:r>
-            <a:endParaRPr lang="en-US" dirty="0"/>
-          </a:p>
-        </p:txBody>
-      </p:sp>
-      <p:pic>
-        <p:nvPicPr>
-          <p:cNvPr id="1026" name="Picture 2"/>
-          <p:cNvPicPr>
-            <a:picLocks noChangeAspect="1" noChangeArrowheads="1"/>
-          </p:cNvPicPr>
-          <p:nvPr/>
-        </p:nvPicPr>
-        <p:blipFill>
-          <a:blip r:embed="rId2">
-            <a:extLst>
-              <a:ext uri="{28A0092B-C50C-407E-A947-70E740481C1C}">
-                <a14:useLocalDpi xmlns:a14="http://schemas.microsoft.com/office/drawing/2010/main" val="0"/>
-              </a:ext>
-            </a:extLst>
-          </a:blip>
-          <a:srcRect/>
-          <a:stretch>
-            <a:fillRect/>
-          </a:stretch>
-        </p:blipFill>
-        <p:spPr bwMode="auto">
-          <a:xfrm>
-            <a:off x="1819275" y="2576513"/>
-            <a:ext cx="5505450" cy="1704975"/>
-          </a:xfrm>
-          <a:prstGeom prst="rect">
-            <a:avLst/>
-          </a:prstGeom>
-          <a:noFill/>
-          <a:ln>
-            <a:noFill/>
-          </a:ln>
-          <a:effectLst/>
-          <a:extLst>
-            <a:ext uri="{909E8E84-426E-40DD-AFC4-6F175D3DCCD1}">
-              <a14:hiddenFill xmlns:a14="http://schemas.microsoft.com/office/drawing/2010/main">
-                <a:solidFill>
-                  <a:schemeClr val="accent1"/>
-                </a:solidFill>
-              </a14:hiddenFill>
-            </a:ext>
-            <a:ext uri="{91240B29-F687-4F45-9708-019B960494DF}">
-              <a14:hiddenLine xmlns:a14="http://schemas.microsoft.com/office/drawing/2010/main" w="9525">
-                <a:solidFill>
-                  <a:schemeClr val="tx1"/>
-                </a:solidFill>
-                <a:miter lim="800000"/>
-                <a:headEnd/>
-                <a:tailEnd/>
-              </a14:hiddenLine>
-            </a:ext>
-            <a:ext uri="{AF507438-7753-43E0-B8FC-AC1667EBCBE1}">
-              <a14:hiddenEffects xmlns:a14="http://schemas.microsoft.com/office/drawing/2010/main">
-                <a:effectLst>
-                  <a:outerShdw dist="35921" dir="2700000" algn="ctr" rotWithShape="0">
-                    <a:schemeClr val="bg2"/>
-                  </a:outerShdw>
-                </a:effectLst>
-              </a14:hiddenEffects>
-            </a:ext>
-          </a:extLst>
-        </p:spPr>
-      </p:pic>
-      <p:sp>
-        <p:nvSpPr>
-          <p:cNvPr id="2" name="TextBox 1"/>
-          <p:cNvSpPr txBox="1"/>
-          <p:nvPr/>
-        </p:nvSpPr>
-        <p:spPr>
-          <a:xfrm>
-            <a:off x="1519238" y="381000"/>
-            <a:ext cx="6105525" cy="769441"/>
-          </a:xfrm>
-          <a:prstGeom prst="rect">
-            <a:avLst/>
-          </a:prstGeom>
-          <a:noFill/>
-        </p:spPr>
-        <p:txBody>
-          <a:bodyPr wrap="square" rtlCol="0">
-            <a:spAutoFit/>
-          </a:bodyPr>
-          <a:lstStyle/>
-          <a:p>
-            <a:pPr algn="ctr"/>
-            <a:r>
-              <a:rPr lang="en-US" sz="4400" dirty="0" smtClean="0"/>
-              <a:t>Install a Tool</a:t>
-            </a:r>
-            <a:endParaRPr lang="en-US" sz="4400" dirty="0"/>
-          </a:p>
-        </p:txBody>
-      </p:sp>
-    </p:spTree>
-  </p:cSld>
-  <p:clrMapOvr>
-    <a:masterClrMapping/>
-  </p:clrMapOvr>
-  <p:timing>
-    <p:tnLst>
-      <p:par>
-        <p:cTn id="1" dur="indefinite" restart="never" nodeType="tmRoot"/>
+        <p:cTn xmlns:p14="http://schemas.microsoft.com/office/powerpoint/2010/main" id="1" dur="indefinite" restart="never" nodeType="tmRoot"/>
       </p:par>
     </p:tnLst>
   </p:timing>

</xml_diff>

<commit_message>
updating chocolatey slides for speakerdeck
</commit_message>
<xml_diff>
--- a/windows/chocolatey/chocolatey.pptx
+++ b/windows/chocolatey/chocolatey.pptx
@@ -218,7 +218,7 @@
             <a:fld id="{F8705BBE-BC03-42F3-A30B-8ED0F940BFAD}" type="datetimeFigureOut">
               <a:rPr lang="en-US" smtClean="0"/>
               <a:pPr/>
-              <a:t>5/4/13</a:t>
+              <a:t>5/4/2013</a:t>
             </a:fld>
             <a:endParaRPr lang="en-US"/>
           </a:p>
@@ -925,7 +925,7 @@
             <a:fld id="{C3CE9471-DEB6-4DE0-B19C-141FBC909CBF}" type="datetimeFigureOut">
               <a:rPr lang="en-US" smtClean="0"/>
               <a:pPr/>
-              <a:t>5/4/13</a:t>
+              <a:t>5/4/2013</a:t>
             </a:fld>
             <a:endParaRPr lang="en-US"/>
           </a:p>
@@ -1092,7 +1092,7 @@
             <a:fld id="{C3CE9471-DEB6-4DE0-B19C-141FBC909CBF}" type="datetimeFigureOut">
               <a:rPr lang="en-US" smtClean="0"/>
               <a:pPr/>
-              <a:t>5/4/13</a:t>
+              <a:t>5/4/2013</a:t>
             </a:fld>
             <a:endParaRPr lang="en-US"/>
           </a:p>
@@ -1269,7 +1269,7 @@
             <a:fld id="{C3CE9471-DEB6-4DE0-B19C-141FBC909CBF}" type="datetimeFigureOut">
               <a:rPr lang="en-US" smtClean="0"/>
               <a:pPr/>
-              <a:t>5/4/13</a:t>
+              <a:t>5/4/2013</a:t>
             </a:fld>
             <a:endParaRPr lang="en-US"/>
           </a:p>
@@ -1436,7 +1436,7 @@
             <a:fld id="{C3CE9471-DEB6-4DE0-B19C-141FBC909CBF}" type="datetimeFigureOut">
               <a:rPr lang="en-US" smtClean="0"/>
               <a:pPr/>
-              <a:t>5/4/13</a:t>
+              <a:t>5/4/2013</a:t>
             </a:fld>
             <a:endParaRPr lang="en-US"/>
           </a:p>
@@ -1679,7 +1679,7 @@
             <a:fld id="{C3CE9471-DEB6-4DE0-B19C-141FBC909CBF}" type="datetimeFigureOut">
               <a:rPr lang="en-US" smtClean="0"/>
               <a:pPr/>
-              <a:t>5/4/13</a:t>
+              <a:t>5/4/2013</a:t>
             </a:fld>
             <a:endParaRPr lang="en-US"/>
           </a:p>
@@ -1964,7 +1964,7 @@
             <a:fld id="{C3CE9471-DEB6-4DE0-B19C-141FBC909CBF}" type="datetimeFigureOut">
               <a:rPr lang="en-US" smtClean="0"/>
               <a:pPr/>
-              <a:t>5/4/13</a:t>
+              <a:t>5/4/2013</a:t>
             </a:fld>
             <a:endParaRPr lang="en-US"/>
           </a:p>
@@ -2383,7 +2383,7 @@
             <a:fld id="{C3CE9471-DEB6-4DE0-B19C-141FBC909CBF}" type="datetimeFigureOut">
               <a:rPr lang="en-US" smtClean="0"/>
               <a:pPr/>
-              <a:t>5/4/13</a:t>
+              <a:t>5/4/2013</a:t>
             </a:fld>
             <a:endParaRPr lang="en-US"/>
           </a:p>
@@ -2498,7 +2498,7 @@
             <a:fld id="{C3CE9471-DEB6-4DE0-B19C-141FBC909CBF}" type="datetimeFigureOut">
               <a:rPr lang="en-US" smtClean="0"/>
               <a:pPr/>
-              <a:t>5/4/13</a:t>
+              <a:t>5/4/2013</a:t>
             </a:fld>
             <a:endParaRPr lang="en-US"/>
           </a:p>
@@ -2590,7 +2590,7 @@
             <a:fld id="{C3CE9471-DEB6-4DE0-B19C-141FBC909CBF}" type="datetimeFigureOut">
               <a:rPr lang="en-US" smtClean="0"/>
               <a:pPr/>
-              <a:t>5/4/13</a:t>
+              <a:t>5/4/2013</a:t>
             </a:fld>
             <a:endParaRPr lang="en-US"/>
           </a:p>
@@ -2864,7 +2864,7 @@
             <a:fld id="{C3CE9471-DEB6-4DE0-B19C-141FBC909CBF}" type="datetimeFigureOut">
               <a:rPr lang="en-US" smtClean="0"/>
               <a:pPr/>
-              <a:t>5/4/13</a:t>
+              <a:t>5/4/2013</a:t>
             </a:fld>
             <a:endParaRPr lang="en-US"/>
           </a:p>
@@ -3118,7 +3118,7 @@
             <a:fld id="{C3CE9471-DEB6-4DE0-B19C-141FBC909CBF}" type="datetimeFigureOut">
               <a:rPr lang="en-US" smtClean="0"/>
               <a:pPr/>
-              <a:t>5/4/13</a:t>
+              <a:t>5/4/2013</a:t>
             </a:fld>
             <a:endParaRPr lang="en-US"/>
           </a:p>
@@ -3245,7 +3245,7 @@
           </a:prstGeom>
           <a:noFill/>
           <a:extLst>
-            <a:ext uri="{909E8E84-426E-40dd-AFC4-6F175D3DCCD1}">
+            <a:ext uri="{909E8E84-426E-40DD-AFC4-6F175D3DCCD1}">
               <a14:hiddenFill xmlns:a14="http://schemas.microsoft.com/office/drawing/2010/main">
                 <a:solidFill>
                   <a:srgbClr val="FFFFFF"/>
@@ -3386,7 +3386,7 @@
             <a:fld id="{C3CE9471-DEB6-4DE0-B19C-141FBC909CBF}" type="datetimeFigureOut">
               <a:rPr lang="en-US" smtClean="0"/>
               <a:pPr/>
-              <a:t>5/4/13</a:t>
+              <a:t>5/4/2013</a:t>
             </a:fld>
             <a:endParaRPr lang="en-US"/>
           </a:p>
@@ -3741,7 +3741,7 @@
 </file>
 
 <file path=ppt/slides/slide1.xml><?xml version="1.0" encoding="utf-8"?>
-<p:sld xmlns:a="http://schemas.openxmlformats.org/drawingml/2006/main" xmlns:r="http://schemas.openxmlformats.org/officeDocument/2006/relationships" xmlns:p="http://schemas.openxmlformats.org/presentationml/2006/main">
+<p:sld xmlns:a="http://schemas.openxmlformats.org/drawingml/2006/main" xmlns:r="http://schemas.openxmlformats.org/officeDocument/2006/relationships" xmlns:p="http://schemas.openxmlformats.org/presentationml/2006/main" show="0">
   <p:cSld>
     <p:spTree>
       <p:nvGrpSpPr>
@@ -4662,10 +4662,18 @@
   <p:clrMapOvr>
     <a:masterClrMapping/>
   </p:clrMapOvr>
+  <mc:AlternateContent xmlns:mc="http://schemas.openxmlformats.org/markup-compatibility/2006">
+    <mc:Choice xmlns:p14="http://schemas.microsoft.com/office/powerpoint/2010/main" Requires="p14">
+      <p:transition spd="slow" p14:dur="2000"/>
+    </mc:Choice>
+    <mc:Fallback>
+      <p:transition spd="slow"/>
+    </mc:Fallback>
+  </mc:AlternateContent>
   <p:timing>
     <p:tnLst>
       <p:par>
-        <p:cTn xmlns:p14="http://schemas.microsoft.com/office/powerpoint/2010/main" id="1" dur="indefinite" restart="never" nodeType="tmRoot"/>
+        <p:cTn id="1" dur="indefinite" restart="never" nodeType="tmRoot"/>
       </p:par>
     </p:tnLst>
   </p:timing>
@@ -4817,7 +4825,7 @@
   <p:timing>
     <p:tnLst>
       <p:par>
-        <p:cTn xmlns:p14="http://schemas.microsoft.com/office/powerpoint/2010/main" id="1" dur="indefinite" restart="never" nodeType="tmRoot"/>
+        <p:cTn id="1" dur="indefinite" restart="never" nodeType="tmRoot"/>
       </p:par>
     </p:tnLst>
   </p:timing>
@@ -4907,14 +4915,14 @@
           </a:ln>
           <a:effectLst/>
           <a:extLst>
-            <a:ext uri="{909E8E84-426E-40dd-AFC4-6F175D3DCCD1}">
+            <a:ext uri="{909E8E84-426E-40DD-AFC4-6F175D3DCCD1}">
               <a14:hiddenFill xmlns:a14="http://schemas.microsoft.com/office/drawing/2010/main">
                 <a:solidFill>
                   <a:schemeClr val="accent1"/>
                 </a:solidFill>
               </a14:hiddenFill>
             </a:ext>
-            <a:ext uri="{91240B29-F687-4f45-9708-019B960494DF}">
+            <a:ext uri="{91240B29-F687-4F45-9708-019B960494DF}">
               <a14:hiddenLine xmlns:a14="http://schemas.microsoft.com/office/drawing/2010/main" w="9525">
                 <a:solidFill>
                   <a:schemeClr val="tx1"/>
@@ -4924,7 +4932,7 @@
                 <a:tailEnd/>
               </a14:hiddenLine>
             </a:ext>
-            <a:ext uri="{AF507438-7753-43e0-B8FC-AC1667EBCBE1}">
+            <a:ext uri="{AF507438-7753-43E0-B8FC-AC1667EBCBE1}">
               <a14:hiddenEffects xmlns:a14="http://schemas.microsoft.com/office/drawing/2010/main">
                 <a:effectLst>
                   <a:outerShdw dist="35921" dir="2700000" algn="ctr" rotWithShape="0">
@@ -4975,7 +4983,7 @@
   <p:timing>
     <p:tnLst>
       <p:par>
-        <p:cTn xmlns:p14="http://schemas.microsoft.com/office/powerpoint/2010/main" id="1" dur="indefinite" restart="never" nodeType="tmRoot"/>
+        <p:cTn id="1" dur="indefinite" restart="never" nodeType="tmRoot"/>
       </p:par>
     </p:tnLst>
   </p:timing>
@@ -5098,14 +5106,14 @@
           </a:ln>
           <a:effectLst/>
           <a:extLst>
-            <a:ext uri="{909E8E84-426E-40dd-AFC4-6F175D3DCCD1}">
+            <a:ext uri="{909E8E84-426E-40DD-AFC4-6F175D3DCCD1}">
               <a14:hiddenFill xmlns:a14="http://schemas.microsoft.com/office/drawing/2010/main">
                 <a:solidFill>
                   <a:schemeClr val="accent1"/>
                 </a:solidFill>
               </a14:hiddenFill>
             </a:ext>
-            <a:ext uri="{91240B29-F687-4f45-9708-019B960494DF}">
+            <a:ext uri="{91240B29-F687-4F45-9708-019B960494DF}">
               <a14:hiddenLine xmlns:a14="http://schemas.microsoft.com/office/drawing/2010/main" w="9525">
                 <a:solidFill>
                   <a:schemeClr val="tx1"/>
@@ -5115,7 +5123,7 @@
                 <a:tailEnd/>
               </a14:hiddenLine>
             </a:ext>
-            <a:ext uri="{AF507438-7753-43e0-B8FC-AC1667EBCBE1}">
+            <a:ext uri="{AF507438-7753-43E0-B8FC-AC1667EBCBE1}">
               <a14:hiddenEffects xmlns:a14="http://schemas.microsoft.com/office/drawing/2010/main">
                 <a:effectLst>
                   <a:outerShdw dist="35921" dir="2700000" algn="ctr" rotWithShape="0">
@@ -5140,7 +5148,7 @@
   <p:timing>
     <p:tnLst>
       <p:par>
-        <p:cTn xmlns:p14="http://schemas.microsoft.com/office/powerpoint/2010/main" id="1" dur="indefinite" restart="never" nodeType="tmRoot"/>
+        <p:cTn id="1" dur="indefinite" restart="never" nodeType="tmRoot"/>
       </p:par>
     </p:tnLst>
   </p:timing>
@@ -5234,14 +5242,14 @@
           </a:ln>
           <a:effectLst/>
           <a:extLst>
-            <a:ext uri="{909E8E84-426E-40dd-AFC4-6F175D3DCCD1}">
+            <a:ext uri="{909E8E84-426E-40DD-AFC4-6F175D3DCCD1}">
               <a14:hiddenFill xmlns:a14="http://schemas.microsoft.com/office/drawing/2010/main">
                 <a:solidFill>
                   <a:schemeClr val="accent1"/>
                 </a:solidFill>
               </a14:hiddenFill>
             </a:ext>
-            <a:ext uri="{91240B29-F687-4f45-9708-019B960494DF}">
+            <a:ext uri="{91240B29-F687-4F45-9708-019B960494DF}">
               <a14:hiddenLine xmlns:a14="http://schemas.microsoft.com/office/drawing/2010/main" w="9525">
                 <a:solidFill>
                   <a:schemeClr val="tx1"/>
@@ -5251,7 +5259,7 @@
                 <a:tailEnd/>
               </a14:hiddenLine>
             </a:ext>
-            <a:ext uri="{AF507438-7753-43e0-B8FC-AC1667EBCBE1}">
+            <a:ext uri="{AF507438-7753-43E0-B8FC-AC1667EBCBE1}">
               <a14:hiddenEffects xmlns:a14="http://schemas.microsoft.com/office/drawing/2010/main">
                 <a:effectLst>
                   <a:outerShdw dist="35921" dir="2700000" algn="ctr" rotWithShape="0">
@@ -5298,14 +5306,14 @@
           </a:ln>
           <a:effectLst/>
           <a:extLst>
-            <a:ext uri="{909E8E84-426E-40dd-AFC4-6F175D3DCCD1}">
+            <a:ext uri="{909E8E84-426E-40DD-AFC4-6F175D3DCCD1}">
               <a14:hiddenFill xmlns:a14="http://schemas.microsoft.com/office/drawing/2010/main">
                 <a:solidFill>
                   <a:schemeClr val="accent1"/>
                 </a:solidFill>
               </a14:hiddenFill>
             </a:ext>
-            <a:ext uri="{91240B29-F687-4f45-9708-019B960494DF}">
+            <a:ext uri="{91240B29-F687-4F45-9708-019B960494DF}">
               <a14:hiddenLine xmlns:a14="http://schemas.microsoft.com/office/drawing/2010/main" w="9525">
                 <a:solidFill>
                   <a:schemeClr val="tx1"/>
@@ -5315,7 +5323,7 @@
                 <a:tailEnd/>
               </a14:hiddenLine>
             </a:ext>
-            <a:ext uri="{AF507438-7753-43e0-B8FC-AC1667EBCBE1}">
+            <a:ext uri="{AF507438-7753-43E0-B8FC-AC1667EBCBE1}">
               <a14:hiddenEffects xmlns:a14="http://schemas.microsoft.com/office/drawing/2010/main">
                 <a:effectLst>
                   <a:outerShdw dist="35921" dir="2700000" algn="ctr" rotWithShape="0">
@@ -5366,7 +5374,7 @@
   <p:timing>
     <p:tnLst>
       <p:par>
-        <p:cTn xmlns:p14="http://schemas.microsoft.com/office/powerpoint/2010/main" id="1" dur="indefinite" restart="never" nodeType="tmRoot"/>
+        <p:cTn id="1" dur="indefinite" restart="never" nodeType="tmRoot"/>
       </p:par>
     </p:tnLst>
   </p:timing>
@@ -5489,14 +5497,14 @@
           </a:ln>
           <a:effectLst/>
           <a:extLst>
-            <a:ext uri="{909E8E84-426E-40dd-AFC4-6F175D3DCCD1}">
+            <a:ext uri="{909E8E84-426E-40DD-AFC4-6F175D3DCCD1}">
               <a14:hiddenFill xmlns:a14="http://schemas.microsoft.com/office/drawing/2010/main">
                 <a:solidFill>
                   <a:schemeClr val="accent1"/>
                 </a:solidFill>
               </a14:hiddenFill>
             </a:ext>
-            <a:ext uri="{91240B29-F687-4f45-9708-019B960494DF}">
+            <a:ext uri="{91240B29-F687-4F45-9708-019B960494DF}">
               <a14:hiddenLine xmlns:a14="http://schemas.microsoft.com/office/drawing/2010/main" w="9525">
                 <a:solidFill>
                   <a:schemeClr val="tx1"/>
@@ -5506,7 +5514,7 @@
                 <a:tailEnd/>
               </a14:hiddenLine>
             </a:ext>
-            <a:ext uri="{AF507438-7753-43e0-B8FC-AC1667EBCBE1}">
+            <a:ext uri="{AF507438-7753-43E0-B8FC-AC1667EBCBE1}">
               <a14:hiddenEffects xmlns:a14="http://schemas.microsoft.com/office/drawing/2010/main">
                 <a:effectLst>
                   <a:outerShdw dist="35921" dir="2700000" algn="ctr" rotWithShape="0">
@@ -5531,7 +5539,7 @@
   <p:timing>
     <p:tnLst>
       <p:par>
-        <p:cTn xmlns:p14="http://schemas.microsoft.com/office/powerpoint/2010/main" id="1" dur="indefinite" restart="never" nodeType="tmRoot"/>
+        <p:cTn id="1" dur="indefinite" restart="never" nodeType="tmRoot"/>
       </p:par>
     </p:tnLst>
   </p:timing>
@@ -5657,7 +5665,7 @@
   <p:timing>
     <p:tnLst>
       <p:par>
-        <p:cTn xmlns:p14="http://schemas.microsoft.com/office/powerpoint/2010/main" id="1" dur="indefinite" restart="never" nodeType="tmRoot"/>
+        <p:cTn id="1" dur="indefinite" restart="never" nodeType="tmRoot"/>
       </p:par>
     </p:tnLst>
   </p:timing>
@@ -5759,7 +5767,7 @@
   <p:timing>
     <p:tnLst>
       <p:par>
-        <p:cTn xmlns:p14="http://schemas.microsoft.com/office/powerpoint/2010/main" id="1" dur="indefinite" restart="never" nodeType="tmRoot"/>
+        <p:cTn id="1" dur="indefinite" restart="never" nodeType="tmRoot"/>
       </p:par>
     </p:tnLst>
   </p:timing>
@@ -5848,7 +5856,7 @@
   <p:timing>
     <p:tnLst>
       <p:par>
-        <p:cTn xmlns:p14="http://schemas.microsoft.com/office/powerpoint/2010/main" id="1" dur="indefinite" restart="never" nodeType="tmRoot"/>
+        <p:cTn id="1" dur="indefinite" restart="never" nodeType="tmRoot"/>
       </p:par>
     </p:tnLst>
   </p:timing>
@@ -5908,7 +5916,7 @@
   <p:timing>
     <p:tnLst>
       <p:par>
-        <p:cTn xmlns:p14="http://schemas.microsoft.com/office/powerpoint/2010/main" id="1" dur="indefinite" restart="never" nodeType="tmRoot"/>
+        <p:cTn id="1" dur="indefinite" restart="never" nodeType="tmRoot"/>
       </p:par>
     </p:tnLst>
   </p:timing>
@@ -6038,7 +6046,7 @@
   <p:timing>
     <p:tnLst>
       <p:par>
-        <p:cTn xmlns:p14="http://schemas.microsoft.com/office/powerpoint/2010/main" id="1" dur="indefinite" restart="never" nodeType="tmRoot"/>
+        <p:cTn id="1" dur="indefinite" restart="never" nodeType="tmRoot"/>
       </p:par>
     </p:tnLst>
   </p:timing>
@@ -6156,7 +6164,7 @@
   <p:timing>
     <p:tnLst>
       <p:par>
-        <p:cTn xmlns:p14="http://schemas.microsoft.com/office/powerpoint/2010/main" id="1" dur="indefinite" restart="never" nodeType="tmRoot"/>
+        <p:cTn id="1" dur="indefinite" restart="never" nodeType="tmRoot"/>
       </p:par>
     </p:tnLst>
   </p:timing>
@@ -6221,7 +6229,7 @@
   <p:timing>
     <p:tnLst>
       <p:par>
-        <p:cTn xmlns:p14="http://schemas.microsoft.com/office/powerpoint/2010/main" id="1" dur="indefinite" restart="never" nodeType="tmRoot"/>
+        <p:cTn id="1" dur="indefinite" restart="never" nodeType="tmRoot"/>
       </p:par>
     </p:tnLst>
   </p:timing>
@@ -6350,14 +6358,14 @@
           </a:ln>
           <a:effectLst/>
           <a:extLst>
-            <a:ext uri="{909E8E84-426E-40dd-AFC4-6F175D3DCCD1}">
+            <a:ext uri="{909E8E84-426E-40DD-AFC4-6F175D3DCCD1}">
               <a14:hiddenFill xmlns:a14="http://schemas.microsoft.com/office/drawing/2010/main">
                 <a:solidFill>
                   <a:schemeClr val="accent1"/>
                 </a:solidFill>
               </a14:hiddenFill>
             </a:ext>
-            <a:ext uri="{91240B29-F687-4f45-9708-019B960494DF}">
+            <a:ext uri="{91240B29-F687-4F45-9708-019B960494DF}">
               <a14:hiddenLine xmlns:a14="http://schemas.microsoft.com/office/drawing/2010/main" w="9525">
                 <a:solidFill>
                   <a:schemeClr val="tx1"/>
@@ -6367,7 +6375,7 @@
                 <a:tailEnd/>
               </a14:hiddenLine>
             </a:ext>
-            <a:ext uri="{AF507438-7753-43e0-B8FC-AC1667EBCBE1}">
+            <a:ext uri="{AF507438-7753-43E0-B8FC-AC1667EBCBE1}">
               <a14:hiddenEffects xmlns:a14="http://schemas.microsoft.com/office/drawing/2010/main">
                 <a:effectLst>
                   <a:outerShdw dist="35921" dir="2700000" algn="ctr" rotWithShape="0">
@@ -6392,7 +6400,7 @@
   <p:timing>
     <p:tnLst>
       <p:par>
-        <p:cTn xmlns:p14="http://schemas.microsoft.com/office/powerpoint/2010/main" id="1" dur="indefinite" restart="never" nodeType="tmRoot"/>
+        <p:cTn id="1" dur="indefinite" restart="never" nodeType="tmRoot"/>
       </p:par>
     </p:tnLst>
   </p:timing>
@@ -6521,14 +6529,14 @@
           </a:ln>
           <a:effectLst/>
           <a:extLst>
-            <a:ext uri="{909E8E84-426E-40dd-AFC4-6F175D3DCCD1}">
+            <a:ext uri="{909E8E84-426E-40DD-AFC4-6F175D3DCCD1}">
               <a14:hiddenFill xmlns:a14="http://schemas.microsoft.com/office/drawing/2010/main">
                 <a:solidFill>
                   <a:schemeClr val="accent1"/>
                 </a:solidFill>
               </a14:hiddenFill>
             </a:ext>
-            <a:ext uri="{91240B29-F687-4f45-9708-019B960494DF}">
+            <a:ext uri="{91240B29-F687-4F45-9708-019B960494DF}">
               <a14:hiddenLine xmlns:a14="http://schemas.microsoft.com/office/drawing/2010/main" w="9525">
                 <a:solidFill>
                   <a:schemeClr val="tx1"/>
@@ -6538,7 +6546,7 @@
                 <a:tailEnd/>
               </a14:hiddenLine>
             </a:ext>
-            <a:ext uri="{AF507438-7753-43e0-B8FC-AC1667EBCBE1}">
+            <a:ext uri="{AF507438-7753-43E0-B8FC-AC1667EBCBE1}">
               <a14:hiddenEffects xmlns:a14="http://schemas.microsoft.com/office/drawing/2010/main">
                 <a:effectLst>
                   <a:outerShdw dist="35921" dir="2700000" algn="ctr" rotWithShape="0">
@@ -6563,7 +6571,7 @@
   <p:timing>
     <p:tnLst>
       <p:par>
-        <p:cTn xmlns:p14="http://schemas.microsoft.com/office/powerpoint/2010/main" id="1" dur="indefinite" restart="never" nodeType="tmRoot"/>
+        <p:cTn id="1" dur="indefinite" restart="never" nodeType="tmRoot"/>
       </p:par>
     </p:tnLst>
   </p:timing>
@@ -6628,7 +6636,7 @@
   <p:timing>
     <p:tnLst>
       <p:par>
-        <p:cTn xmlns:p14="http://schemas.microsoft.com/office/powerpoint/2010/main" id="1" dur="indefinite" restart="never" nodeType="tmRoot"/>
+        <p:cTn id="1" dur="indefinite" restart="never" nodeType="tmRoot"/>
       </p:par>
     </p:tnLst>
   </p:timing>
@@ -6717,7 +6725,7 @@
   <p:timing>
     <p:tnLst>
       <p:par>
-        <p:cTn xmlns:p14="http://schemas.microsoft.com/office/powerpoint/2010/main" id="1" dur="indefinite" restart="never" nodeType="tmRoot"/>
+        <p:cTn id="1" dur="indefinite" restart="never" nodeType="tmRoot"/>
       </p:par>
     </p:tnLst>
   </p:timing>
@@ -6848,14 +6856,14 @@
           </a:ln>
           <a:effectLst/>
           <a:extLst>
-            <a:ext uri="{909E8E84-426E-40dd-AFC4-6F175D3DCCD1}">
+            <a:ext uri="{909E8E84-426E-40DD-AFC4-6F175D3DCCD1}">
               <a14:hiddenFill xmlns:a14="http://schemas.microsoft.com/office/drawing/2010/main">
                 <a:solidFill>
                   <a:schemeClr val="accent1"/>
                 </a:solidFill>
               </a14:hiddenFill>
             </a:ext>
-            <a:ext uri="{91240B29-F687-4f45-9708-019B960494DF}">
+            <a:ext uri="{91240B29-F687-4F45-9708-019B960494DF}">
               <a14:hiddenLine xmlns:a14="http://schemas.microsoft.com/office/drawing/2010/main" w="9525">
                 <a:solidFill>
                   <a:schemeClr val="tx1"/>
@@ -6865,7 +6873,7 @@
                 <a:tailEnd/>
               </a14:hiddenLine>
             </a:ext>
-            <a:ext uri="{AF507438-7753-43e0-B8FC-AC1667EBCBE1}">
+            <a:ext uri="{AF507438-7753-43E0-B8FC-AC1667EBCBE1}">
               <a14:hiddenEffects xmlns:a14="http://schemas.microsoft.com/office/drawing/2010/main">
                 <a:effectLst>
                   <a:outerShdw dist="35921" dir="2700000" algn="ctr" rotWithShape="0">
@@ -6885,7 +6893,7 @@
   <p:timing>
     <p:tnLst>
       <p:par>
-        <p:cTn xmlns:p14="http://schemas.microsoft.com/office/powerpoint/2010/main" id="1" dur="indefinite" restart="never" nodeType="tmRoot"/>
+        <p:cTn id="1" dur="indefinite" restart="never" nodeType="tmRoot"/>
       </p:par>
     </p:tnLst>
   </p:timing>
@@ -6978,7 +6986,7 @@
           </a:prstGeom>
           <a:noFill/>
           <a:extLst>
-            <a:ext uri="{909E8E84-426E-40dd-AFC4-6F175D3DCCD1}">
+            <a:ext uri="{909E8E84-426E-40DD-AFC4-6F175D3DCCD1}">
               <a14:hiddenFill xmlns:a14="http://schemas.microsoft.com/office/drawing/2010/main">
                 <a:solidFill>
                   <a:srgbClr val="FFFFFF"/>
@@ -7009,7 +7017,7 @@
   <p:timing>
     <p:tnLst>
       <p:par>
-        <p:cTn xmlns:p14="http://schemas.microsoft.com/office/powerpoint/2010/main" id="1" dur="indefinite" restart="never" nodeType="tmRoot"/>
+        <p:cTn id="1" dur="indefinite" restart="never" nodeType="tmRoot"/>
       </p:par>
     </p:tnLst>
   </p:timing>
@@ -7196,7 +7204,7 @@
   <p:timing>
     <p:tnLst>
       <p:par>
-        <p:cTn xmlns:p14="http://schemas.microsoft.com/office/powerpoint/2010/main" id="1" dur="indefinite" restart="never" nodeType="tmRoot"/>
+        <p:cTn id="1" dur="indefinite" restart="never" nodeType="tmRoot"/>
       </p:par>
     </p:tnLst>
   </p:timing>
@@ -7204,7 +7212,7 @@
 </file>
 
 <file path=ppt/slides/slide4.xml><?xml version="1.0" encoding="utf-8"?>
-<p:sld xmlns:a="http://schemas.openxmlformats.org/drawingml/2006/main" xmlns:r="http://schemas.openxmlformats.org/officeDocument/2006/relationships" xmlns:p="http://schemas.openxmlformats.org/presentationml/2006/main">
+<p:sld xmlns:a="http://schemas.openxmlformats.org/drawingml/2006/main" xmlns:r="http://schemas.openxmlformats.org/officeDocument/2006/relationships" xmlns:p="http://schemas.openxmlformats.org/presentationml/2006/main" show="0">
   <p:cSld>
     <p:spTree>
       <p:nvGrpSpPr>
@@ -7283,14 +7291,14 @@
             <a:noFill/>
           </a:ln>
           <a:extLst>
-            <a:ext uri="{909E8E84-426E-40dd-AFC4-6F175D3DCCD1}">
+            <a:ext uri="{909E8E84-426E-40DD-AFC4-6F175D3DCCD1}">
               <a14:hiddenFill xmlns:a14="http://schemas.microsoft.com/office/drawing/2010/main">
                 <a:solidFill>
                   <a:schemeClr val="accent1"/>
                 </a:solidFill>
               </a14:hiddenFill>
             </a:ext>
-            <a:ext uri="{91240B29-F687-4f45-9708-019B960494DF}">
+            <a:ext uri="{91240B29-F687-4F45-9708-019B960494DF}">
               <a14:hiddenLine xmlns:a14="http://schemas.microsoft.com/office/drawing/2010/main" w="9525">
                 <a:solidFill>
                   <a:schemeClr val="tx1"/>
@@ -7334,7 +7342,7 @@
           </a:prstGeom>
           <a:noFill/>
           <a:extLst>
-            <a:ext uri="{909E8E84-426E-40dd-AFC4-6F175D3DCCD1}">
+            <a:ext uri="{909E8E84-426E-40DD-AFC4-6F175D3DCCD1}">
               <a14:hiddenFill xmlns:a14="http://schemas.microsoft.com/office/drawing/2010/main">
                 <a:solidFill>
                   <a:srgbClr val="FFFFFF"/>
@@ -7604,10 +7612,18 @@
   <p:clrMapOvr>
     <a:masterClrMapping/>
   </p:clrMapOvr>
+  <mc:AlternateContent xmlns:mc="http://schemas.openxmlformats.org/markup-compatibility/2006">
+    <mc:Choice xmlns:p14="http://schemas.microsoft.com/office/powerpoint/2010/main" Requires="p14">
+      <p:transition spd="slow" p14:dur="2000"/>
+    </mc:Choice>
+    <mc:Fallback>
+      <p:transition spd="slow"/>
+    </mc:Fallback>
+  </mc:AlternateContent>
   <p:timing>
     <p:tnLst>
       <p:par>
-        <p:cTn xmlns:p14="http://schemas.microsoft.com/office/powerpoint/2010/main" id="1" dur="indefinite" restart="never" nodeType="tmRoot"/>
+        <p:cTn id="1" dur="indefinite" restart="never" nodeType="tmRoot"/>
       </p:par>
     </p:tnLst>
   </p:timing>
@@ -7742,14 +7758,14 @@
           </a:ln>
           <a:effectLst/>
           <a:extLst>
-            <a:ext uri="{909E8E84-426E-40dd-AFC4-6F175D3DCCD1}">
+            <a:ext uri="{909E8E84-426E-40DD-AFC4-6F175D3DCCD1}">
               <a14:hiddenFill xmlns:a14="http://schemas.microsoft.com/office/drawing/2010/main">
                 <a:solidFill>
                   <a:schemeClr val="accent1"/>
                 </a:solidFill>
               </a14:hiddenFill>
             </a:ext>
-            <a:ext uri="{91240B29-F687-4f45-9708-019B960494DF}">
+            <a:ext uri="{91240B29-F687-4F45-9708-019B960494DF}">
               <a14:hiddenLine xmlns:a14="http://schemas.microsoft.com/office/drawing/2010/main" w="9525">
                 <a:solidFill>
                   <a:schemeClr val="tx1"/>
@@ -7759,7 +7775,7 @@
                 <a:tailEnd/>
               </a14:hiddenLine>
             </a:ext>
-            <a:ext uri="{AF507438-7753-43e0-B8FC-AC1667EBCBE1}">
+            <a:ext uri="{AF507438-7753-43E0-B8FC-AC1667EBCBE1}">
               <a14:hiddenEffects xmlns:a14="http://schemas.microsoft.com/office/drawing/2010/main">
                 <a:effectLst>
                   <a:outerShdw dist="35921" dir="2700000" algn="ctr" rotWithShape="0">
@@ -7779,7 +7795,7 @@
   <p:timing>
     <p:tnLst>
       <p:par>
-        <p:cTn xmlns:p14="http://schemas.microsoft.com/office/powerpoint/2010/main" id="1" dur="indefinite" restart="never" nodeType="tmRoot"/>
+        <p:cTn id="1" dur="indefinite" restart="never" nodeType="tmRoot"/>
       </p:par>
     </p:tnLst>
   </p:timing>
@@ -7907,7 +7923,7 @@
   <p:timing>
     <p:tnLst>
       <p:par>
-        <p:cTn xmlns:p14="http://schemas.microsoft.com/office/powerpoint/2010/main" id="1" dur="indefinite" restart="never" nodeType="tmRoot"/>
+        <p:cTn id="1" dur="indefinite" restart="never" nodeType="tmRoot"/>
       </p:par>
     </p:tnLst>
   </p:timing>
@@ -8038,7 +8054,7 @@
   <p:timing>
     <p:tnLst>
       <p:par>
-        <p:cTn xmlns:p14="http://schemas.microsoft.com/office/powerpoint/2010/main" id="1" dur="indefinite" restart="never" nodeType="tmRoot"/>
+        <p:cTn id="1" dur="indefinite" restart="never" nodeType="tmRoot"/>
       </p:par>
     </p:tnLst>
   </p:timing>
@@ -8143,14 +8159,14 @@
           </a:ln>
           <a:effectLst/>
           <a:extLst>
-            <a:ext uri="{909E8E84-426E-40dd-AFC4-6F175D3DCCD1}">
+            <a:ext uri="{909E8E84-426E-40DD-AFC4-6F175D3DCCD1}">
               <a14:hiddenFill xmlns:a14="http://schemas.microsoft.com/office/drawing/2010/main">
                 <a:solidFill>
                   <a:schemeClr val="accent1"/>
                 </a:solidFill>
               </a14:hiddenFill>
             </a:ext>
-            <a:ext uri="{91240B29-F687-4f45-9708-019B960494DF}">
+            <a:ext uri="{91240B29-F687-4F45-9708-019B960494DF}">
               <a14:hiddenLine xmlns:a14="http://schemas.microsoft.com/office/drawing/2010/main" w="9525">
                 <a:solidFill>
                   <a:schemeClr val="tx1"/>
@@ -8160,7 +8176,7 @@
                 <a:tailEnd/>
               </a14:hiddenLine>
             </a:ext>
-            <a:ext uri="{AF507438-7753-43e0-B8FC-AC1667EBCBE1}">
+            <a:ext uri="{AF507438-7753-43E0-B8FC-AC1667EBCBE1}">
               <a14:hiddenEffects xmlns:a14="http://schemas.microsoft.com/office/drawing/2010/main">
                 <a:effectLst>
                   <a:outerShdw dist="35921" dir="2700000" algn="ctr" rotWithShape="0">
@@ -8185,7 +8201,7 @@
   <p:timing>
     <p:tnLst>
       <p:par>
-        <p:cTn xmlns:p14="http://schemas.microsoft.com/office/powerpoint/2010/main" id="1" dur="indefinite" restart="never" nodeType="tmRoot"/>
+        <p:cTn id="1" dur="indefinite" restart="never" nodeType="tmRoot"/>
       </p:par>
     </p:tnLst>
   </p:timing>
@@ -8324,14 +8340,14 @@
           </a:ln>
           <a:effectLst/>
           <a:extLst>
-            <a:ext uri="{909E8E84-426E-40dd-AFC4-6F175D3DCCD1}">
+            <a:ext uri="{909E8E84-426E-40DD-AFC4-6F175D3DCCD1}">
               <a14:hiddenFill xmlns:a14="http://schemas.microsoft.com/office/drawing/2010/main">
                 <a:solidFill>
                   <a:schemeClr val="accent1"/>
                 </a:solidFill>
               </a14:hiddenFill>
             </a:ext>
-            <a:ext uri="{91240B29-F687-4f45-9708-019B960494DF}">
+            <a:ext uri="{91240B29-F687-4F45-9708-019B960494DF}">
               <a14:hiddenLine xmlns:a14="http://schemas.microsoft.com/office/drawing/2010/main" w="9525">
                 <a:solidFill>
                   <a:schemeClr val="tx1"/>
@@ -8341,7 +8357,7 @@
                 <a:tailEnd/>
               </a14:hiddenLine>
             </a:ext>
-            <a:ext uri="{AF507438-7753-43e0-B8FC-AC1667EBCBE1}">
+            <a:ext uri="{AF507438-7753-43E0-B8FC-AC1667EBCBE1}">
               <a14:hiddenEffects xmlns:a14="http://schemas.microsoft.com/office/drawing/2010/main">
                 <a:effectLst>
                   <a:outerShdw dist="35921" dir="2700000" algn="ctr" rotWithShape="0">
@@ -8366,7 +8382,7 @@
   <p:timing>
     <p:tnLst>
       <p:par>
-        <p:cTn xmlns:p14="http://schemas.microsoft.com/office/powerpoint/2010/main" id="1" dur="indefinite" restart="never" nodeType="tmRoot"/>
+        <p:cTn id="1" dur="indefinite" restart="never" nodeType="tmRoot"/>
       </p:par>
     </p:tnLst>
   </p:timing>

</xml_diff>